<commit_message>
fix bugs in dataset and continue convert code for accepting the new data object
</commit_message>
<xml_diff>
--- a/doc/misc/dataobject-rework.pptx
+++ b/doc/misc/dataobject-rework.pptx
@@ -157,7 +157,7 @@
   </p:defaultTextStyle>
   <p:extLst>
     <p:ext uri="{EFAFB233-063F-42B5-8137-9DF3F51BA10A}">
-      <p15:sldGuideLst xmlns:p15="http://schemas.microsoft.com/office/powerpoint/2012/main">
+      <p15:sldGuideLst xmlns:p15="http://schemas.microsoft.com/office/powerpoint/2012/main" xmlns="">
         <p15:guide id="1" orient="horz" pos="2160">
           <p15:clr>
             <a:srgbClr val="A4A3A4"/>
@@ -33723,252 +33723,6 @@
           </a:ln>
         </p:spPr>
       </p:pic>
-      <p:sp>
-        <p:nvSpPr>
-          <p:cNvPr id="5" name="Rectangle 5"/>
-          <p:cNvSpPr txBox="1">
-            <a:spLocks noChangeArrowheads="1"/>
-          </p:cNvSpPr>
-          <p:nvPr/>
-        </p:nvSpPr>
-        <p:spPr bwMode="auto">
-          <a:xfrm>
-            <a:off x="2678934" y="6324600"/>
-            <a:ext cx="5775325" cy="612775"/>
-          </a:xfrm>
-          <a:prstGeom prst="rect">
-            <a:avLst/>
-          </a:prstGeom>
-          <a:noFill/>
-          <a:ln w="9525">
-            <a:noFill/>
-            <a:miter lim="800000"/>
-            <a:headEnd/>
-            <a:tailEnd/>
-          </a:ln>
-          <a:effectLst/>
-        </p:spPr>
-        <p:txBody>
-          <a:bodyPr vert="horz" wrap="square" lIns="0" tIns="0" rIns="0" bIns="0" numCol="1" anchor="t" anchorCtr="0" compatLnSpc="1">
-            <a:prstTxWarp prst="textNoShape">
-              <a:avLst/>
-            </a:prstTxWarp>
-          </a:bodyPr>
-          <a:lstStyle>
-            <a:lvl1pPr marL="0" indent="0" algn="l" rtl="0" eaLnBrk="0" fontAlgn="base" hangingPunct="0">
-              <a:lnSpc>
-                <a:spcPct val="85000"/>
-              </a:lnSpc>
-              <a:spcBef>
-                <a:spcPct val="20000"/>
-              </a:spcBef>
-              <a:spcAft>
-                <a:spcPct val="0"/>
-              </a:spcAft>
-              <a:buClr>
-                <a:srgbClr val="FF6600"/>
-              </a:buClr>
-              <a:buFontTx/>
-              <a:buNone/>
-              <a:defRPr sz="2000" b="1">
-                <a:solidFill>
-                  <a:schemeClr val="tx1"/>
-                </a:solidFill>
-                <a:latin typeface="+mn-lt"/>
-                <a:ea typeface="+mn-ea"/>
-                <a:cs typeface="+mn-cs"/>
-              </a:defRPr>
-            </a:lvl1pPr>
-            <a:lvl2pPr marL="684213" indent="-227013" algn="l" rtl="0" eaLnBrk="0" fontAlgn="base" hangingPunct="0">
-              <a:lnSpc>
-                <a:spcPct val="85000"/>
-              </a:lnSpc>
-              <a:spcBef>
-                <a:spcPct val="20000"/>
-              </a:spcBef>
-              <a:spcAft>
-                <a:spcPct val="0"/>
-              </a:spcAft>
-              <a:buClr>
-                <a:srgbClr val="FF6600"/>
-              </a:buClr>
-              <a:buFont typeface="Times New Roman" pitchFamily="18" charset="0"/>
-              <a:buChar char="–"/>
-              <a:defRPr sz="2000">
-                <a:solidFill>
-                  <a:schemeClr val="tx1"/>
-                </a:solidFill>
-                <a:latin typeface="+mn-lt"/>
-              </a:defRPr>
-            </a:lvl2pPr>
-            <a:lvl3pPr marL="1143000" indent="-228600" algn="l" rtl="0" eaLnBrk="0" fontAlgn="base" hangingPunct="0">
-              <a:lnSpc>
-                <a:spcPct val="85000"/>
-              </a:lnSpc>
-              <a:spcBef>
-                <a:spcPct val="20000"/>
-              </a:spcBef>
-              <a:spcAft>
-                <a:spcPct val="0"/>
-              </a:spcAft>
-              <a:buClr>
-                <a:srgbClr val="FF6600"/>
-              </a:buClr>
-              <a:buChar char="•"/>
-              <a:defRPr sz="2000">
-                <a:solidFill>
-                  <a:schemeClr val="tx1"/>
-                </a:solidFill>
-                <a:latin typeface="+mn-lt"/>
-              </a:defRPr>
-            </a:lvl3pPr>
-            <a:lvl4pPr marL="1600200" indent="-228600" algn="l" rtl="0" eaLnBrk="0" fontAlgn="base" hangingPunct="0">
-              <a:lnSpc>
-                <a:spcPct val="85000"/>
-              </a:lnSpc>
-              <a:spcBef>
-                <a:spcPct val="20000"/>
-              </a:spcBef>
-              <a:spcAft>
-                <a:spcPct val="0"/>
-              </a:spcAft>
-              <a:buClr>
-                <a:srgbClr val="FF6600"/>
-              </a:buClr>
-              <a:buFont typeface="Times New Roman" pitchFamily="18" charset="0"/>
-              <a:buChar char="–"/>
-              <a:defRPr sz="2000">
-                <a:solidFill>
-                  <a:schemeClr val="tx1"/>
-                </a:solidFill>
-                <a:latin typeface="+mn-lt"/>
-              </a:defRPr>
-            </a:lvl4pPr>
-            <a:lvl5pPr marL="2057400" indent="-228600" algn="l" rtl="0" eaLnBrk="0" fontAlgn="base" hangingPunct="0">
-              <a:lnSpc>
-                <a:spcPct val="85000"/>
-              </a:lnSpc>
-              <a:spcBef>
-                <a:spcPct val="20000"/>
-              </a:spcBef>
-              <a:spcAft>
-                <a:spcPct val="0"/>
-              </a:spcAft>
-              <a:buClr>
-                <a:srgbClr val="FF6600"/>
-              </a:buClr>
-              <a:buChar char="•"/>
-              <a:defRPr sz="2000">
-                <a:solidFill>
-                  <a:schemeClr val="tx1"/>
-                </a:solidFill>
-                <a:latin typeface="+mn-lt"/>
-              </a:defRPr>
-            </a:lvl5pPr>
-            <a:lvl6pPr marL="2514600" indent="-228600" algn="l" rtl="0" eaLnBrk="0" fontAlgn="base" hangingPunct="0">
-              <a:lnSpc>
-                <a:spcPct val="85000"/>
-              </a:lnSpc>
-              <a:spcBef>
-                <a:spcPct val="20000"/>
-              </a:spcBef>
-              <a:spcAft>
-                <a:spcPct val="0"/>
-              </a:spcAft>
-              <a:buClr>
-                <a:srgbClr val="FF6600"/>
-              </a:buClr>
-              <a:buChar char="•"/>
-              <a:defRPr sz="2000">
-                <a:solidFill>
-                  <a:schemeClr val="tx1"/>
-                </a:solidFill>
-                <a:latin typeface="+mn-lt"/>
-              </a:defRPr>
-            </a:lvl6pPr>
-            <a:lvl7pPr marL="2971800" indent="-228600" algn="l" rtl="0" eaLnBrk="0" fontAlgn="base" hangingPunct="0">
-              <a:lnSpc>
-                <a:spcPct val="85000"/>
-              </a:lnSpc>
-              <a:spcBef>
-                <a:spcPct val="20000"/>
-              </a:spcBef>
-              <a:spcAft>
-                <a:spcPct val="0"/>
-              </a:spcAft>
-              <a:buClr>
-                <a:srgbClr val="FF6600"/>
-              </a:buClr>
-              <a:buChar char="•"/>
-              <a:defRPr sz="2000">
-                <a:solidFill>
-                  <a:schemeClr val="tx1"/>
-                </a:solidFill>
-                <a:latin typeface="+mn-lt"/>
-              </a:defRPr>
-            </a:lvl7pPr>
-            <a:lvl8pPr marL="3429000" indent="-228600" algn="l" rtl="0" eaLnBrk="0" fontAlgn="base" hangingPunct="0">
-              <a:lnSpc>
-                <a:spcPct val="85000"/>
-              </a:lnSpc>
-              <a:spcBef>
-                <a:spcPct val="20000"/>
-              </a:spcBef>
-              <a:spcAft>
-                <a:spcPct val="0"/>
-              </a:spcAft>
-              <a:buClr>
-                <a:srgbClr val="FF6600"/>
-              </a:buClr>
-              <a:buChar char="•"/>
-              <a:defRPr sz="2000">
-                <a:solidFill>
-                  <a:schemeClr val="tx1"/>
-                </a:solidFill>
-                <a:latin typeface="+mn-lt"/>
-              </a:defRPr>
-            </a:lvl8pPr>
-            <a:lvl9pPr marL="3886200" indent="-228600" algn="l" rtl="0" eaLnBrk="0" fontAlgn="base" hangingPunct="0">
-              <a:lnSpc>
-                <a:spcPct val="85000"/>
-              </a:lnSpc>
-              <a:spcBef>
-                <a:spcPct val="20000"/>
-              </a:spcBef>
-              <a:spcAft>
-                <a:spcPct val="0"/>
-              </a:spcAft>
-              <a:buClr>
-                <a:srgbClr val="FF6600"/>
-              </a:buClr>
-              <a:buChar char="•"/>
-              <a:defRPr sz="2000">
-                <a:solidFill>
-                  <a:schemeClr val="tx1"/>
-                </a:solidFill>
-                <a:latin typeface="+mn-lt"/>
-              </a:defRPr>
-            </a:lvl9pPr>
-          </a:lstStyle>
-          <a:p>
-            <a:r>
-              <a:rPr lang="en-US" b="0" kern="0" dirty="0" smtClean="0"/>
-              <a:t>Find these slides in raven/doc/</a:t>
-            </a:r>
-            <a:r>
-              <a:rPr lang="en-US" b="0" kern="0" dirty="0" err="1" smtClean="0"/>
-              <a:t>misc</a:t>
-            </a:r>
-            <a:endParaRPr lang="en-US" b="0" kern="0" dirty="0" smtClean="0"/>
-          </a:p>
-          <a:p>
-            <a:endParaRPr lang="en-US" b="0" kern="0" dirty="0" smtClean="0"/>
-          </a:p>
-          <a:p>
-            <a:endParaRPr lang="en-US" b="0" kern="0" dirty="0"/>
-          </a:p>
-        </p:txBody>
-      </p:sp>
     </p:spTree>
   </p:cSld>
   <p:clrMapOvr>
@@ -33989,7 +33743,7 @@
   <p:timing>
     <p:tnLst>
       <p:par>
-        <p:cTn id="1" dur="indefinite" restart="never" nodeType="tmRoot"/>
+        <p:cTn xmlns:p14="http://schemas.microsoft.com/office/powerpoint/2010/main" id="1" dur="indefinite" restart="never" nodeType="tmRoot"/>
       </p:par>
     </p:tnLst>
   </p:timing>
@@ -34238,7 +33992,7 @@
   <p:timing>
     <p:tnLst>
       <p:par>
-        <p:cTn id="1" dur="indefinite" restart="never" nodeType="tmRoot"/>
+        <p:cTn xmlns:p14="http://schemas.microsoft.com/office/powerpoint/2010/main" id="1" dur="indefinite" restart="never" nodeType="tmRoot"/>
       </p:par>
     </p:tnLst>
   </p:timing>
@@ -34452,7 +34206,7 @@
   <p:timing>
     <p:tnLst>
       <p:par>
-        <p:cTn id="1" dur="indefinite" restart="never" nodeType="tmRoot"/>
+        <p:cTn xmlns:p14="http://schemas.microsoft.com/office/powerpoint/2010/main" id="1" dur="indefinite" restart="never" nodeType="tmRoot"/>
       </p:par>
     </p:tnLst>
   </p:timing>
@@ -34869,7 +34623,7 @@
   <p:timing>
     <p:tnLst>
       <p:par>
-        <p:cTn id="1" dur="indefinite" restart="never" nodeType="tmRoot"/>
+        <p:cTn xmlns:p14="http://schemas.microsoft.com/office/powerpoint/2010/main" id="1" dur="indefinite" restart="never" nodeType="tmRoot"/>
       </p:par>
     </p:tnLst>
   </p:timing>
@@ -35167,7 +34921,7 @@
   <p:timing>
     <p:tnLst>
       <p:par>
-        <p:cTn id="1" dur="indefinite" restart="never" nodeType="tmRoot"/>
+        <p:cTn xmlns:p14="http://schemas.microsoft.com/office/powerpoint/2010/main" id="1" dur="indefinite" restart="never" nodeType="tmRoot"/>
       </p:par>
     </p:tnLst>
   </p:timing>
@@ -35368,13 +35122,6 @@
   <p:clrMapOvr>
     <a:masterClrMapping/>
   </p:clrMapOvr>
-  <p:timing>
-    <p:tnLst>
-      <p:par>
-        <p:cTn id="1" dur="indefinite" restart="never" nodeType="tmRoot"/>
-      </p:par>
-    </p:tnLst>
-  </p:timing>
 </p:sld>
 </file>
 
@@ -35595,13 +35342,6 @@
   <p:clrMapOvr>
     <a:masterClrMapping/>
   </p:clrMapOvr>
-  <p:timing>
-    <p:tnLst>
-      <p:par>
-        <p:cTn id="1" dur="indefinite" restart="never" nodeType="tmRoot"/>
-      </p:par>
-    </p:tnLst>
-  </p:timing>
 </p:sld>
 </file>
 
@@ -35705,7 +35445,34 @@
           <a:p>
             <a:r>
               <a:rPr lang="en-US" dirty="0" smtClean="0"/>
-              <a:t>From inside RAVEN can access on the data object directly:	</a:t>
+              <a:t>From inside RAVEN can access on the data object directly</a:t>
+            </a:r>
+            <a:r>
+              <a:rPr lang="en-US" dirty="0" smtClean="0"/>
+              <a:t>:</a:t>
+            </a:r>
+          </a:p>
+          <a:p>
+            <a:endParaRPr lang="en-US" dirty="0" smtClean="0"/>
+          </a:p>
+          <a:p>
+            <a:r>
+              <a:rPr lang="en-US" dirty="0" smtClean="0"/>
+              <a:t>‘time’ should not be listed as input or output variables in the new </a:t>
+            </a:r>
+            <a:r>
+              <a:rPr lang="en-US" smtClean="0"/>
+              <a:t>dataobjects</a:t>
+            </a:r>
+            <a:endParaRPr lang="en-US" dirty="0"/>
+          </a:p>
+          <a:p>
+            <a:pPr marL="0" indent="0">
+              <a:buNone/>
+            </a:pPr>
+            <a:r>
+              <a:rPr lang="en-US" dirty="0" smtClean="0"/>
+              <a:t>	</a:t>
             </a:r>
           </a:p>
         </p:txBody>
@@ -35804,13 +35571,6 @@
   <p:clrMapOvr>
     <a:masterClrMapping/>
   </p:clrMapOvr>
-  <p:timing>
-    <p:tnLst>
-      <p:par>
-        <p:cTn id="1" dur="indefinite" restart="never" nodeType="tmRoot"/>
-      </p:par>
-    </p:tnLst>
-  </p:timing>
 </p:sld>
 </file>
 
@@ -36032,7 +35792,7 @@
   <p:timing>
     <p:tnLst>
       <p:par>
-        <p:cTn id="1" dur="indefinite" restart="never" nodeType="tmRoot"/>
+        <p:cTn xmlns:p14="http://schemas.microsoft.com/office/powerpoint/2010/main" id="1" dur="indefinite" restart="never" nodeType="tmRoot"/>
       </p:par>
     </p:tnLst>
   </p:timing>
@@ -36267,7 +36027,7 @@
   <p:timing>
     <p:tnLst>
       <p:par>
-        <p:cTn id="1" dur="indefinite" restart="never" nodeType="tmRoot"/>
+        <p:cTn xmlns:p14="http://schemas.microsoft.com/office/powerpoint/2010/main" id="1" dur="indefinite" restart="never" nodeType="tmRoot"/>
       </p:par>
     </p:tnLst>
   </p:timing>
@@ -36869,7 +36629,7 @@
   <p:timing>
     <p:tnLst>
       <p:par>
-        <p:cTn id="1" dur="indefinite" restart="never" nodeType="tmRoot"/>
+        <p:cTn xmlns:p14="http://schemas.microsoft.com/office/powerpoint/2010/main" id="1" dur="indefinite" restart="never" nodeType="tmRoot"/>
       </p:par>
     </p:tnLst>
   </p:timing>
@@ -37231,7 +36991,7 @@
   <p:timing>
     <p:tnLst>
       <p:par>
-        <p:cTn id="1" dur="indefinite" restart="never" nodeType="tmRoot"/>
+        <p:cTn xmlns:p14="http://schemas.microsoft.com/office/powerpoint/2010/main" id="1" dur="indefinite" restart="never" nodeType="tmRoot"/>
       </p:par>
     </p:tnLst>
   </p:timing>
@@ -37460,7 +37220,7 @@
   <p:timing>
     <p:tnLst>
       <p:par>
-        <p:cTn id="1" dur="indefinite" restart="never" nodeType="tmRoot">
+        <p:cTn xmlns:p14="http://schemas.microsoft.com/office/powerpoint/2010/main" id="1" dur="indefinite" restart="never" nodeType="tmRoot">
           <p:childTnLst>
             <p:seq concurrent="1" nextAc="seek">
               <p:cTn id="2" dur="indefinite" nodeType="mainSeq">
@@ -37885,7 +37645,7 @@
   <p:timing>
     <p:tnLst>
       <p:par>
-        <p:cTn id="1" dur="indefinite" restart="never" nodeType="tmRoot"/>
+        <p:cTn xmlns:p14="http://schemas.microsoft.com/office/powerpoint/2010/main" id="1" dur="indefinite" restart="never" nodeType="tmRoot"/>
       </p:par>
     </p:tnLst>
   </p:timing>
@@ -38211,7 +37971,7 @@
   <p:timing>
     <p:tnLst>
       <p:par>
-        <p:cTn id="1" dur="indefinite" restart="never" nodeType="tmRoot"/>
+        <p:cTn xmlns:p14="http://schemas.microsoft.com/office/powerpoint/2010/main" id="1" dur="indefinite" restart="never" nodeType="tmRoot"/>
       </p:par>
     </p:tnLst>
   </p:timing>
@@ -38623,7 +38383,7 @@
   <p:timing>
     <p:tnLst>
       <p:par>
-        <p:cTn id="1" dur="indefinite" restart="never" nodeType="tmRoot"/>
+        <p:cTn xmlns:p14="http://schemas.microsoft.com/office/powerpoint/2010/main" id="1" dur="indefinite" restart="never" nodeType="tmRoot"/>
       </p:par>
     </p:tnLst>
   </p:timing>

</xml_diff>

<commit_message>
convert code to use new data objects (#457)
* initial convert of code for new data object

* fix bugs in dataset and continue convert code for accepting the new data object

* additional converting

* clean up
</commit_message>
<xml_diff>
--- a/doc/misc/dataobject-rework.pptx
+++ b/doc/misc/dataobject-rework.pptx
@@ -157,7 +157,7 @@
   </p:defaultTextStyle>
   <p:extLst>
     <p:ext uri="{EFAFB233-063F-42B5-8137-9DF3F51BA10A}">
-      <p15:sldGuideLst xmlns:p15="http://schemas.microsoft.com/office/powerpoint/2012/main">
+      <p15:sldGuideLst xmlns:p15="http://schemas.microsoft.com/office/powerpoint/2012/main" xmlns="">
         <p15:guide id="1" orient="horz" pos="2160">
           <p15:clr>
             <a:srgbClr val="A4A3A4"/>
@@ -33723,252 +33723,6 @@
           </a:ln>
         </p:spPr>
       </p:pic>
-      <p:sp>
-        <p:nvSpPr>
-          <p:cNvPr id="5" name="Rectangle 5"/>
-          <p:cNvSpPr txBox="1">
-            <a:spLocks noChangeArrowheads="1"/>
-          </p:cNvSpPr>
-          <p:nvPr/>
-        </p:nvSpPr>
-        <p:spPr bwMode="auto">
-          <a:xfrm>
-            <a:off x="2678934" y="6324600"/>
-            <a:ext cx="5775325" cy="612775"/>
-          </a:xfrm>
-          <a:prstGeom prst="rect">
-            <a:avLst/>
-          </a:prstGeom>
-          <a:noFill/>
-          <a:ln w="9525">
-            <a:noFill/>
-            <a:miter lim="800000"/>
-            <a:headEnd/>
-            <a:tailEnd/>
-          </a:ln>
-          <a:effectLst/>
-        </p:spPr>
-        <p:txBody>
-          <a:bodyPr vert="horz" wrap="square" lIns="0" tIns="0" rIns="0" bIns="0" numCol="1" anchor="t" anchorCtr="0" compatLnSpc="1">
-            <a:prstTxWarp prst="textNoShape">
-              <a:avLst/>
-            </a:prstTxWarp>
-          </a:bodyPr>
-          <a:lstStyle>
-            <a:lvl1pPr marL="0" indent="0" algn="l" rtl="0" eaLnBrk="0" fontAlgn="base" hangingPunct="0">
-              <a:lnSpc>
-                <a:spcPct val="85000"/>
-              </a:lnSpc>
-              <a:spcBef>
-                <a:spcPct val="20000"/>
-              </a:spcBef>
-              <a:spcAft>
-                <a:spcPct val="0"/>
-              </a:spcAft>
-              <a:buClr>
-                <a:srgbClr val="FF6600"/>
-              </a:buClr>
-              <a:buFontTx/>
-              <a:buNone/>
-              <a:defRPr sz="2000" b="1">
-                <a:solidFill>
-                  <a:schemeClr val="tx1"/>
-                </a:solidFill>
-                <a:latin typeface="+mn-lt"/>
-                <a:ea typeface="+mn-ea"/>
-                <a:cs typeface="+mn-cs"/>
-              </a:defRPr>
-            </a:lvl1pPr>
-            <a:lvl2pPr marL="684213" indent="-227013" algn="l" rtl="0" eaLnBrk="0" fontAlgn="base" hangingPunct="0">
-              <a:lnSpc>
-                <a:spcPct val="85000"/>
-              </a:lnSpc>
-              <a:spcBef>
-                <a:spcPct val="20000"/>
-              </a:spcBef>
-              <a:spcAft>
-                <a:spcPct val="0"/>
-              </a:spcAft>
-              <a:buClr>
-                <a:srgbClr val="FF6600"/>
-              </a:buClr>
-              <a:buFont typeface="Times New Roman" pitchFamily="18" charset="0"/>
-              <a:buChar char="–"/>
-              <a:defRPr sz="2000">
-                <a:solidFill>
-                  <a:schemeClr val="tx1"/>
-                </a:solidFill>
-                <a:latin typeface="+mn-lt"/>
-              </a:defRPr>
-            </a:lvl2pPr>
-            <a:lvl3pPr marL="1143000" indent="-228600" algn="l" rtl="0" eaLnBrk="0" fontAlgn="base" hangingPunct="0">
-              <a:lnSpc>
-                <a:spcPct val="85000"/>
-              </a:lnSpc>
-              <a:spcBef>
-                <a:spcPct val="20000"/>
-              </a:spcBef>
-              <a:spcAft>
-                <a:spcPct val="0"/>
-              </a:spcAft>
-              <a:buClr>
-                <a:srgbClr val="FF6600"/>
-              </a:buClr>
-              <a:buChar char="•"/>
-              <a:defRPr sz="2000">
-                <a:solidFill>
-                  <a:schemeClr val="tx1"/>
-                </a:solidFill>
-                <a:latin typeface="+mn-lt"/>
-              </a:defRPr>
-            </a:lvl3pPr>
-            <a:lvl4pPr marL="1600200" indent="-228600" algn="l" rtl="0" eaLnBrk="0" fontAlgn="base" hangingPunct="0">
-              <a:lnSpc>
-                <a:spcPct val="85000"/>
-              </a:lnSpc>
-              <a:spcBef>
-                <a:spcPct val="20000"/>
-              </a:spcBef>
-              <a:spcAft>
-                <a:spcPct val="0"/>
-              </a:spcAft>
-              <a:buClr>
-                <a:srgbClr val="FF6600"/>
-              </a:buClr>
-              <a:buFont typeface="Times New Roman" pitchFamily="18" charset="0"/>
-              <a:buChar char="–"/>
-              <a:defRPr sz="2000">
-                <a:solidFill>
-                  <a:schemeClr val="tx1"/>
-                </a:solidFill>
-                <a:latin typeface="+mn-lt"/>
-              </a:defRPr>
-            </a:lvl4pPr>
-            <a:lvl5pPr marL="2057400" indent="-228600" algn="l" rtl="0" eaLnBrk="0" fontAlgn="base" hangingPunct="0">
-              <a:lnSpc>
-                <a:spcPct val="85000"/>
-              </a:lnSpc>
-              <a:spcBef>
-                <a:spcPct val="20000"/>
-              </a:spcBef>
-              <a:spcAft>
-                <a:spcPct val="0"/>
-              </a:spcAft>
-              <a:buClr>
-                <a:srgbClr val="FF6600"/>
-              </a:buClr>
-              <a:buChar char="•"/>
-              <a:defRPr sz="2000">
-                <a:solidFill>
-                  <a:schemeClr val="tx1"/>
-                </a:solidFill>
-                <a:latin typeface="+mn-lt"/>
-              </a:defRPr>
-            </a:lvl5pPr>
-            <a:lvl6pPr marL="2514600" indent="-228600" algn="l" rtl="0" eaLnBrk="0" fontAlgn="base" hangingPunct="0">
-              <a:lnSpc>
-                <a:spcPct val="85000"/>
-              </a:lnSpc>
-              <a:spcBef>
-                <a:spcPct val="20000"/>
-              </a:spcBef>
-              <a:spcAft>
-                <a:spcPct val="0"/>
-              </a:spcAft>
-              <a:buClr>
-                <a:srgbClr val="FF6600"/>
-              </a:buClr>
-              <a:buChar char="•"/>
-              <a:defRPr sz="2000">
-                <a:solidFill>
-                  <a:schemeClr val="tx1"/>
-                </a:solidFill>
-                <a:latin typeface="+mn-lt"/>
-              </a:defRPr>
-            </a:lvl6pPr>
-            <a:lvl7pPr marL="2971800" indent="-228600" algn="l" rtl="0" eaLnBrk="0" fontAlgn="base" hangingPunct="0">
-              <a:lnSpc>
-                <a:spcPct val="85000"/>
-              </a:lnSpc>
-              <a:spcBef>
-                <a:spcPct val="20000"/>
-              </a:spcBef>
-              <a:spcAft>
-                <a:spcPct val="0"/>
-              </a:spcAft>
-              <a:buClr>
-                <a:srgbClr val="FF6600"/>
-              </a:buClr>
-              <a:buChar char="•"/>
-              <a:defRPr sz="2000">
-                <a:solidFill>
-                  <a:schemeClr val="tx1"/>
-                </a:solidFill>
-                <a:latin typeface="+mn-lt"/>
-              </a:defRPr>
-            </a:lvl7pPr>
-            <a:lvl8pPr marL="3429000" indent="-228600" algn="l" rtl="0" eaLnBrk="0" fontAlgn="base" hangingPunct="0">
-              <a:lnSpc>
-                <a:spcPct val="85000"/>
-              </a:lnSpc>
-              <a:spcBef>
-                <a:spcPct val="20000"/>
-              </a:spcBef>
-              <a:spcAft>
-                <a:spcPct val="0"/>
-              </a:spcAft>
-              <a:buClr>
-                <a:srgbClr val="FF6600"/>
-              </a:buClr>
-              <a:buChar char="•"/>
-              <a:defRPr sz="2000">
-                <a:solidFill>
-                  <a:schemeClr val="tx1"/>
-                </a:solidFill>
-                <a:latin typeface="+mn-lt"/>
-              </a:defRPr>
-            </a:lvl8pPr>
-            <a:lvl9pPr marL="3886200" indent="-228600" algn="l" rtl="0" eaLnBrk="0" fontAlgn="base" hangingPunct="0">
-              <a:lnSpc>
-                <a:spcPct val="85000"/>
-              </a:lnSpc>
-              <a:spcBef>
-                <a:spcPct val="20000"/>
-              </a:spcBef>
-              <a:spcAft>
-                <a:spcPct val="0"/>
-              </a:spcAft>
-              <a:buClr>
-                <a:srgbClr val="FF6600"/>
-              </a:buClr>
-              <a:buChar char="•"/>
-              <a:defRPr sz="2000">
-                <a:solidFill>
-                  <a:schemeClr val="tx1"/>
-                </a:solidFill>
-                <a:latin typeface="+mn-lt"/>
-              </a:defRPr>
-            </a:lvl9pPr>
-          </a:lstStyle>
-          <a:p>
-            <a:r>
-              <a:rPr lang="en-US" b="0" kern="0" dirty="0" smtClean="0"/>
-              <a:t>Find these slides in raven/doc/</a:t>
-            </a:r>
-            <a:r>
-              <a:rPr lang="en-US" b="0" kern="0" dirty="0" err="1" smtClean="0"/>
-              <a:t>misc</a:t>
-            </a:r>
-            <a:endParaRPr lang="en-US" b="0" kern="0" dirty="0" smtClean="0"/>
-          </a:p>
-          <a:p>
-            <a:endParaRPr lang="en-US" b="0" kern="0" dirty="0" smtClean="0"/>
-          </a:p>
-          <a:p>
-            <a:endParaRPr lang="en-US" b="0" kern="0" dirty="0"/>
-          </a:p>
-        </p:txBody>
-      </p:sp>
     </p:spTree>
   </p:cSld>
   <p:clrMapOvr>
@@ -33989,7 +33743,7 @@
   <p:timing>
     <p:tnLst>
       <p:par>
-        <p:cTn id="1" dur="indefinite" restart="never" nodeType="tmRoot"/>
+        <p:cTn xmlns:p14="http://schemas.microsoft.com/office/powerpoint/2010/main" id="1" dur="indefinite" restart="never" nodeType="tmRoot"/>
       </p:par>
     </p:tnLst>
   </p:timing>
@@ -34238,7 +33992,7 @@
   <p:timing>
     <p:tnLst>
       <p:par>
-        <p:cTn id="1" dur="indefinite" restart="never" nodeType="tmRoot"/>
+        <p:cTn xmlns:p14="http://schemas.microsoft.com/office/powerpoint/2010/main" id="1" dur="indefinite" restart="never" nodeType="tmRoot"/>
       </p:par>
     </p:tnLst>
   </p:timing>
@@ -34452,7 +34206,7 @@
   <p:timing>
     <p:tnLst>
       <p:par>
-        <p:cTn id="1" dur="indefinite" restart="never" nodeType="tmRoot"/>
+        <p:cTn xmlns:p14="http://schemas.microsoft.com/office/powerpoint/2010/main" id="1" dur="indefinite" restart="never" nodeType="tmRoot"/>
       </p:par>
     </p:tnLst>
   </p:timing>
@@ -34869,7 +34623,7 @@
   <p:timing>
     <p:tnLst>
       <p:par>
-        <p:cTn id="1" dur="indefinite" restart="never" nodeType="tmRoot"/>
+        <p:cTn xmlns:p14="http://schemas.microsoft.com/office/powerpoint/2010/main" id="1" dur="indefinite" restart="never" nodeType="tmRoot"/>
       </p:par>
     </p:tnLst>
   </p:timing>
@@ -35167,7 +34921,7 @@
   <p:timing>
     <p:tnLst>
       <p:par>
-        <p:cTn id="1" dur="indefinite" restart="never" nodeType="tmRoot"/>
+        <p:cTn xmlns:p14="http://schemas.microsoft.com/office/powerpoint/2010/main" id="1" dur="indefinite" restart="never" nodeType="tmRoot"/>
       </p:par>
     </p:tnLst>
   </p:timing>
@@ -35368,13 +35122,6 @@
   <p:clrMapOvr>
     <a:masterClrMapping/>
   </p:clrMapOvr>
-  <p:timing>
-    <p:tnLst>
-      <p:par>
-        <p:cTn id="1" dur="indefinite" restart="never" nodeType="tmRoot"/>
-      </p:par>
-    </p:tnLst>
-  </p:timing>
 </p:sld>
 </file>
 
@@ -35595,13 +35342,6 @@
   <p:clrMapOvr>
     <a:masterClrMapping/>
   </p:clrMapOvr>
-  <p:timing>
-    <p:tnLst>
-      <p:par>
-        <p:cTn id="1" dur="indefinite" restart="never" nodeType="tmRoot"/>
-      </p:par>
-    </p:tnLst>
-  </p:timing>
 </p:sld>
 </file>
 
@@ -35705,7 +35445,34 @@
           <a:p>
             <a:r>
               <a:rPr lang="en-US" dirty="0" smtClean="0"/>
-              <a:t>From inside RAVEN can access on the data object directly:	</a:t>
+              <a:t>From inside RAVEN can access on the data object directly</a:t>
+            </a:r>
+            <a:r>
+              <a:rPr lang="en-US" dirty="0" smtClean="0"/>
+              <a:t>:</a:t>
+            </a:r>
+          </a:p>
+          <a:p>
+            <a:endParaRPr lang="en-US" dirty="0" smtClean="0"/>
+          </a:p>
+          <a:p>
+            <a:r>
+              <a:rPr lang="en-US" dirty="0" smtClean="0"/>
+              <a:t>‘time’ should not be listed as input or output variables in the new </a:t>
+            </a:r>
+            <a:r>
+              <a:rPr lang="en-US" smtClean="0"/>
+              <a:t>dataobjects</a:t>
+            </a:r>
+            <a:endParaRPr lang="en-US" dirty="0"/>
+          </a:p>
+          <a:p>
+            <a:pPr marL="0" indent="0">
+              <a:buNone/>
+            </a:pPr>
+            <a:r>
+              <a:rPr lang="en-US" dirty="0" smtClean="0"/>
+              <a:t>	</a:t>
             </a:r>
           </a:p>
         </p:txBody>
@@ -35804,13 +35571,6 @@
   <p:clrMapOvr>
     <a:masterClrMapping/>
   </p:clrMapOvr>
-  <p:timing>
-    <p:tnLst>
-      <p:par>
-        <p:cTn id="1" dur="indefinite" restart="never" nodeType="tmRoot"/>
-      </p:par>
-    </p:tnLst>
-  </p:timing>
 </p:sld>
 </file>
 
@@ -36032,7 +35792,7 @@
   <p:timing>
     <p:tnLst>
       <p:par>
-        <p:cTn id="1" dur="indefinite" restart="never" nodeType="tmRoot"/>
+        <p:cTn xmlns:p14="http://schemas.microsoft.com/office/powerpoint/2010/main" id="1" dur="indefinite" restart="never" nodeType="tmRoot"/>
       </p:par>
     </p:tnLst>
   </p:timing>
@@ -36267,7 +36027,7 @@
   <p:timing>
     <p:tnLst>
       <p:par>
-        <p:cTn id="1" dur="indefinite" restart="never" nodeType="tmRoot"/>
+        <p:cTn xmlns:p14="http://schemas.microsoft.com/office/powerpoint/2010/main" id="1" dur="indefinite" restart="never" nodeType="tmRoot"/>
       </p:par>
     </p:tnLst>
   </p:timing>
@@ -36869,7 +36629,7 @@
   <p:timing>
     <p:tnLst>
       <p:par>
-        <p:cTn id="1" dur="indefinite" restart="never" nodeType="tmRoot"/>
+        <p:cTn xmlns:p14="http://schemas.microsoft.com/office/powerpoint/2010/main" id="1" dur="indefinite" restart="never" nodeType="tmRoot"/>
       </p:par>
     </p:tnLst>
   </p:timing>
@@ -37231,7 +36991,7 @@
   <p:timing>
     <p:tnLst>
       <p:par>
-        <p:cTn id="1" dur="indefinite" restart="never" nodeType="tmRoot"/>
+        <p:cTn xmlns:p14="http://schemas.microsoft.com/office/powerpoint/2010/main" id="1" dur="indefinite" restart="never" nodeType="tmRoot"/>
       </p:par>
     </p:tnLst>
   </p:timing>
@@ -37460,7 +37220,7 @@
   <p:timing>
     <p:tnLst>
       <p:par>
-        <p:cTn id="1" dur="indefinite" restart="never" nodeType="tmRoot">
+        <p:cTn xmlns:p14="http://schemas.microsoft.com/office/powerpoint/2010/main" id="1" dur="indefinite" restart="never" nodeType="tmRoot">
           <p:childTnLst>
             <p:seq concurrent="1" nextAc="seek">
               <p:cTn id="2" dur="indefinite" nodeType="mainSeq">
@@ -37885,7 +37645,7 @@
   <p:timing>
     <p:tnLst>
       <p:par>
-        <p:cTn id="1" dur="indefinite" restart="never" nodeType="tmRoot"/>
+        <p:cTn xmlns:p14="http://schemas.microsoft.com/office/powerpoint/2010/main" id="1" dur="indefinite" restart="never" nodeType="tmRoot"/>
       </p:par>
     </p:tnLst>
   </p:timing>
@@ -38211,7 +37971,7 @@
   <p:timing>
     <p:tnLst>
       <p:par>
-        <p:cTn id="1" dur="indefinite" restart="never" nodeType="tmRoot"/>
+        <p:cTn xmlns:p14="http://schemas.microsoft.com/office/powerpoint/2010/main" id="1" dur="indefinite" restart="never" nodeType="tmRoot"/>
       </p:par>
     </p:tnLst>
   </p:timing>
@@ -38623,7 +38383,7 @@
   <p:timing>
     <p:tnLst>
       <p:par>
-        <p:cTn id="1" dur="indefinite" restart="never" nodeType="tmRoot"/>
+        <p:cTn xmlns:p14="http://schemas.microsoft.com/office/powerpoint/2010/main" id="1" dur="indefinite" restart="never" nodeType="tmRoot"/>
       </p:par>
     </p:tnLst>
   </p:timing>

</xml_diff>

<commit_message>
pre-merge review comments addressed for modules in framework/DataObjects, with the exception of merging DataObject into DataSet
</commit_message>
<xml_diff>
--- a/doc/misc/dataobject-rework.pptx
+++ b/doc/misc/dataobject-rework.pptx
@@ -5,10 +5,10 @@
     <p:sldMasterId id="2147483648" r:id="rId1"/>
   </p:sldMasterIdLst>
   <p:notesMasterIdLst>
-    <p:notesMasterId r:id="rId18"/>
+    <p:notesMasterId r:id="rId19"/>
   </p:notesMasterIdLst>
   <p:handoutMasterIdLst>
-    <p:handoutMasterId r:id="rId19"/>
+    <p:handoutMasterId r:id="rId20"/>
   </p:handoutMasterIdLst>
   <p:sldIdLst>
     <p:sldId id="272" r:id="rId2"/>
@@ -21,12 +21,13 @@
     <p:sldId id="304" r:id="rId9"/>
     <p:sldId id="305" r:id="rId10"/>
     <p:sldId id="306" r:id="rId11"/>
-    <p:sldId id="307" r:id="rId12"/>
-    <p:sldId id="308" r:id="rId13"/>
-    <p:sldId id="310" r:id="rId14"/>
-    <p:sldId id="311" r:id="rId15"/>
-    <p:sldId id="312" r:id="rId16"/>
-    <p:sldId id="313" r:id="rId17"/>
+    <p:sldId id="314" r:id="rId12"/>
+    <p:sldId id="307" r:id="rId13"/>
+    <p:sldId id="308" r:id="rId14"/>
+    <p:sldId id="310" r:id="rId15"/>
+    <p:sldId id="311" r:id="rId16"/>
+    <p:sldId id="312" r:id="rId17"/>
+    <p:sldId id="313" r:id="rId18"/>
   </p:sldIdLst>
   <p:sldSz cx="9144000" cy="6858000" type="screen4x3"/>
   <p:notesSz cx="7010400" cy="9296400"/>
@@ -157,7 +158,7 @@
   </p:defaultTextStyle>
   <p:extLst>
     <p:ext uri="{EFAFB233-063F-42B5-8137-9DF3F51BA10A}">
-      <p15:sldGuideLst xmlns:p15="http://schemas.microsoft.com/office/powerpoint/2012/main" xmlns="">
+      <p15:sldGuideLst xmlns:p15="http://schemas.microsoft.com/office/powerpoint/2012/main">
         <p15:guide id="1" orient="horz" pos="2160">
           <p15:clr>
             <a:srgbClr val="A4A3A4"/>
@@ -480,35 +481,35 @@
           <a:p>
             <a:pPr lvl="0"/>
             <a:r>
-              <a:rPr lang="en-US" smtClean="0"/>
+              <a:rPr lang="en-US"/>
               <a:t>Click to edit Master text styles</a:t>
             </a:r>
           </a:p>
           <a:p>
             <a:pPr lvl="1"/>
             <a:r>
-              <a:rPr lang="en-US" smtClean="0"/>
+              <a:rPr lang="en-US"/>
               <a:t>Second level</a:t>
             </a:r>
           </a:p>
           <a:p>
             <a:pPr lvl="2"/>
             <a:r>
-              <a:rPr lang="en-US" smtClean="0"/>
+              <a:rPr lang="en-US"/>
               <a:t>Third level</a:t>
             </a:r>
           </a:p>
           <a:p>
             <a:pPr lvl="3"/>
             <a:r>
-              <a:rPr lang="en-US" smtClean="0"/>
+              <a:rPr lang="en-US"/>
               <a:t>Fourth level</a:t>
             </a:r>
           </a:p>
           <a:p>
             <a:pPr lvl="4"/>
             <a:r>
-              <a:rPr lang="en-US" smtClean="0"/>
+              <a:rPr lang="en-US"/>
               <a:t>Fifth level</a:t>
             </a:r>
           </a:p>
@@ -16997,10 +16998,9 @@
           <a:lstStyle/>
           <a:p>
             <a:r>
-              <a:rPr lang="en-US" smtClean="0"/>
+              <a:rPr lang="en-US"/>
               <a:t>Click to edit Master title style</a:t>
             </a:r>
-            <a:endParaRPr lang="en-US"/>
           </a:p>
         </p:txBody>
       </p:sp>
@@ -17021,38 +17021,37 @@
           <a:p>
             <a:pPr lvl="0"/>
             <a:r>
-              <a:rPr lang="en-US" smtClean="0"/>
+              <a:rPr lang="en-US"/>
               <a:t>Click to edit Master text styles</a:t>
             </a:r>
           </a:p>
           <a:p>
             <a:pPr lvl="1"/>
             <a:r>
-              <a:rPr lang="en-US" smtClean="0"/>
+              <a:rPr lang="en-US"/>
               <a:t>Second level</a:t>
             </a:r>
           </a:p>
           <a:p>
             <a:pPr lvl="2"/>
             <a:r>
-              <a:rPr lang="en-US" smtClean="0"/>
+              <a:rPr lang="en-US"/>
               <a:t>Third level</a:t>
             </a:r>
           </a:p>
           <a:p>
             <a:pPr lvl="3"/>
             <a:r>
-              <a:rPr lang="en-US" smtClean="0"/>
+              <a:rPr lang="en-US"/>
               <a:t>Fourth level</a:t>
             </a:r>
           </a:p>
           <a:p>
             <a:pPr lvl="4"/>
             <a:r>
-              <a:rPr lang="en-US" smtClean="0"/>
+              <a:rPr lang="en-US"/>
               <a:t>Fifth level</a:t>
             </a:r>
-            <a:endParaRPr lang="en-US"/>
           </a:p>
         </p:txBody>
       </p:sp>
@@ -17153,10 +17152,9 @@
           <a:lstStyle/>
           <a:p>
             <a:r>
-              <a:rPr lang="en-US" smtClean="0"/>
+              <a:rPr lang="en-US"/>
               <a:t>Click to edit Master title style</a:t>
             </a:r>
-            <a:endParaRPr lang="en-US"/>
           </a:p>
         </p:txBody>
       </p:sp>
@@ -17182,38 +17180,37 @@
           <a:p>
             <a:pPr lvl="0"/>
             <a:r>
-              <a:rPr lang="en-US" smtClean="0"/>
+              <a:rPr lang="en-US"/>
               <a:t>Click to edit Master text styles</a:t>
             </a:r>
           </a:p>
           <a:p>
             <a:pPr lvl="1"/>
             <a:r>
-              <a:rPr lang="en-US" smtClean="0"/>
+              <a:rPr lang="en-US"/>
               <a:t>Second level</a:t>
             </a:r>
           </a:p>
           <a:p>
             <a:pPr lvl="2"/>
             <a:r>
-              <a:rPr lang="en-US" smtClean="0"/>
+              <a:rPr lang="en-US"/>
               <a:t>Third level</a:t>
             </a:r>
           </a:p>
           <a:p>
             <a:pPr lvl="3"/>
             <a:r>
-              <a:rPr lang="en-US" smtClean="0"/>
+              <a:rPr lang="en-US"/>
               <a:t>Fourth level</a:t>
             </a:r>
           </a:p>
           <a:p>
             <a:pPr lvl="4"/>
             <a:r>
-              <a:rPr lang="en-US" smtClean="0"/>
+              <a:rPr lang="en-US"/>
               <a:t>Fifth level</a:t>
             </a:r>
-            <a:endParaRPr lang="en-US"/>
           </a:p>
         </p:txBody>
       </p:sp>
@@ -17309,10 +17306,9 @@
           <a:lstStyle/>
           <a:p>
             <a:r>
-              <a:rPr lang="en-US" smtClean="0"/>
+              <a:rPr lang="en-US"/>
               <a:t>Click to edit Master title style</a:t>
             </a:r>
-            <a:endParaRPr lang="en-US"/>
           </a:p>
         </p:txBody>
       </p:sp>
@@ -17333,38 +17329,37 @@
           <a:p>
             <a:pPr lvl="0"/>
             <a:r>
-              <a:rPr lang="en-US" smtClean="0"/>
+              <a:rPr lang="en-US"/>
               <a:t>Click to edit Master text styles</a:t>
             </a:r>
           </a:p>
           <a:p>
             <a:pPr lvl="1"/>
             <a:r>
-              <a:rPr lang="en-US" smtClean="0"/>
+              <a:rPr lang="en-US"/>
               <a:t>Second level</a:t>
             </a:r>
           </a:p>
           <a:p>
             <a:pPr lvl="2"/>
             <a:r>
-              <a:rPr lang="en-US" smtClean="0"/>
+              <a:rPr lang="en-US"/>
               <a:t>Third level</a:t>
             </a:r>
           </a:p>
           <a:p>
             <a:pPr lvl="3"/>
             <a:r>
-              <a:rPr lang="en-US" smtClean="0"/>
+              <a:rPr lang="en-US"/>
               <a:t>Fourth level</a:t>
             </a:r>
           </a:p>
           <a:p>
             <a:pPr lvl="4"/>
             <a:r>
-              <a:rPr lang="en-US" smtClean="0"/>
+              <a:rPr lang="en-US"/>
               <a:t>Fifth level</a:t>
             </a:r>
-            <a:endParaRPr lang="en-US"/>
           </a:p>
         </p:txBody>
       </p:sp>
@@ -17469,10 +17464,9 @@
           </a:lstStyle>
           <a:p>
             <a:r>
-              <a:rPr lang="en-US" smtClean="0"/>
+              <a:rPr lang="en-US"/>
               <a:t>Click to edit Master title style</a:t>
             </a:r>
-            <a:endParaRPr lang="en-US"/>
           </a:p>
         </p:txBody>
       </p:sp>
@@ -17535,7 +17529,7 @@
           <a:p>
             <a:pPr lvl="0"/>
             <a:r>
-              <a:rPr lang="en-US" smtClean="0"/>
+              <a:rPr lang="en-US"/>
               <a:t>Click to edit Master text styles</a:t>
             </a:r>
           </a:p>
@@ -17633,10 +17627,9 @@
           <a:lstStyle/>
           <a:p>
             <a:r>
-              <a:rPr lang="en-US" smtClean="0"/>
+              <a:rPr lang="en-US"/>
               <a:t>Click to edit Master title style</a:t>
             </a:r>
-            <a:endParaRPr lang="en-US"/>
           </a:p>
         </p:txBody>
       </p:sp>
@@ -17690,38 +17683,37 @@
           <a:p>
             <a:pPr lvl="0"/>
             <a:r>
-              <a:rPr lang="en-US" smtClean="0"/>
+              <a:rPr lang="en-US"/>
               <a:t>Click to edit Master text styles</a:t>
             </a:r>
           </a:p>
           <a:p>
             <a:pPr lvl="1"/>
             <a:r>
-              <a:rPr lang="en-US" smtClean="0"/>
+              <a:rPr lang="en-US"/>
               <a:t>Second level</a:t>
             </a:r>
           </a:p>
           <a:p>
             <a:pPr lvl="2"/>
             <a:r>
-              <a:rPr lang="en-US" smtClean="0"/>
+              <a:rPr lang="en-US"/>
               <a:t>Third level</a:t>
             </a:r>
           </a:p>
           <a:p>
             <a:pPr lvl="3"/>
             <a:r>
-              <a:rPr lang="en-US" smtClean="0"/>
+              <a:rPr lang="en-US"/>
               <a:t>Fourth level</a:t>
             </a:r>
           </a:p>
           <a:p>
             <a:pPr lvl="4"/>
             <a:r>
-              <a:rPr lang="en-US" smtClean="0"/>
+              <a:rPr lang="en-US"/>
               <a:t>Fifth level</a:t>
             </a:r>
-            <a:endParaRPr lang="en-US"/>
           </a:p>
         </p:txBody>
       </p:sp>
@@ -17775,38 +17767,37 @@
           <a:p>
             <a:pPr lvl="0"/>
             <a:r>
-              <a:rPr lang="en-US" smtClean="0"/>
+              <a:rPr lang="en-US"/>
               <a:t>Click to edit Master text styles</a:t>
             </a:r>
           </a:p>
           <a:p>
             <a:pPr lvl="1"/>
             <a:r>
-              <a:rPr lang="en-US" smtClean="0"/>
+              <a:rPr lang="en-US"/>
               <a:t>Second level</a:t>
             </a:r>
           </a:p>
           <a:p>
             <a:pPr lvl="2"/>
             <a:r>
-              <a:rPr lang="en-US" smtClean="0"/>
+              <a:rPr lang="en-US"/>
               <a:t>Third level</a:t>
             </a:r>
           </a:p>
           <a:p>
             <a:pPr lvl="3"/>
             <a:r>
-              <a:rPr lang="en-US" smtClean="0"/>
+              <a:rPr lang="en-US"/>
               <a:t>Fourth level</a:t>
             </a:r>
           </a:p>
           <a:p>
             <a:pPr lvl="4"/>
             <a:r>
-              <a:rPr lang="en-US" smtClean="0"/>
+              <a:rPr lang="en-US"/>
               <a:t>Fifth level</a:t>
             </a:r>
-            <a:endParaRPr lang="en-US"/>
           </a:p>
         </p:txBody>
       </p:sp>
@@ -17911,10 +17902,9 @@
           </a:lstStyle>
           <a:p>
             <a:r>
-              <a:rPr lang="en-US" smtClean="0"/>
+              <a:rPr lang="en-US"/>
               <a:t>Click to edit Master title style</a:t>
             </a:r>
-            <a:endParaRPr lang="en-US"/>
           </a:p>
         </p:txBody>
       </p:sp>
@@ -17977,7 +17967,7 @@
           <a:p>
             <a:pPr lvl="0"/>
             <a:r>
-              <a:rPr lang="en-US" smtClean="0"/>
+              <a:rPr lang="en-US"/>
               <a:t>Click to edit Master text styles</a:t>
             </a:r>
           </a:p>
@@ -18033,38 +18023,37 @@
           <a:p>
             <a:pPr lvl="0"/>
             <a:r>
-              <a:rPr lang="en-US" smtClean="0"/>
+              <a:rPr lang="en-US"/>
               <a:t>Click to edit Master text styles</a:t>
             </a:r>
           </a:p>
           <a:p>
             <a:pPr lvl="1"/>
             <a:r>
-              <a:rPr lang="en-US" smtClean="0"/>
+              <a:rPr lang="en-US"/>
               <a:t>Second level</a:t>
             </a:r>
           </a:p>
           <a:p>
             <a:pPr lvl="2"/>
             <a:r>
-              <a:rPr lang="en-US" smtClean="0"/>
+              <a:rPr lang="en-US"/>
               <a:t>Third level</a:t>
             </a:r>
           </a:p>
           <a:p>
             <a:pPr lvl="3"/>
             <a:r>
-              <a:rPr lang="en-US" smtClean="0"/>
+              <a:rPr lang="en-US"/>
               <a:t>Fourth level</a:t>
             </a:r>
           </a:p>
           <a:p>
             <a:pPr lvl="4"/>
             <a:r>
-              <a:rPr lang="en-US" smtClean="0"/>
+              <a:rPr lang="en-US"/>
               <a:t>Fifth level</a:t>
             </a:r>
-            <a:endParaRPr lang="en-US"/>
           </a:p>
         </p:txBody>
       </p:sp>
@@ -18127,7 +18116,7 @@
           <a:p>
             <a:pPr lvl="0"/>
             <a:r>
-              <a:rPr lang="en-US" smtClean="0"/>
+              <a:rPr lang="en-US"/>
               <a:t>Click to edit Master text styles</a:t>
             </a:r>
           </a:p>
@@ -18183,38 +18172,37 @@
           <a:p>
             <a:pPr lvl="0"/>
             <a:r>
-              <a:rPr lang="en-US" smtClean="0"/>
+              <a:rPr lang="en-US"/>
               <a:t>Click to edit Master text styles</a:t>
             </a:r>
           </a:p>
           <a:p>
             <a:pPr lvl="1"/>
             <a:r>
-              <a:rPr lang="en-US" smtClean="0"/>
+              <a:rPr lang="en-US"/>
               <a:t>Second level</a:t>
             </a:r>
           </a:p>
           <a:p>
             <a:pPr lvl="2"/>
             <a:r>
-              <a:rPr lang="en-US" smtClean="0"/>
+              <a:rPr lang="en-US"/>
               <a:t>Third level</a:t>
             </a:r>
           </a:p>
           <a:p>
             <a:pPr lvl="3"/>
             <a:r>
-              <a:rPr lang="en-US" smtClean="0"/>
+              <a:rPr lang="en-US"/>
               <a:t>Fourth level</a:t>
             </a:r>
           </a:p>
           <a:p>
             <a:pPr lvl="4"/>
             <a:r>
-              <a:rPr lang="en-US" smtClean="0"/>
+              <a:rPr lang="en-US"/>
               <a:t>Fifth level</a:t>
             </a:r>
-            <a:endParaRPr lang="en-US"/>
           </a:p>
         </p:txBody>
       </p:sp>
@@ -18310,10 +18298,9 @@
           <a:lstStyle/>
           <a:p>
             <a:r>
-              <a:rPr lang="en-US" smtClean="0"/>
+              <a:rPr lang="en-US"/>
               <a:t>Click to edit Master title style</a:t>
             </a:r>
-            <a:endParaRPr lang="en-US"/>
           </a:p>
         </p:txBody>
       </p:sp>
@@ -18494,10 +18481,9 @@
           </a:lstStyle>
           <a:p>
             <a:r>
-              <a:rPr lang="en-US" smtClean="0"/>
+              <a:rPr lang="en-US"/>
               <a:t>Click to edit Master title style</a:t>
             </a:r>
-            <a:endParaRPr lang="en-US"/>
           </a:p>
         </p:txBody>
       </p:sp>
@@ -18551,38 +18537,37 @@
           <a:p>
             <a:pPr lvl="0"/>
             <a:r>
-              <a:rPr lang="en-US" smtClean="0"/>
+              <a:rPr lang="en-US"/>
               <a:t>Click to edit Master text styles</a:t>
             </a:r>
           </a:p>
           <a:p>
             <a:pPr lvl="1"/>
             <a:r>
-              <a:rPr lang="en-US" smtClean="0"/>
+              <a:rPr lang="en-US"/>
               <a:t>Second level</a:t>
             </a:r>
           </a:p>
           <a:p>
             <a:pPr lvl="2"/>
             <a:r>
-              <a:rPr lang="en-US" smtClean="0"/>
+              <a:rPr lang="en-US"/>
               <a:t>Third level</a:t>
             </a:r>
           </a:p>
           <a:p>
             <a:pPr lvl="3"/>
             <a:r>
-              <a:rPr lang="en-US" smtClean="0"/>
+              <a:rPr lang="en-US"/>
               <a:t>Fourth level</a:t>
             </a:r>
           </a:p>
           <a:p>
             <a:pPr lvl="4"/>
             <a:r>
-              <a:rPr lang="en-US" smtClean="0"/>
+              <a:rPr lang="en-US"/>
               <a:t>Fifth level</a:t>
             </a:r>
-            <a:endParaRPr lang="en-US"/>
           </a:p>
         </p:txBody>
       </p:sp>
@@ -18645,7 +18630,7 @@
           <a:p>
             <a:pPr lvl="0"/>
             <a:r>
-              <a:rPr lang="en-US" smtClean="0"/>
+              <a:rPr lang="en-US"/>
               <a:t>Click to edit Master text styles</a:t>
             </a:r>
           </a:p>
@@ -18752,10 +18737,9 @@
           </a:lstStyle>
           <a:p>
             <a:r>
-              <a:rPr lang="en-US" smtClean="0"/>
+              <a:rPr lang="en-US"/>
               <a:t>Click to edit Master title style</a:t>
             </a:r>
-            <a:endParaRPr lang="en-US"/>
           </a:p>
         </p:txBody>
       </p:sp>
@@ -18879,7 +18863,7 @@
           <a:p>
             <a:pPr lvl="0"/>
             <a:r>
-              <a:rPr lang="en-US" smtClean="0"/>
+              <a:rPr lang="en-US"/>
               <a:t>Click to edit Master text styles</a:t>
             </a:r>
           </a:p>
@@ -19011,7 +18995,7 @@
           <a:p>
             <a:pPr lvl="0"/>
             <a:r>
-              <a:rPr lang="en-US" smtClean="0"/>
+              <a:rPr lang="en-US"/>
               <a:t>Click to edit Master title style</a:t>
             </a:r>
           </a:p>
@@ -19054,35 +19038,35 @@
           <a:p>
             <a:pPr lvl="0"/>
             <a:r>
-              <a:rPr lang="en-US" smtClean="0"/>
+              <a:rPr lang="en-US"/>
               <a:t>Click to edit Master text styles</a:t>
             </a:r>
           </a:p>
           <a:p>
             <a:pPr lvl="1"/>
             <a:r>
-              <a:rPr lang="en-US" smtClean="0"/>
+              <a:rPr lang="en-US"/>
               <a:t>Second level</a:t>
             </a:r>
           </a:p>
           <a:p>
             <a:pPr lvl="2"/>
             <a:r>
-              <a:rPr lang="en-US" smtClean="0"/>
+              <a:rPr lang="en-US"/>
               <a:t>Third level</a:t>
             </a:r>
           </a:p>
           <a:p>
             <a:pPr lvl="3"/>
             <a:r>
-              <a:rPr lang="en-US" smtClean="0"/>
+              <a:rPr lang="en-US"/>
               <a:t>Fourth level</a:t>
             </a:r>
           </a:p>
           <a:p>
             <a:pPr lvl="4"/>
             <a:r>
-              <a:rPr lang="en-US" smtClean="0"/>
+              <a:rPr lang="en-US"/>
               <a:t>Fifth level</a:t>
             </a:r>
           </a:p>
@@ -33649,10 +33633,9 @@
           <a:lstStyle/>
           <a:p>
             <a:r>
-              <a:rPr lang="en-US" b="0" dirty="0" smtClean="0"/>
+              <a:rPr lang="en-US" b="0" dirty="0"/>
               <a:t>Changing Data Object API</a:t>
             </a:r>
-            <a:endParaRPr lang="en-US" b="0" dirty="0"/>
           </a:p>
         </p:txBody>
       </p:sp>
@@ -33677,7 +33660,7 @@
           <a:lstStyle/>
           <a:p>
             <a:r>
-              <a:rPr lang="en-US" b="0" dirty="0" smtClean="0"/>
+              <a:rPr lang="en-US" b="0" dirty="0"/>
               <a:t>RAVEN Sprint, November 2017</a:t>
             </a:r>
           </a:p>
@@ -33740,13 +33723,6 @@
       </p:transition>
     </mc:Fallback>
   </mc:AlternateContent>
-  <p:timing>
-    <p:tnLst>
-      <p:par>
-        <p:cTn xmlns:p14="http://schemas.microsoft.com/office/powerpoint/2010/main" id="1" dur="indefinite" restart="never" nodeType="tmRoot"/>
-      </p:par>
-    </p:tnLst>
-  </p:timing>
 </p:sld>
 </file>
 
@@ -33783,18 +33759,17 @@
           <a:lstStyle/>
           <a:p>
             <a:r>
-              <a:rPr lang="en-US" dirty="0" smtClean="0"/>
+              <a:rPr lang="en-US" dirty="0"/>
               <a:t>New API </a:t>
             </a:r>
             <a:r>
-              <a:rPr lang="mr-IN" dirty="0" smtClean="0"/>
+              <a:rPr lang="mr-IN" dirty="0"/>
               <a:t>–</a:t>
             </a:r>
             <a:r>
-              <a:rPr lang="en-US" dirty="0" smtClean="0"/>
+              <a:rPr lang="en-US" dirty="0"/>
               <a:t> Get A Realization/Sample</a:t>
             </a:r>
-            <a:endParaRPr lang="en-US" dirty="0"/>
           </a:p>
         </p:txBody>
       </p:sp>
@@ -33814,14 +33789,14 @@
           <a:lstStyle/>
           <a:p>
             <a:r>
-              <a:rPr lang="en-US" dirty="0" smtClean="0"/>
+              <a:rPr lang="en-US" dirty="0"/>
               <a:t>By index</a:t>
             </a:r>
           </a:p>
           <a:p>
             <a:pPr lvl="1"/>
             <a:r>
-              <a:rPr lang="en-US" dirty="0" err="1" smtClean="0">
+              <a:rPr lang="en-US" dirty="0" err="1">
                 <a:latin typeface="Consolas" charset="0"/>
                 <a:ea typeface="Consolas" charset="0"/>
                 <a:cs typeface="Consolas" charset="0"/>
@@ -33829,7 +33804,7 @@
               <a:t>data.realization</a:t>
             </a:r>
             <a:r>
-              <a:rPr lang="en-US" dirty="0" smtClean="0">
+              <a:rPr lang="en-US" dirty="0">
                 <a:latin typeface="Consolas" charset="0"/>
                 <a:ea typeface="Consolas" charset="0"/>
                 <a:cs typeface="Consolas" charset="0"/>
@@ -33840,22 +33815,22 @@
           <a:p>
             <a:pPr lvl="2"/>
             <a:r>
-              <a:rPr lang="en-US" dirty="0" smtClean="0"/>
+              <a:rPr lang="en-US" dirty="0"/>
               <a:t>Returns dictionary realization (</a:t>
             </a:r>
             <a:r>
-              <a:rPr lang="en-US" dirty="0" err="1" smtClean="0"/>
+              <a:rPr lang="en-US" dirty="0" err="1"/>
               <a:t>IndexError</a:t>
             </a:r>
             <a:r>
-              <a:rPr lang="en-US" dirty="0" smtClean="0"/>
+              <a:rPr lang="en-US" dirty="0"/>
               <a:t> if past bounds)</a:t>
             </a:r>
           </a:p>
           <a:p>
             <a:pPr lvl="2"/>
             <a:r>
-              <a:rPr lang="en-US" dirty="0" smtClean="0"/>
+              <a:rPr lang="en-US" dirty="0"/>
               <a:t>Negative indices count back from the end</a:t>
             </a:r>
           </a:p>
@@ -33864,14 +33839,14 @@
           </a:p>
           <a:p>
             <a:r>
-              <a:rPr lang="en-US" dirty="0" smtClean="0"/>
+              <a:rPr lang="en-US" dirty="0"/>
               <a:t>By matching value</a:t>
             </a:r>
           </a:p>
           <a:p>
             <a:pPr lvl="1"/>
             <a:r>
-              <a:rPr lang="en-US" dirty="0" err="1" smtClean="0">
+              <a:rPr lang="en-US" dirty="0" err="1">
                 <a:latin typeface="Consolas" charset="0"/>
                 <a:ea typeface="Consolas" charset="0"/>
                 <a:cs typeface="Consolas" charset="0"/>
@@ -33879,7 +33854,7 @@
               <a:t>data.realization</a:t>
             </a:r>
             <a:r>
-              <a:rPr lang="en-US" dirty="0" smtClean="0">
+              <a:rPr lang="en-US" dirty="0">
                 <a:latin typeface="Consolas" charset="0"/>
                 <a:ea typeface="Consolas" charset="0"/>
                 <a:cs typeface="Consolas" charset="0"/>
@@ -33887,7 +33862,7 @@
               <a:t>(</a:t>
             </a:r>
             <a:r>
-              <a:rPr lang="en-US" dirty="0" err="1" smtClean="0">
+              <a:rPr lang="en-US" dirty="0" err="1">
                 <a:latin typeface="Consolas" charset="0"/>
                 <a:ea typeface="Consolas" charset="0"/>
                 <a:cs typeface="Consolas" charset="0"/>
@@ -33895,7 +33870,7 @@
               <a:t>matchDict</a:t>
             </a:r>
             <a:r>
-              <a:rPr lang="en-US" dirty="0" smtClean="0">
+              <a:rPr lang="en-US" dirty="0">
                 <a:latin typeface="Consolas" charset="0"/>
                 <a:ea typeface="Consolas" charset="0"/>
                 <a:cs typeface="Consolas" charset="0"/>
@@ -33903,7 +33878,7 @@
               <a:t>={</a:t>
             </a:r>
             <a:r>
-              <a:rPr lang="mr-IN" dirty="0" smtClean="0">
+              <a:rPr lang="mr-IN" dirty="0">
                 <a:latin typeface="Consolas" charset="0"/>
                 <a:ea typeface="Consolas" charset="0"/>
                 <a:cs typeface="Consolas" charset="0"/>
@@ -33911,7 +33886,7 @@
               <a:t>…</a:t>
             </a:r>
             <a:r>
-              <a:rPr lang="en-US" dirty="0" smtClean="0">
+              <a:rPr lang="en-US" dirty="0">
                 <a:latin typeface="Consolas" charset="0"/>
                 <a:ea typeface="Consolas" charset="0"/>
                 <a:cs typeface="Consolas" charset="0"/>
@@ -33922,36 +33897,35 @@
           <a:p>
             <a:pPr lvl="2"/>
             <a:r>
-              <a:rPr lang="en-US" dirty="0" err="1" smtClean="0"/>
+              <a:rPr lang="en-US" dirty="0" err="1"/>
               <a:t>matchDict</a:t>
             </a:r>
             <a:r>
-              <a:rPr lang="en-US" dirty="0" smtClean="0"/>
+              <a:rPr lang="en-US" dirty="0"/>
               <a:t> can include inputs, outputs, pointwise metadata</a:t>
             </a:r>
           </a:p>
           <a:p>
             <a:pPr lvl="2"/>
             <a:r>
-              <a:rPr lang="en-US" dirty="0" smtClean="0"/>
+              <a:rPr lang="en-US" dirty="0"/>
               <a:t>Returns (index, </a:t>
             </a:r>
             <a:r>
-              <a:rPr lang="en-US" dirty="0" err="1" smtClean="0"/>
+              <a:rPr lang="en-US" dirty="0" err="1"/>
               <a:t>dict</a:t>
             </a:r>
             <a:r>
-              <a:rPr lang="en-US" dirty="0" smtClean="0"/>
+              <a:rPr lang="en-US" dirty="0"/>
               <a:t>) of the first match found</a:t>
             </a:r>
           </a:p>
           <a:p>
             <a:pPr lvl="2"/>
             <a:r>
-              <a:rPr lang="en-US" dirty="0" smtClean="0"/>
+              <a:rPr lang="en-US" dirty="0"/>
               <a:t>Returns (0,None) if not found</a:t>
             </a:r>
-            <a:endParaRPr lang="en-US" dirty="0"/>
           </a:p>
         </p:txBody>
       </p:sp>
@@ -33989,13 +33963,6 @@
   <p:clrMapOvr>
     <a:masterClrMapping/>
   </p:clrMapOvr>
-  <p:timing>
-    <p:tnLst>
-      <p:par>
-        <p:cTn xmlns:p14="http://schemas.microsoft.com/office/powerpoint/2010/main" id="1" dur="indefinite" restart="never" nodeType="tmRoot"/>
-      </p:par>
-    </p:tnLst>
-  </p:timing>
 </p:sld>
 </file>
 
@@ -34032,18 +33999,17 @@
           <a:lstStyle/>
           <a:p>
             <a:r>
-              <a:rPr lang="en-US" dirty="0" smtClean="0"/>
+              <a:rPr lang="en-US" dirty="0"/>
               <a:t>New API </a:t>
             </a:r>
             <a:r>
-              <a:rPr lang="mr-IN" dirty="0" smtClean="0"/>
+              <a:rPr lang="mr-IN" dirty="0"/>
               <a:t>–</a:t>
             </a:r>
             <a:r>
-              <a:rPr lang="en-US" dirty="0" smtClean="0"/>
-              <a:t> Properties</a:t>
+              <a:rPr lang="en-US" dirty="0"/>
+              <a:t> Get Each Realization</a:t>
             </a:r>
-            <a:endParaRPr lang="en-US" dirty="0"/>
           </a:p>
         </p:txBody>
       </p:sp>
@@ -34062,108 +34028,107 @@
           <a:bodyPr/>
           <a:lstStyle/>
           <a:p>
-            <a:r>
-              <a:rPr lang="en-US" dirty="0" err="1" smtClean="0">
-                <a:latin typeface="Consolas" charset="0"/>
-                <a:ea typeface="Consolas" charset="0"/>
-                <a:cs typeface="Consolas" charset="0"/>
-              </a:rPr>
-              <a:t>len</a:t>
-            </a:r>
-            <a:r>
-              <a:rPr lang="en-US" dirty="0" smtClean="0">
-                <a:latin typeface="Consolas" charset="0"/>
-                <a:ea typeface="Consolas" charset="0"/>
-                <a:cs typeface="Consolas" charset="0"/>
-              </a:rPr>
-              <a:t>(data) </a:t>
-            </a:r>
-            <a:r>
-              <a:rPr lang="en-US" dirty="0" smtClean="0"/>
-              <a:t>gives number of realizations (rows)</a:t>
-            </a:r>
-          </a:p>
-          <a:p>
-            <a:endParaRPr lang="en-US" dirty="0" smtClean="0"/>
-          </a:p>
-          <a:p>
-            <a:r>
-              <a:rPr lang="en-US" dirty="0" err="1" smtClean="0">
-                <a:latin typeface="Consolas" charset="0"/>
-                <a:ea typeface="Consolas" charset="0"/>
-                <a:cs typeface="Consolas" charset="0"/>
-              </a:rPr>
-              <a:t>data.size</a:t>
-            </a:r>
-            <a:r>
-              <a:rPr lang="en-US" dirty="0" smtClean="0">
-                <a:latin typeface="Consolas" charset="0"/>
-                <a:ea typeface="Consolas" charset="0"/>
-                <a:cs typeface="Consolas" charset="0"/>
-              </a:rPr>
-              <a:t> </a:t>
-            </a:r>
-            <a:r>
-              <a:rPr lang="en-US" dirty="0" smtClean="0"/>
-              <a:t>also gives number of realizations</a:t>
-            </a:r>
-          </a:p>
-          <a:p>
-            <a:endParaRPr lang="en-US" dirty="0" smtClean="0"/>
-          </a:p>
-          <a:p>
-            <a:r>
-              <a:rPr lang="en-US" dirty="0" err="1" smtClean="0">
-                <a:latin typeface="Consolas" charset="0"/>
-                <a:ea typeface="Consolas" charset="0"/>
-                <a:cs typeface="Consolas" charset="0"/>
-              </a:rPr>
-              <a:t>data.vars</a:t>
-            </a:r>
-            <a:r>
-              <a:rPr lang="en-US" dirty="0" smtClean="0">
-                <a:latin typeface="Consolas" charset="0"/>
-                <a:ea typeface="Consolas" charset="0"/>
-                <a:cs typeface="Consolas" charset="0"/>
-              </a:rPr>
-              <a:t> </a:t>
-            </a:r>
-            <a:r>
-              <a:rPr lang="en-US" dirty="0" smtClean="0"/>
-              <a:t>gives list of all input, output, pointwise metadata</a:t>
-            </a:r>
+            <a:endParaRPr lang="en-US" dirty="0"/>
           </a:p>
           <a:p>
             <a:endParaRPr lang="en-US" dirty="0"/>
           </a:p>
           <a:p>
             <a:r>
-              <a:rPr lang="en-US" dirty="0" err="1" smtClean="0">
+              <a:rPr lang="en-US" dirty="0"/>
+              <a:t>By slices</a:t>
+            </a:r>
+          </a:p>
+          <a:p>
+            <a:pPr lvl="1"/>
+            <a:r>
+              <a:rPr lang="en-US" dirty="0" err="1">
                 <a:latin typeface="Consolas" charset="0"/>
                 <a:ea typeface="Consolas" charset="0"/>
                 <a:cs typeface="Consolas" charset="0"/>
               </a:rPr>
-              <a:t>data.indexes</a:t>
+              <a:t>data.sliceByRealization</a:t>
             </a:r>
             <a:r>
-              <a:rPr lang="en-US" dirty="0" smtClean="0">
+              <a:rPr lang="en-US" dirty="0">
                 <a:latin typeface="Consolas" charset="0"/>
                 <a:ea typeface="Consolas" charset="0"/>
                 <a:cs typeface="Consolas" charset="0"/>
               </a:rPr>
+              <a:t>(index=</a:t>
+            </a:r>
+            <a:r>
+              <a:rPr lang="en-US" dirty="0" err="1">
+                <a:latin typeface="Consolas" charset="0"/>
+                <a:ea typeface="Consolas" charset="0"/>
+                <a:cs typeface="Consolas" charset="0"/>
+              </a:rPr>
+              <a:t>data.sampleTag</a:t>
+            </a:r>
+            <a:r>
+              <a:rPr lang="en-US" dirty="0">
+                <a:latin typeface="Consolas" charset="0"/>
+                <a:ea typeface="Consolas" charset="0"/>
+                <a:cs typeface="Consolas" charset="0"/>
+              </a:rPr>
+              <a:t>)</a:t>
+            </a:r>
+          </a:p>
+          <a:p>
+            <a:pPr lvl="2"/>
+            <a:r>
+              <a:rPr lang="en-US" dirty="0"/>
+              <a:t>Returns a list of each realization (as an </a:t>
+            </a:r>
+            <a:r>
+              <a:rPr lang="en-US" dirty="0" err="1"/>
+              <a:t>xarray</a:t>
+            </a:r>
+            <a:r>
+              <a:rPr lang="en-US" dirty="0"/>
+              <a:t>)</a:t>
+            </a:r>
+          </a:p>
+          <a:p>
+            <a:pPr lvl="2"/>
+            <a:r>
+              <a:rPr lang="en-US" dirty="0"/>
+              <a:t>Fills in </a:t>
+            </a:r>
+            <a:r>
+              <a:rPr lang="en-US" dirty="0" err="1"/>
+              <a:t>NaN</a:t>
+            </a:r>
+            <a:r>
+              <a:rPr lang="en-US" dirty="0"/>
+              <a:t> if variable has missing values for a realization</a:t>
+            </a:r>
+          </a:p>
+          <a:p>
+            <a:pPr lvl="2"/>
+            <a:r>
+              <a:rPr lang="en-US" dirty="0"/>
+              <a:t>This is the best way to see what value a pivot parameter has for an </a:t>
+            </a:r>
+            <a:r>
+              <a:rPr lang="en-US" dirty="0" err="1"/>
+              <a:t>unsynchonized</a:t>
+            </a:r>
+            <a:r>
+              <a:rPr lang="en-US" dirty="0"/>
               <a:t> </a:t>
             </a:r>
             <a:r>
-              <a:rPr lang="en-US" dirty="0" smtClean="0"/>
-              <a:t>gives list of dependent coordinates (</a:t>
+              <a:rPr lang="en-US" dirty="0" err="1"/>
+              <a:t>DataSet</a:t>
             </a:r>
             <a:r>
-              <a:rPr lang="en-US" dirty="0" err="1" smtClean="0"/>
-              <a:t>pivotParameters</a:t>
+              <a:rPr lang="en-US" dirty="0"/>
+              <a:t> or </a:t>
             </a:r>
             <a:r>
-              <a:rPr lang="en-US" dirty="0" smtClean="0"/>
-              <a:t>)</a:t>
+              <a:rPr lang="en-US" dirty="0" err="1"/>
+              <a:t>HistorySet</a:t>
             </a:r>
             <a:endParaRPr lang="en-US" dirty="0"/>
           </a:p>
@@ -34196,20 +34161,13 @@
     </p:spTree>
     <p:extLst>
       <p:ext uri="{BB962C8B-B14F-4D97-AF65-F5344CB8AC3E}">
-        <p14:creationId xmlns:p14="http://schemas.microsoft.com/office/powerpoint/2010/main" val="265489246"/>
+        <p14:creationId xmlns:p14="http://schemas.microsoft.com/office/powerpoint/2010/main" val="1208746391"/>
       </p:ext>
     </p:extLst>
   </p:cSld>
   <p:clrMapOvr>
     <a:masterClrMapping/>
   </p:clrMapOvr>
-  <p:timing>
-    <p:tnLst>
-      <p:par>
-        <p:cTn xmlns:p14="http://schemas.microsoft.com/office/powerpoint/2010/main" id="1" dur="indefinite" restart="never" nodeType="tmRoot"/>
-      </p:par>
-    </p:tnLst>
-  </p:timing>
 </p:sld>
 </file>
 
@@ -34246,14 +34204,218 @@
           <a:lstStyle/>
           <a:p>
             <a:r>
-              <a:rPr lang="en-US" dirty="0" err="1" smtClean="0"/>
+              <a:rPr lang="en-US" dirty="0"/>
+              <a:t>New API </a:t>
+            </a:r>
+            <a:r>
+              <a:rPr lang="mr-IN" dirty="0"/>
+              <a:t>–</a:t>
+            </a:r>
+            <a:r>
+              <a:rPr lang="en-US" dirty="0"/>
+              <a:t> Properties</a:t>
+            </a:r>
+          </a:p>
+        </p:txBody>
+      </p:sp>
+      <p:sp>
+        <p:nvSpPr>
+          <p:cNvPr id="3" name="Content Placeholder 2"/>
+          <p:cNvSpPr>
+            <a:spLocks noGrp="1"/>
+          </p:cNvSpPr>
+          <p:nvPr>
+            <p:ph idx="1"/>
+          </p:nvPr>
+        </p:nvSpPr>
+        <p:spPr/>
+        <p:txBody>
+          <a:bodyPr/>
+          <a:lstStyle/>
+          <a:p>
+            <a:r>
+              <a:rPr lang="en-US" dirty="0" err="1">
+                <a:latin typeface="Consolas" charset="0"/>
+                <a:ea typeface="Consolas" charset="0"/>
+                <a:cs typeface="Consolas" charset="0"/>
+              </a:rPr>
+              <a:t>len</a:t>
+            </a:r>
+            <a:r>
+              <a:rPr lang="en-US" dirty="0">
+                <a:latin typeface="Consolas" charset="0"/>
+                <a:ea typeface="Consolas" charset="0"/>
+                <a:cs typeface="Consolas" charset="0"/>
+              </a:rPr>
+              <a:t>(data) </a:t>
+            </a:r>
+            <a:r>
+              <a:rPr lang="en-US" dirty="0"/>
+              <a:t>gives number of realizations (rows)</a:t>
+            </a:r>
+          </a:p>
+          <a:p>
+            <a:endParaRPr lang="en-US" dirty="0"/>
+          </a:p>
+          <a:p>
+            <a:r>
+              <a:rPr lang="en-US" dirty="0" err="1">
+                <a:latin typeface="Consolas" charset="0"/>
+                <a:ea typeface="Consolas" charset="0"/>
+                <a:cs typeface="Consolas" charset="0"/>
+              </a:rPr>
+              <a:t>data.size</a:t>
+            </a:r>
+            <a:r>
+              <a:rPr lang="en-US" dirty="0">
+                <a:latin typeface="Consolas" charset="0"/>
+                <a:ea typeface="Consolas" charset="0"/>
+                <a:cs typeface="Consolas" charset="0"/>
+              </a:rPr>
+              <a:t> </a:t>
+            </a:r>
+            <a:r>
+              <a:rPr lang="en-US" dirty="0"/>
+              <a:t>also gives number of realizations</a:t>
+            </a:r>
+          </a:p>
+          <a:p>
+            <a:endParaRPr lang="en-US" dirty="0"/>
+          </a:p>
+          <a:p>
+            <a:r>
+              <a:rPr lang="en-US" dirty="0" err="1">
+                <a:latin typeface="Consolas" charset="0"/>
+                <a:ea typeface="Consolas" charset="0"/>
+                <a:cs typeface="Consolas" charset="0"/>
+              </a:rPr>
+              <a:t>data.vars</a:t>
+            </a:r>
+            <a:r>
+              <a:rPr lang="en-US" dirty="0">
+                <a:latin typeface="Consolas" charset="0"/>
+                <a:ea typeface="Consolas" charset="0"/>
+                <a:cs typeface="Consolas" charset="0"/>
+              </a:rPr>
+              <a:t> </a:t>
+            </a:r>
+            <a:r>
+              <a:rPr lang="en-US" dirty="0"/>
+              <a:t>gives list of all input, output, pointwise metadata</a:t>
+            </a:r>
+          </a:p>
+          <a:p>
+            <a:endParaRPr lang="en-US" dirty="0"/>
+          </a:p>
+          <a:p>
+            <a:r>
+              <a:rPr lang="en-US" dirty="0" err="1">
+                <a:latin typeface="Consolas" charset="0"/>
+                <a:ea typeface="Consolas" charset="0"/>
+                <a:cs typeface="Consolas" charset="0"/>
+              </a:rPr>
+              <a:t>data.indexes</a:t>
+            </a:r>
+            <a:r>
+              <a:rPr lang="en-US" dirty="0">
+                <a:latin typeface="Consolas" charset="0"/>
+                <a:ea typeface="Consolas" charset="0"/>
+                <a:cs typeface="Consolas" charset="0"/>
+              </a:rPr>
+              <a:t> </a:t>
+            </a:r>
+            <a:r>
+              <a:rPr lang="en-US" dirty="0"/>
+              <a:t>gives list of dependent coordinates (</a:t>
+            </a:r>
+            <a:r>
+              <a:rPr lang="en-US" dirty="0" err="1"/>
+              <a:t>pivotParameters</a:t>
+            </a:r>
+            <a:r>
+              <a:rPr lang="en-US" dirty="0"/>
+              <a:t>)</a:t>
+            </a:r>
+          </a:p>
+        </p:txBody>
+      </p:sp>
+      <p:sp>
+        <p:nvSpPr>
+          <p:cNvPr id="4" name="Slide Number Placeholder 3"/>
+          <p:cNvSpPr>
+            <a:spLocks noGrp="1"/>
+          </p:cNvSpPr>
+          <p:nvPr>
+            <p:ph type="sldNum" sz="quarter" idx="11"/>
+          </p:nvPr>
+        </p:nvSpPr>
+        <p:spPr/>
+        <p:txBody>
+          <a:bodyPr/>
+          <a:lstStyle/>
+          <a:p>
+            <a:fld id="{4B4332F1-BAE3-4172-AA6D-91F763B329EF}" type="slidenum">
+              <a:rPr lang="en-US" smtClean="0"/>
+              <a:pPr/>
+              <a:t>12</a:t>
+            </a:fld>
+            <a:endParaRPr lang="en-US"/>
+          </a:p>
+        </p:txBody>
+      </p:sp>
+    </p:spTree>
+    <p:extLst>
+      <p:ext uri="{BB962C8B-B14F-4D97-AF65-F5344CB8AC3E}">
+        <p14:creationId xmlns:p14="http://schemas.microsoft.com/office/powerpoint/2010/main" val="265489246"/>
+      </p:ext>
+    </p:extLst>
+  </p:cSld>
+  <p:clrMapOvr>
+    <a:masterClrMapping/>
+  </p:clrMapOvr>
+</p:sld>
+</file>
+
+<file path=ppt/slides/slide13.xml><?xml version="1.0" encoding="utf-8"?>
+<p:sld xmlns:a="http://schemas.openxmlformats.org/drawingml/2006/main" xmlns:r="http://schemas.openxmlformats.org/officeDocument/2006/relationships" xmlns:p="http://schemas.openxmlformats.org/presentationml/2006/main">
+  <p:cSld>
+    <p:spTree>
+      <p:nvGrpSpPr>
+        <p:cNvPr id="1" name=""/>
+        <p:cNvGrpSpPr/>
+        <p:nvPr/>
+      </p:nvGrpSpPr>
+      <p:grpSpPr>
+        <a:xfrm>
+          <a:off x="0" y="0"/>
+          <a:ext cx="0" cy="0"/>
+          <a:chOff x="0" y="0"/>
+          <a:chExt cx="0" cy="0"/>
+        </a:xfrm>
+      </p:grpSpPr>
+      <p:sp>
+        <p:nvSpPr>
+          <p:cNvPr id="2" name="Title 1"/>
+          <p:cNvSpPr>
+            <a:spLocks noGrp="1"/>
+          </p:cNvSpPr>
+          <p:nvPr>
+            <p:ph type="title"/>
+          </p:nvPr>
+        </p:nvSpPr>
+        <p:spPr/>
+        <p:txBody>
+          <a:bodyPr/>
+          <a:lstStyle/>
+          <a:p>
+            <a:r>
+              <a:rPr lang="en-US" dirty="0" err="1"/>
               <a:t>Xarray</a:t>
             </a:r>
             <a:r>
-              <a:rPr lang="en-US" dirty="0" smtClean="0"/>
+              <a:rPr lang="en-US" dirty="0"/>
               <a:t> Operations</a:t>
             </a:r>
-            <a:endParaRPr lang="en-US" dirty="0"/>
           </a:p>
         </p:txBody>
       </p:sp>
@@ -34278,41 +34440,33 @@
           <a:lstStyle/>
           <a:p>
             <a:r>
-              <a:rPr lang="en-US" dirty="0" smtClean="0"/>
+              <a:rPr lang="en-US" dirty="0"/>
               <a:t>ds = </a:t>
             </a:r>
             <a:r>
-              <a:rPr lang="en-US" dirty="0" err="1" smtClean="0"/>
+              <a:rPr lang="en-US" dirty="0" err="1"/>
               <a:t>data.asDataset</a:t>
             </a:r>
             <a:r>
-              <a:rPr lang="en-US" dirty="0" smtClean="0"/>
+              <a:rPr lang="en-US" dirty="0"/>
               <a:t>()</a:t>
             </a:r>
           </a:p>
           <a:p>
             <a:pPr lvl="1"/>
             <a:r>
-              <a:rPr lang="en-US" dirty="0" smtClean="0"/>
-              <a:t>Select the entries at the “</a:t>
-            </a:r>
-            <a:r>
               <a:rPr lang="en-US" dirty="0"/>
-              <a:t>7</a:t>
-            </a:r>
-            <a:r>
-              <a:rPr lang="en-US" dirty="0" smtClean="0"/>
-              <a:t>th” burnup entry:</a:t>
+              <a:t>Select the entries at the “7th” burnup entry:</a:t>
             </a:r>
           </a:p>
           <a:p>
             <a:pPr lvl="1"/>
-            <a:endParaRPr lang="en-US" dirty="0" smtClean="0"/>
+            <a:endParaRPr lang="en-US" dirty="0"/>
           </a:p>
           <a:p>
             <a:pPr lvl="1"/>
             <a:r>
-              <a:rPr lang="en-US" dirty="0" smtClean="0"/>
+              <a:rPr lang="en-US" dirty="0"/>
               <a:t>Select the entry where time is 15:</a:t>
             </a:r>
           </a:p>
@@ -34323,7 +34477,7 @@
           <a:p>
             <a:pPr lvl="1"/>
             <a:r>
-              <a:rPr lang="en-US" dirty="0" smtClean="0"/>
+              <a:rPr lang="en-US" dirty="0"/>
               <a:t>Nearest neighbor lookup</a:t>
             </a:r>
           </a:p>
@@ -34334,7 +34488,7 @@
           <a:p>
             <a:pPr lvl="1"/>
             <a:r>
-              <a:rPr lang="en-US" dirty="0" smtClean="0"/>
+              <a:rPr lang="en-US" dirty="0"/>
               <a:t>Values of “x” between 0.2 and 0.8</a:t>
             </a:r>
           </a:p>
@@ -34345,15 +34499,15 @@
           <a:p>
             <a:pPr lvl="1"/>
             <a:r>
-              <a:rPr lang="en-US" dirty="0" smtClean="0"/>
+              <a:rPr lang="en-US" dirty="0"/>
               <a:t>Get the </a:t>
             </a:r>
             <a:r>
-              <a:rPr lang="en-US" dirty="0" err="1" smtClean="0"/>
+              <a:rPr lang="en-US" dirty="0" err="1"/>
               <a:t>np.array</a:t>
             </a:r>
             <a:r>
-              <a:rPr lang="en-US" dirty="0" smtClean="0"/>
+              <a:rPr lang="en-US" dirty="0"/>
               <a:t> of values for “a”:</a:t>
             </a:r>
           </a:p>
@@ -34364,7 +34518,7 @@
           <a:p>
             <a:pPr lvl="1"/>
             <a:r>
-              <a:rPr lang="en-US" dirty="0" smtClean="0"/>
+              <a:rPr lang="en-US" dirty="0"/>
               <a:t>Elementwise Operations:</a:t>
             </a:r>
           </a:p>
@@ -34375,30 +34529,29 @@
           <a:p>
             <a:pPr lvl="1"/>
             <a:r>
-              <a:rPr lang="en-US" dirty="0" smtClean="0"/>
+              <a:rPr lang="en-US" dirty="0"/>
               <a:t>Many </a:t>
             </a:r>
             <a:r>
-              <a:rPr lang="en-US" dirty="0" err="1" smtClean="0"/>
+              <a:rPr lang="en-US" dirty="0" err="1"/>
               <a:t>builtin</a:t>
             </a:r>
             <a:r>
-              <a:rPr lang="en-US" dirty="0" smtClean="0"/>
+              <a:rPr lang="en-US" dirty="0"/>
               <a:t> functions: mean, </a:t>
             </a:r>
             <a:r>
-              <a:rPr lang="en-US" dirty="0" err="1" smtClean="0"/>
+              <a:rPr lang="en-US" dirty="0" err="1"/>
               <a:t>std</a:t>
             </a:r>
             <a:r>
-              <a:rPr lang="en-US" dirty="0" smtClean="0"/>
+              <a:rPr lang="en-US" dirty="0"/>
               <a:t>, where</a:t>
             </a:r>
-            <a:endParaRPr lang="en-US" dirty="0"/>
           </a:p>
           <a:p>
             <a:pPr lvl="1"/>
-            <a:endParaRPr lang="en-US" dirty="0" smtClean="0"/>
+            <a:endParaRPr lang="en-US" dirty="0"/>
           </a:p>
           <a:p>
             <a:pPr lvl="1"/>
@@ -34424,7 +34577,7 @@
             <a:fld id="{4B4332F1-BAE3-4172-AA6D-91F763B329EF}" type="slidenum">
               <a:rPr lang="en-US" smtClean="0"/>
               <a:pPr/>
-              <a:t>12</a:t>
+              <a:t>13</a:t>
             </a:fld>
             <a:endParaRPr lang="en-US"/>
           </a:p>
@@ -34620,17 +34773,10 @@
   <p:clrMapOvr>
     <a:masterClrMapping/>
   </p:clrMapOvr>
-  <p:timing>
-    <p:tnLst>
-      <p:par>
-        <p:cTn xmlns:p14="http://schemas.microsoft.com/office/powerpoint/2010/main" id="1" dur="indefinite" restart="never" nodeType="tmRoot"/>
-      </p:par>
-    </p:tnLst>
-  </p:timing>
 </p:sld>
 </file>
 
-<file path=ppt/slides/slide13.xml><?xml version="1.0" encoding="utf-8"?>
+<file path=ppt/slides/slide14.xml><?xml version="1.0" encoding="utf-8"?>
 <p:sld xmlns:a="http://schemas.openxmlformats.org/drawingml/2006/main" xmlns:r="http://schemas.openxmlformats.org/officeDocument/2006/relationships" xmlns:p="http://schemas.openxmlformats.org/presentationml/2006/main">
   <p:cSld>
     <p:spTree>
@@ -34663,10 +34809,9 @@
           <a:lstStyle/>
           <a:p>
             <a:r>
-              <a:rPr lang="en-US" dirty="0" smtClean="0"/>
+              <a:rPr lang="en-US" dirty="0"/>
               <a:t>Realizations</a:t>
             </a:r>
-            <a:endParaRPr lang="en-US" dirty="0"/>
           </a:p>
         </p:txBody>
       </p:sp>
@@ -34686,25 +34831,25 @@
           <a:lstStyle/>
           <a:p>
             <a:r>
-              <a:rPr lang="en-US" dirty="0" smtClean="0"/>
+              <a:rPr lang="en-US" dirty="0"/>
               <a:t>Old way:</a:t>
             </a:r>
           </a:p>
           <a:p>
             <a:pPr lvl="1"/>
             <a:r>
-              <a:rPr lang="en-US" dirty="0" smtClean="0"/>
+              <a:rPr lang="en-US" dirty="0"/>
               <a:t>Used dictionaries of ‘inputs’, ‘outputs’, ‘metadata’</a:t>
             </a:r>
           </a:p>
           <a:p>
             <a:pPr lvl="1"/>
             <a:r>
-              <a:rPr lang="en-US" dirty="0" smtClean="0"/>
+              <a:rPr lang="en-US" dirty="0"/>
               <a:t>Each entry is </a:t>
             </a:r>
             <a:r>
-              <a:rPr lang="en-US" dirty="0" smtClean="0">
+              <a:rPr lang="en-US" dirty="0">
                 <a:latin typeface="Consolas" charset="0"/>
                 <a:ea typeface="Consolas" charset="0"/>
                 <a:cs typeface="Consolas" charset="0"/>
@@ -34712,18 +34857,18 @@
               <a:t>c1darray</a:t>
             </a:r>
             <a:r>
-              <a:rPr lang="en-US" dirty="0" smtClean="0"/>
+              <a:rPr lang="en-US" dirty="0"/>
               <a:t> or </a:t>
             </a:r>
             <a:r>
-              <a:rPr lang="en-US" dirty="0" err="1" smtClean="0">
+              <a:rPr lang="en-US" dirty="0" err="1">
                 <a:latin typeface="Consolas" charset="0"/>
                 <a:ea typeface="Consolas" charset="0"/>
                 <a:cs typeface="Consolas" charset="0"/>
               </a:rPr>
               <a:t>np.ndarray</a:t>
             </a:r>
-            <a:endParaRPr lang="en-US" dirty="0" smtClean="0">
+            <a:endParaRPr lang="en-US" dirty="0">
               <a:latin typeface="Consolas" charset="0"/>
               <a:ea typeface="Consolas" charset="0"/>
               <a:cs typeface="Consolas" charset="0"/>
@@ -34735,25 +34880,25 @@
           </a:p>
           <a:p>
             <a:r>
-              <a:rPr lang="en-US" dirty="0" smtClean="0"/>
+              <a:rPr lang="en-US" dirty="0"/>
               <a:t>New way:</a:t>
             </a:r>
           </a:p>
           <a:p>
             <a:pPr lvl="1"/>
             <a:r>
-              <a:rPr lang="en-US" dirty="0" smtClean="0"/>
+              <a:rPr lang="en-US" dirty="0"/>
               <a:t>All inputs, outputs, pointwise metadata in same space</a:t>
             </a:r>
           </a:p>
           <a:p>
             <a:pPr lvl="1"/>
             <a:r>
-              <a:rPr lang="en-US" dirty="0" smtClean="0"/>
+              <a:rPr lang="en-US" dirty="0"/>
               <a:t>Each entry is still </a:t>
             </a:r>
             <a:r>
-              <a:rPr lang="en-US" dirty="0" err="1" smtClean="0">
+              <a:rPr lang="en-US" dirty="0" err="1">
                 <a:latin typeface="Consolas" charset="0"/>
                 <a:ea typeface="Consolas" charset="0"/>
                 <a:cs typeface="Consolas" charset="0"/>
@@ -34761,7 +34906,7 @@
               <a:t>np.ndarray</a:t>
             </a:r>
             <a:r>
-              <a:rPr lang="en-US" dirty="0" smtClean="0">
+              <a:rPr lang="en-US" dirty="0">
                 <a:latin typeface="Consolas" charset="0"/>
                 <a:ea typeface="Consolas" charset="0"/>
                 <a:cs typeface="Consolas" charset="0"/>
@@ -34769,11 +34914,11 @@
               <a:t> </a:t>
             </a:r>
             <a:r>
-              <a:rPr lang="en-US" dirty="0" smtClean="0"/>
+              <a:rPr lang="en-US" dirty="0"/>
               <a:t>(or </a:t>
             </a:r>
             <a:r>
-              <a:rPr lang="en-US" dirty="0" smtClean="0">
+              <a:rPr lang="en-US" dirty="0">
                 <a:latin typeface="Consolas" charset="0"/>
                 <a:ea typeface="Consolas" charset="0"/>
                 <a:cs typeface="Consolas" charset="0"/>
@@ -34781,18 +34926,18 @@
               <a:t>c1darray</a:t>
             </a:r>
             <a:r>
-              <a:rPr lang="en-US" dirty="0" smtClean="0"/>
+              <a:rPr lang="en-US" dirty="0"/>
               <a:t>)</a:t>
             </a:r>
           </a:p>
           <a:p>
             <a:pPr lvl="2"/>
             <a:r>
-              <a:rPr lang="en-US" dirty="0" smtClean="0"/>
+              <a:rPr lang="en-US" dirty="0"/>
               <a:t>size 1 if scalar (</a:t>
             </a:r>
             <a:r>
-              <a:rPr lang="en-US" dirty="0" smtClean="0">
+              <a:rPr lang="en-US" dirty="0">
                 <a:latin typeface="Consolas" charset="0"/>
                 <a:ea typeface="Consolas" charset="0"/>
                 <a:cs typeface="Consolas" charset="0"/>
@@ -34800,7 +34945,7 @@
               <a:t>float, </a:t>
             </a:r>
             <a:r>
-              <a:rPr lang="en-US" dirty="0" err="1" smtClean="0">
+              <a:rPr lang="en-US" dirty="0" err="1">
                 <a:latin typeface="Consolas" charset="0"/>
                 <a:ea typeface="Consolas" charset="0"/>
                 <a:cs typeface="Consolas" charset="0"/>
@@ -34808,7 +34953,7 @@
               <a:t>str</a:t>
             </a:r>
             <a:r>
-              <a:rPr lang="en-US" dirty="0" smtClean="0">
+              <a:rPr lang="en-US" dirty="0">
                 <a:latin typeface="Consolas" charset="0"/>
                 <a:ea typeface="Consolas" charset="0"/>
                 <a:cs typeface="Consolas" charset="0"/>
@@ -34816,7 +34961,7 @@
               <a:t>, </a:t>
             </a:r>
             <a:r>
-              <a:rPr lang="en-US" dirty="0" err="1" smtClean="0">
+              <a:rPr lang="en-US" dirty="0" err="1">
                 <a:latin typeface="Consolas" charset="0"/>
                 <a:ea typeface="Consolas" charset="0"/>
                 <a:cs typeface="Consolas" charset="0"/>
@@ -34824,7 +34969,7 @@
               <a:t>unicode</a:t>
             </a:r>
             <a:r>
-              <a:rPr lang="en-US" dirty="0" smtClean="0">
+              <a:rPr lang="en-US" dirty="0">
                 <a:latin typeface="Consolas" charset="0"/>
                 <a:ea typeface="Consolas" charset="0"/>
                 <a:cs typeface="Consolas" charset="0"/>
@@ -34832,7 +34977,7 @@
               <a:t>, </a:t>
             </a:r>
             <a:r>
-              <a:rPr lang="en-US" dirty="0" err="1" smtClean="0">
+              <a:rPr lang="en-US" dirty="0" err="1">
                 <a:latin typeface="Consolas" charset="0"/>
                 <a:ea typeface="Consolas" charset="0"/>
                 <a:cs typeface="Consolas" charset="0"/>
@@ -34840,17 +34985,16 @@
               <a:t>int</a:t>
             </a:r>
             <a:r>
-              <a:rPr lang="en-US" dirty="0" smtClean="0"/>
+              <a:rPr lang="en-US" dirty="0"/>
               <a:t>)</a:t>
             </a:r>
           </a:p>
           <a:p>
             <a:pPr lvl="2"/>
             <a:r>
-              <a:rPr lang="en-US" dirty="0" smtClean="0"/>
+              <a:rPr lang="en-US" dirty="0"/>
               <a:t>longer if history</a:t>
             </a:r>
-            <a:endParaRPr lang="en-US" dirty="0"/>
           </a:p>
         </p:txBody>
       </p:sp>
@@ -34872,7 +35016,7 @@
             <a:fld id="{4B4332F1-BAE3-4172-AA6D-91F763B329EF}" type="slidenum">
               <a:rPr lang="en-US" smtClean="0"/>
               <a:pPr/>
-              <a:t>13</a:t>
+              <a:t>14</a:t>
             </a:fld>
             <a:endParaRPr lang="en-US"/>
           </a:p>
@@ -34918,17 +35062,10 @@
   <p:clrMapOvr>
     <a:masterClrMapping/>
   </p:clrMapOvr>
-  <p:timing>
-    <p:tnLst>
-      <p:par>
-        <p:cTn xmlns:p14="http://schemas.microsoft.com/office/powerpoint/2010/main" id="1" dur="indefinite" restart="never" nodeType="tmRoot"/>
-      </p:par>
-    </p:tnLst>
-  </p:timing>
 </p:sld>
 </file>
 
-<file path=ppt/slides/slide14.xml><?xml version="1.0" encoding="utf-8"?>
+<file path=ppt/slides/slide15.xml><?xml version="1.0" encoding="utf-8"?>
 <p:sld xmlns:a="http://schemas.openxmlformats.org/drawingml/2006/main" xmlns:r="http://schemas.openxmlformats.org/officeDocument/2006/relationships" xmlns:p="http://schemas.openxmlformats.org/presentationml/2006/main">
   <p:cSld>
     <p:spTree>
@@ -34961,10 +35098,9 @@
           <a:lstStyle/>
           <a:p>
             <a:r>
-              <a:rPr lang="en-US" dirty="0" smtClean="0"/>
+              <a:rPr lang="en-US" dirty="0"/>
               <a:t>Example Conversion: Adding Realization</a:t>
             </a:r>
-            <a:endParaRPr lang="en-US" dirty="0"/>
           </a:p>
         </p:txBody>
       </p:sp>
@@ -34984,18 +35120,18 @@
           <a:lstStyle/>
           <a:p>
             <a:r>
-              <a:rPr lang="en-US" dirty="0" smtClean="0"/>
+              <a:rPr lang="en-US" dirty="0"/>
               <a:t>Old way, taken from </a:t>
             </a:r>
             <a:r>
-              <a:rPr lang="en-US" dirty="0" err="1" smtClean="0">
+              <a:rPr lang="en-US" dirty="0" err="1">
                 <a:latin typeface="Consolas" charset="0"/>
                 <a:ea typeface="Consolas" charset="0"/>
                 <a:cs typeface="Consolas" charset="0"/>
               </a:rPr>
               <a:t>Dummy.collectOutputFromDict</a:t>
             </a:r>
-            <a:endParaRPr lang="en-US" dirty="0" smtClean="0">
+            <a:endParaRPr lang="en-US" dirty="0">
               <a:latin typeface="Consolas" charset="0"/>
               <a:ea typeface="Consolas" charset="0"/>
               <a:cs typeface="Consolas" charset="0"/>
@@ -35005,26 +35141,25 @@
             <a:endParaRPr lang="en-US" dirty="0"/>
           </a:p>
           <a:p>
-            <a:endParaRPr lang="en-US" dirty="0" smtClean="0"/>
+            <a:endParaRPr lang="en-US" dirty="0"/>
           </a:p>
           <a:p>
             <a:endParaRPr lang="en-US" dirty="0"/>
           </a:p>
           <a:p>
-            <a:endParaRPr lang="en-US" dirty="0" smtClean="0"/>
+            <a:endParaRPr lang="en-US" dirty="0"/>
           </a:p>
           <a:p>
             <a:endParaRPr lang="en-US" dirty="0"/>
           </a:p>
           <a:p>
-            <a:endParaRPr lang="en-US" dirty="0" smtClean="0"/>
+            <a:endParaRPr lang="en-US" dirty="0"/>
           </a:p>
           <a:p>
             <a:r>
-              <a:rPr lang="en-US" dirty="0" smtClean="0"/>
+              <a:rPr lang="en-US" dirty="0"/>
               <a:t>New way:</a:t>
             </a:r>
-            <a:endParaRPr lang="en-US" dirty="0"/>
           </a:p>
         </p:txBody>
       </p:sp>
@@ -35046,7 +35181,7 @@
             <a:fld id="{4B4332F1-BAE3-4172-AA6D-91F763B329EF}" type="slidenum">
               <a:rPr lang="en-US" smtClean="0"/>
               <a:pPr/>
-              <a:t>14</a:t>
+              <a:t>15</a:t>
             </a:fld>
             <a:endParaRPr lang="en-US"/>
           </a:p>
@@ -35125,7 +35260,7 @@
 </p:sld>
 </file>
 
-<file path=ppt/slides/slide15.xml><?xml version="1.0" encoding="utf-8"?>
+<file path=ppt/slides/slide16.xml><?xml version="1.0" encoding="utf-8"?>
 <p:sld xmlns:a="http://schemas.openxmlformats.org/drawingml/2006/main" xmlns:r="http://schemas.openxmlformats.org/officeDocument/2006/relationships" xmlns:p="http://schemas.openxmlformats.org/presentationml/2006/main">
   <p:cSld>
     <p:spTree>
@@ -35158,19 +35293,19 @@
           <a:lstStyle/>
           <a:p>
             <a:r>
-              <a:rPr lang="en-US" dirty="0" smtClean="0"/>
+              <a:rPr lang="en-US" dirty="0"/>
               <a:t>Common Issues </a:t>
             </a:r>
             <a:r>
-              <a:rPr lang="mr-IN" dirty="0" smtClean="0"/>
+              <a:rPr lang="mr-IN" dirty="0"/>
               <a:t>–</a:t>
             </a:r>
             <a:r>
-              <a:rPr lang="en-US" dirty="0" smtClean="0"/>
+              <a:rPr lang="en-US" dirty="0"/>
               <a:t> object </a:t>
             </a:r>
             <a:r>
-              <a:rPr lang="en-US" dirty="0" err="1" smtClean="0"/>
+              <a:rPr lang="en-US" dirty="0" err="1"/>
               <a:t>dtype</a:t>
             </a:r>
             <a:endParaRPr lang="en-US" dirty="0"/>
@@ -35193,11 +35328,11 @@
           <a:lstStyle/>
           <a:p>
             <a:r>
-              <a:rPr lang="en-US" dirty="0" smtClean="0"/>
+              <a:rPr lang="en-US" dirty="0"/>
               <a:t>Data is stored in </a:t>
             </a:r>
             <a:r>
-              <a:rPr lang="en-US" dirty="0" err="1" smtClean="0">
+              <a:rPr lang="en-US" dirty="0" err="1">
                 <a:latin typeface="Consolas" charset="0"/>
                 <a:ea typeface="Consolas" charset="0"/>
                 <a:cs typeface="Consolas" charset="0"/>
@@ -35205,11 +35340,11 @@
               <a:t>np.ndarray</a:t>
             </a:r>
             <a:r>
-              <a:rPr lang="en-US" dirty="0" smtClean="0"/>
+              <a:rPr lang="en-US" dirty="0"/>
               <a:t> with </a:t>
             </a:r>
             <a:r>
-              <a:rPr lang="en-US" dirty="0" err="1" smtClean="0">
+              <a:rPr lang="en-US" dirty="0" err="1">
                 <a:latin typeface="Consolas" charset="0"/>
                 <a:ea typeface="Consolas" charset="0"/>
                 <a:cs typeface="Consolas" charset="0"/>
@@ -35217,7 +35352,7 @@
               <a:t>dtype</a:t>
             </a:r>
             <a:r>
-              <a:rPr lang="en-US" dirty="0" smtClean="0">
+              <a:rPr lang="en-US" dirty="0">
                 <a:latin typeface="Consolas" charset="0"/>
                 <a:ea typeface="Consolas" charset="0"/>
                 <a:cs typeface="Consolas" charset="0"/>
@@ -35227,22 +35362,22 @@
           </a:p>
           <a:p>
             <a:r>
-              <a:rPr lang="en-US" dirty="0" smtClean="0"/>
+              <a:rPr lang="en-US" dirty="0"/>
               <a:t>Most tools are fine with this.  However,</a:t>
             </a:r>
           </a:p>
           <a:p>
             <a:pPr lvl="1"/>
             <a:r>
-              <a:rPr lang="en-US" dirty="0" err="1" smtClean="0"/>
+              <a:rPr lang="en-US" dirty="0" err="1"/>
               <a:t>sklearn</a:t>
             </a:r>
             <a:r>
-              <a:rPr lang="en-US" dirty="0" smtClean="0"/>
+              <a:rPr lang="en-US" dirty="0"/>
               <a:t> ROMs demand </a:t>
             </a:r>
             <a:r>
-              <a:rPr lang="en-US" dirty="0" err="1" smtClean="0">
+              <a:rPr lang="en-US" dirty="0" err="1">
                 <a:latin typeface="Consolas" charset="0"/>
                 <a:ea typeface="Consolas" charset="0"/>
                 <a:cs typeface="Consolas" charset="0"/>
@@ -35250,7 +35385,7 @@
               <a:t>dtype</a:t>
             </a:r>
             <a:r>
-              <a:rPr lang="en-US" dirty="0" smtClean="0">
+              <a:rPr lang="en-US" dirty="0">
                 <a:latin typeface="Consolas" charset="0"/>
                 <a:ea typeface="Consolas" charset="0"/>
                 <a:cs typeface="Consolas" charset="0"/>
@@ -35258,7 +35393,7 @@
               <a:t>=float </a:t>
             </a:r>
             <a:r>
-              <a:rPr lang="en-US" dirty="0" smtClean="0"/>
+              <a:rPr lang="en-US" dirty="0"/>
               <a:t>or similar</a:t>
             </a:r>
           </a:p>
@@ -35268,7 +35403,7 @@
           </a:p>
           <a:p>
             <a:r>
-              <a:rPr lang="en-US" dirty="0" smtClean="0"/>
+              <a:rPr lang="en-US" dirty="0"/>
               <a:t>How to fix this?  Convert type when obtaining data</a:t>
             </a:r>
           </a:p>
@@ -35296,7 +35431,7 @@
             <a:fld id="{4B4332F1-BAE3-4172-AA6D-91F763B329EF}" type="slidenum">
               <a:rPr lang="en-US" smtClean="0"/>
               <a:pPr/>
-              <a:t>15</a:t>
+              <a:t>16</a:t>
             </a:fld>
             <a:endParaRPr lang="en-US"/>
           </a:p>
@@ -35345,7 +35480,7 @@
 </p:sld>
 </file>
 
-<file path=ppt/slides/slide16.xml><?xml version="1.0" encoding="utf-8"?>
+<file path=ppt/slides/slide17.xml><?xml version="1.0" encoding="utf-8"?>
 <p:sld xmlns:a="http://schemas.openxmlformats.org/drawingml/2006/main" xmlns:r="http://schemas.openxmlformats.org/officeDocument/2006/relationships" xmlns:p="http://schemas.openxmlformats.org/presentationml/2006/main">
   <p:cSld>
     <p:spTree>
@@ -35378,18 +35513,17 @@
           <a:lstStyle/>
           <a:p>
             <a:r>
-              <a:rPr lang="en-US" dirty="0" smtClean="0"/>
+              <a:rPr lang="en-US" dirty="0"/>
               <a:t>Common Issues </a:t>
             </a:r>
             <a:r>
-              <a:rPr lang="mr-IN" dirty="0" smtClean="0"/>
+              <a:rPr lang="mr-IN" dirty="0"/>
               <a:t>–</a:t>
             </a:r>
             <a:r>
-              <a:rPr lang="en-US" dirty="0" smtClean="0"/>
+              <a:rPr lang="en-US" dirty="0"/>
               <a:t> Obtaining pivot values</a:t>
             </a:r>
-            <a:endParaRPr lang="en-US" dirty="0"/>
           </a:p>
         </p:txBody>
       </p:sp>
@@ -35409,27 +35543,27 @@
           <a:lstStyle/>
           <a:p>
             <a:r>
-              <a:rPr lang="en-US" dirty="0" smtClean="0"/>
+              <a:rPr lang="en-US" dirty="0"/>
               <a:t>Pivot values are stored in the coordinates of the variables that depend on them</a:t>
             </a:r>
           </a:p>
           <a:p>
             <a:r>
-              <a:rPr lang="en-US" dirty="0" smtClean="0"/>
+              <a:rPr lang="en-US" dirty="0"/>
               <a:t>They are not stored as variables themselves</a:t>
             </a:r>
           </a:p>
           <a:p>
             <a:r>
-              <a:rPr lang="en-US" dirty="0" smtClean="0"/>
+              <a:rPr lang="en-US" dirty="0"/>
               <a:t>Example: Retrieving “time” from inside an </a:t>
             </a:r>
             <a:r>
-              <a:rPr lang="en-US" dirty="0" err="1" smtClean="0"/>
+              <a:rPr lang="en-US" dirty="0" err="1"/>
               <a:t>ExternalModel</a:t>
             </a:r>
             <a:r>
-              <a:rPr lang="en-US" dirty="0" smtClean="0"/>
+              <a:rPr lang="en-US" dirty="0"/>
               <a:t>:</a:t>
             </a:r>
           </a:p>
@@ -35437,31 +35571,27 @@
             <a:endParaRPr lang="en-US" dirty="0"/>
           </a:p>
           <a:p>
-            <a:endParaRPr lang="en-US" dirty="0" smtClean="0"/>
+            <a:endParaRPr lang="en-US" dirty="0"/>
           </a:p>
           <a:p>
-            <a:endParaRPr lang="en-US" dirty="0" smtClean="0"/>
+            <a:endParaRPr lang="en-US" dirty="0"/>
           </a:p>
           <a:p>
             <a:r>
-              <a:rPr lang="en-US" dirty="0" smtClean="0"/>
-              <a:t>From inside RAVEN can access on the data object directly</a:t>
-            </a:r>
-            <a:r>
-              <a:rPr lang="en-US" dirty="0" smtClean="0"/>
-              <a:t>:</a:t>
+              <a:rPr lang="en-US" dirty="0"/>
+              <a:t>From inside RAVEN can access on the data object directly:</a:t>
             </a:r>
           </a:p>
           <a:p>
-            <a:endParaRPr lang="en-US" dirty="0" smtClean="0"/>
+            <a:endParaRPr lang="en-US" dirty="0"/>
           </a:p>
           <a:p>
             <a:r>
-              <a:rPr lang="en-US" dirty="0" smtClean="0"/>
+              <a:rPr lang="en-US" dirty="0"/>
               <a:t>‘time’ should not be listed as input or output variables in the new </a:t>
             </a:r>
             <a:r>
-              <a:rPr lang="en-US" smtClean="0"/>
+              <a:rPr lang="en-US"/>
               <a:t>dataobjects</a:t>
             </a:r>
             <a:endParaRPr lang="en-US" dirty="0"/>
@@ -35471,7 +35601,7 @@
               <a:buNone/>
             </a:pPr>
             <a:r>
-              <a:rPr lang="en-US" dirty="0" smtClean="0"/>
+              <a:rPr lang="en-US" dirty="0"/>
               <a:t>	</a:t>
             </a:r>
           </a:p>
@@ -35495,7 +35625,7 @@
             <a:fld id="{4B4332F1-BAE3-4172-AA6D-91F763B329EF}" type="slidenum">
               <a:rPr lang="en-US" smtClean="0"/>
               <a:pPr/>
-              <a:t>16</a:t>
+              <a:t>17</a:t>
             </a:fld>
             <a:endParaRPr lang="en-US"/>
           </a:p>
@@ -35612,10 +35742,9 @@
           <a:lstStyle/>
           <a:p>
             <a:r>
-              <a:rPr lang="en-US" b="0" dirty="0" smtClean="0"/>
+              <a:rPr lang="en-US" b="0" dirty="0"/>
               <a:t>Outline</a:t>
             </a:r>
-            <a:endParaRPr lang="en-US" b="0" dirty="0"/>
           </a:p>
         </p:txBody>
       </p:sp>
@@ -35639,18 +35768,18 @@
               <a:buAutoNum type="arabicPeriod"/>
             </a:pPr>
             <a:r>
-              <a:rPr lang="en-US" dirty="0" smtClean="0">
+              <a:rPr lang="en-US" dirty="0">
                 <a:solidFill>
                   <a:srgbClr val="3333CC"/>
                 </a:solidFill>
               </a:rPr>
               <a:t>Scope</a:t>
             </a:r>
-            <a:endParaRPr lang="en-US" dirty="0" smtClean="0"/>
+            <a:endParaRPr lang="en-US" dirty="0"/>
           </a:p>
           <a:p>
             <a:pPr lvl="1"/>
-            <a:endParaRPr lang="en-US" dirty="0" smtClean="0"/>
+            <a:endParaRPr lang="en-US" dirty="0"/>
           </a:p>
           <a:p>
             <a:pPr marL="457200" indent="-457200">
@@ -35658,7 +35787,7 @@
               <a:buAutoNum type="arabicPeriod"/>
             </a:pPr>
             <a:r>
-              <a:rPr lang="en-US" dirty="0" smtClean="0">
+              <a:rPr lang="en-US" dirty="0">
                 <a:solidFill>
                   <a:srgbClr val="3333CC"/>
                 </a:solidFill>
@@ -35671,7 +35800,7 @@
               <a:buFont typeface="+mj-lt"/>
               <a:buAutoNum type="arabicPeriod"/>
             </a:pPr>
-            <a:endParaRPr lang="en-US" dirty="0" smtClean="0">
+            <a:endParaRPr lang="en-US" dirty="0">
               <a:solidFill>
                 <a:srgbClr val="3333CC"/>
               </a:solidFill>
@@ -35683,7 +35812,7 @@
               <a:buAutoNum type="arabicPeriod"/>
             </a:pPr>
             <a:r>
-              <a:rPr lang="en-US" dirty="0" smtClean="0">
+              <a:rPr lang="en-US" dirty="0">
                 <a:solidFill>
                   <a:srgbClr val="3333CC"/>
                 </a:solidFill>
@@ -35708,7 +35837,7 @@
               <a:buAutoNum type="arabicPeriod"/>
             </a:pPr>
             <a:r>
-              <a:rPr lang="en-US" dirty="0" smtClean="0">
+              <a:rPr lang="en-US" dirty="0">
                 <a:solidFill>
                   <a:srgbClr val="3333CC"/>
                 </a:solidFill>
@@ -35733,7 +35862,7 @@
               <a:buAutoNum type="arabicPeriod"/>
             </a:pPr>
             <a:r>
-              <a:rPr lang="en-US" dirty="0" smtClean="0">
+              <a:rPr lang="en-US" dirty="0">
                 <a:solidFill>
                   <a:srgbClr val="3333CC"/>
                 </a:solidFill>
@@ -35744,7 +35873,7 @@
           </a:p>
           <a:p>
             <a:pPr lvl="1"/>
-            <a:endParaRPr lang="en-US" dirty="0" smtClean="0"/>
+            <a:endParaRPr lang="en-US" dirty="0"/>
           </a:p>
         </p:txBody>
       </p:sp>
@@ -35789,13 +35918,6 @@
       </p:transition>
     </mc:Fallback>
   </mc:AlternateContent>
-  <p:timing>
-    <p:tnLst>
-      <p:par>
-        <p:cTn xmlns:p14="http://schemas.microsoft.com/office/powerpoint/2010/main" id="1" dur="indefinite" restart="never" nodeType="tmRoot"/>
-      </p:par>
-    </p:tnLst>
-  </p:timing>
 </p:sld>
 </file>
 
@@ -35838,21 +35960,21 @@
           <a:p>
             <a:pPr algn="just"/>
             <a:r>
-              <a:rPr lang="en-US" dirty="0" smtClean="0"/>
+              <a:rPr lang="en-US" dirty="0"/>
               <a:t>The current Data Objects are good, but limited</a:t>
             </a:r>
           </a:p>
           <a:p>
             <a:pPr lvl="1" algn="just"/>
             <a:r>
-              <a:rPr lang="en-US" dirty="0" smtClean="0"/>
+              <a:rPr lang="en-US" dirty="0"/>
               <a:t>1000 variables</a:t>
             </a:r>
           </a:p>
           <a:p>
             <a:pPr lvl="1" algn="just"/>
             <a:r>
-              <a:rPr lang="en-US" dirty="0" smtClean="0"/>
+              <a:rPr lang="en-US" dirty="0"/>
               <a:t>5000 samples</a:t>
             </a:r>
           </a:p>
@@ -35863,58 +35985,58 @@
           <a:p>
             <a:pPr algn="just"/>
             <a:r>
-              <a:rPr lang="en-US" dirty="0" smtClean="0"/>
+              <a:rPr lang="en-US" dirty="0"/>
               <a:t>Reworked </a:t>
             </a:r>
             <a:r>
-              <a:rPr lang="en-US" dirty="0" err="1" smtClean="0"/>
+              <a:rPr lang="en-US" dirty="0" err="1"/>
               <a:t>DataObjects</a:t>
             </a:r>
             <a:r>
-              <a:rPr lang="en-US" dirty="0" smtClean="0"/>
+              <a:rPr lang="en-US" dirty="0"/>
               <a:t> improve by:</a:t>
             </a:r>
           </a:p>
           <a:p>
             <a:pPr lvl="1" algn="just"/>
             <a:r>
-              <a:rPr lang="en-US" dirty="0" smtClean="0"/>
+              <a:rPr lang="en-US" dirty="0"/>
               <a:t>Removing loops over variables</a:t>
             </a:r>
           </a:p>
           <a:p>
             <a:pPr lvl="1" algn="just"/>
             <a:r>
-              <a:rPr lang="en-US" dirty="0" smtClean="0"/>
+              <a:rPr lang="en-US" dirty="0"/>
               <a:t>Adding data by rows/columns instead of single entries</a:t>
             </a:r>
           </a:p>
           <a:p>
             <a:pPr lvl="1" algn="just"/>
             <a:r>
-              <a:rPr lang="en-US" dirty="0" smtClean="0"/>
+              <a:rPr lang="en-US" dirty="0"/>
               <a:t>Accessing powerful data structure management tools</a:t>
             </a:r>
           </a:p>
           <a:p>
             <a:pPr lvl="2" algn="just"/>
             <a:r>
-              <a:rPr lang="en-US" dirty="0" smtClean="0"/>
+              <a:rPr lang="en-US" dirty="0"/>
               <a:t>Pandas, </a:t>
             </a:r>
             <a:r>
-              <a:rPr lang="en-US" dirty="0" err="1" smtClean="0"/>
+              <a:rPr lang="en-US" dirty="0" err="1"/>
               <a:t>Xarray</a:t>
             </a:r>
             <a:r>
-              <a:rPr lang="en-US" dirty="0" smtClean="0"/>
+              <a:rPr lang="en-US" dirty="0"/>
               <a:t>, </a:t>
             </a:r>
             <a:r>
-              <a:rPr lang="en-US" dirty="0" err="1" smtClean="0"/>
+              <a:rPr lang="en-US" dirty="0" err="1"/>
               <a:t>Dask</a:t>
             </a:r>
-            <a:endParaRPr lang="en-US" dirty="0" smtClean="0"/>
+            <a:endParaRPr lang="en-US" dirty="0"/>
           </a:p>
           <a:p>
             <a:pPr lvl="2" algn="just"/>
@@ -35923,28 +36045,28 @@
           <a:p>
             <a:pPr algn="just"/>
             <a:r>
-              <a:rPr lang="en-US" dirty="0" smtClean="0"/>
+              <a:rPr lang="en-US" dirty="0"/>
               <a:t>Sprint work:</a:t>
             </a:r>
           </a:p>
           <a:p>
             <a:pPr lvl="1" algn="just"/>
             <a:r>
-              <a:rPr lang="en-US" dirty="0" smtClean="0"/>
+              <a:rPr lang="en-US" dirty="0"/>
               <a:t>Convert RAVEN entities to use new API</a:t>
             </a:r>
           </a:p>
           <a:p>
             <a:pPr lvl="2" algn="just"/>
             <a:r>
-              <a:rPr lang="en-US" dirty="0" smtClean="0"/>
+              <a:rPr lang="en-US" dirty="0"/>
               <a:t>Simple API conversion</a:t>
             </a:r>
           </a:p>
           <a:p>
             <a:pPr lvl="2" algn="just"/>
             <a:r>
-              <a:rPr lang="en-US" dirty="0" smtClean="0"/>
+              <a:rPr lang="en-US" dirty="0"/>
               <a:t>Rethinking implementation</a:t>
             </a:r>
           </a:p>
@@ -35995,10 +36117,9 @@
           <a:lstStyle/>
           <a:p>
             <a:r>
-              <a:rPr lang="en-US" dirty="0" smtClean="0"/>
+              <a:rPr lang="en-US" dirty="0"/>
               <a:t>Scope</a:t>
             </a:r>
-            <a:endParaRPr lang="en-US" dirty="0"/>
           </a:p>
         </p:txBody>
       </p:sp>
@@ -36024,13 +36145,6 @@
       </p:transition>
     </mc:Fallback>
   </mc:AlternateContent>
-  <p:timing>
-    <p:tnLst>
-      <p:par>
-        <p:cTn xmlns:p14="http://schemas.microsoft.com/office/powerpoint/2010/main" id="1" dur="indefinite" restart="never" nodeType="tmRoot"/>
-      </p:par>
-    </p:tnLst>
-  </p:timing>
 </p:sld>
 </file>
 
@@ -36067,10 +36181,9 @@
           <a:lstStyle/>
           <a:p>
             <a:r>
-              <a:rPr lang="en-US" dirty="0" smtClean="0"/>
+              <a:rPr lang="en-US" dirty="0"/>
               <a:t>New Structure</a:t>
             </a:r>
-            <a:endParaRPr lang="en-US" dirty="0"/>
           </a:p>
         </p:txBody>
       </p:sp>
@@ -36151,7 +36264,7 @@
               <a:tabLst/>
             </a:pPr>
             <a:r>
-              <a:rPr kumimoji="0" lang="en-US" sz="2400" b="0" i="0" u="none" strike="noStrike" cap="none" normalizeH="0" baseline="0" smtClean="0">
+              <a:rPr kumimoji="0" lang="en-US" sz="2400" b="0" i="0" u="none" strike="noStrike" cap="none" normalizeH="0" baseline="0">
                 <a:ln>
                   <a:noFill/>
                 </a:ln>
@@ -36163,7 +36276,7 @@
               </a:rPr>
               <a:t>DataObject</a:t>
             </a:r>
-            <a:endParaRPr kumimoji="0" lang="en-US" sz="2400" b="0" i="0" u="none" strike="noStrike" cap="none" normalizeH="0" baseline="0" dirty="0" smtClean="0">
+            <a:endParaRPr kumimoji="0" lang="en-US" sz="2400" b="0" i="0" u="none" strike="noStrike" cap="none" normalizeH="0" baseline="0" dirty="0">
               <a:ln>
                 <a:noFill/>
               </a:ln>
@@ -36229,7 +36342,7 @@
               <a:tabLst/>
             </a:pPr>
             <a:r>
-              <a:rPr kumimoji="0" lang="en-US" sz="2400" b="0" i="0" u="none" strike="noStrike" cap="none" normalizeH="0" baseline="0" smtClean="0">
+              <a:rPr kumimoji="0" lang="en-US" sz="2400" b="0" i="0" u="none" strike="noStrike" cap="none" normalizeH="0" baseline="0">
                 <a:ln>
                   <a:noFill/>
                 </a:ln>
@@ -36241,7 +36354,7 @@
               </a:rPr>
               <a:t>DataSet</a:t>
             </a:r>
-            <a:endParaRPr kumimoji="0" lang="en-US" sz="2400" b="0" i="0" u="none" strike="noStrike" cap="none" normalizeH="0" baseline="0" dirty="0" smtClean="0">
+            <a:endParaRPr kumimoji="0" lang="en-US" sz="2400" b="0" i="0" u="none" strike="noStrike" cap="none" normalizeH="0" baseline="0" dirty="0">
               <a:ln>
                 <a:noFill/>
               </a:ln>
@@ -36307,7 +36420,7 @@
               <a:tabLst/>
             </a:pPr>
             <a:r>
-              <a:rPr kumimoji="0" lang="en-US" sz="2400" b="0" i="0" u="none" strike="noStrike" cap="none" normalizeH="0" baseline="0" dirty="0" err="1" smtClean="0">
+              <a:rPr kumimoji="0" lang="en-US" sz="2400" b="0" i="0" u="none" strike="noStrike" cap="none" normalizeH="0" baseline="0" dirty="0" err="1">
                 <a:ln>
                   <a:noFill/>
                 </a:ln>
@@ -36319,7 +36432,7 @@
               </a:rPr>
               <a:t>PointSet</a:t>
             </a:r>
-            <a:endParaRPr kumimoji="0" lang="en-US" sz="2400" b="0" i="0" u="none" strike="noStrike" cap="none" normalizeH="0" baseline="0" dirty="0" smtClean="0">
+            <a:endParaRPr kumimoji="0" lang="en-US" sz="2400" b="0" i="0" u="none" strike="noStrike" cap="none" normalizeH="0" baseline="0" dirty="0">
               <a:ln>
                 <a:noFill/>
               </a:ln>
@@ -36385,7 +36498,7 @@
               <a:tabLst/>
             </a:pPr>
             <a:r>
-              <a:rPr kumimoji="0" lang="en-US" sz="2400" b="0" i="0" u="none" strike="noStrike" cap="none" normalizeH="0" baseline="0" dirty="0" err="1" smtClean="0">
+              <a:rPr kumimoji="0" lang="en-US" sz="2400" b="0" i="0" u="none" strike="noStrike" cap="none" normalizeH="0" baseline="0" dirty="0" err="1">
                 <a:ln>
                   <a:noFill/>
                 </a:ln>
@@ -36397,7 +36510,7 @@
               </a:rPr>
               <a:t>HistorySet</a:t>
             </a:r>
-            <a:endParaRPr kumimoji="0" lang="en-US" sz="2400" b="0" i="0" u="none" strike="noStrike" cap="none" normalizeH="0" baseline="0" dirty="0" smtClean="0">
+            <a:endParaRPr kumimoji="0" lang="en-US" sz="2400" b="0" i="0" u="none" strike="noStrike" cap="none" normalizeH="0" baseline="0" dirty="0">
               <a:ln>
                 <a:noFill/>
               </a:ln>
@@ -36559,7 +36672,7 @@
               <a:tabLst/>
             </a:pPr>
             <a:r>
-              <a:rPr kumimoji="0" lang="en-US" sz="2400" b="0" i="0" u="none" strike="noStrike" cap="none" normalizeH="0" baseline="0" dirty="0" err="1" smtClean="0">
+              <a:rPr kumimoji="0" lang="en-US" sz="2400" b="0" i="0" u="none" strike="noStrike" cap="none" normalizeH="0" baseline="0" dirty="0" err="1">
                 <a:ln>
                   <a:noFill/>
                 </a:ln>
@@ -36571,7 +36684,7 @@
               </a:rPr>
               <a:t>BaseType</a:t>
             </a:r>
-            <a:endParaRPr kumimoji="0" lang="en-US" sz="2400" b="0" i="0" u="none" strike="noStrike" cap="none" normalizeH="0" baseline="0" dirty="0" smtClean="0">
+            <a:endParaRPr kumimoji="0" lang="en-US" sz="2400" b="0" i="0" u="none" strike="noStrike" cap="none" normalizeH="0" baseline="0" dirty="0">
               <a:ln>
                 <a:noFill/>
               </a:ln>
@@ -36616,6 +36729,157 @@
           <a:effectLst/>
         </p:spPr>
       </p:cxnSp>
+      <p:sp>
+        <p:nvSpPr>
+          <p:cNvPr id="13" name="Rounded Rectangle 12">
+            <a:extLst>
+              <a:ext uri="{FF2B5EF4-FFF2-40B4-BE49-F238E27FC236}">
+                <a16:creationId xmlns:a16="http://schemas.microsoft.com/office/drawing/2014/main" id="{390D45A6-588E-8B4E-9734-EDDD57206C1A}"/>
+              </a:ext>
+            </a:extLst>
+          </p:cNvPr>
+          <p:cNvSpPr/>
+          <p:nvPr/>
+        </p:nvSpPr>
+        <p:spPr bwMode="auto">
+          <a:xfrm>
+            <a:off x="6500191" y="3992078"/>
+            <a:ext cx="1762539" cy="516835"/>
+          </a:xfrm>
+          <a:prstGeom prst="roundRect">
+            <a:avLst/>
+          </a:prstGeom>
+          <a:solidFill>
+            <a:srgbClr val="FF6600"/>
+          </a:solidFill>
+          <a:ln w="9525" cap="flat" cmpd="sng" algn="ctr">
+            <a:solidFill>
+              <a:schemeClr val="tx1"/>
+            </a:solidFill>
+            <a:prstDash val="solid"/>
+            <a:round/>
+            <a:headEnd type="none" w="med" len="med"/>
+            <a:tailEnd type="none" w="med" len="med"/>
+          </a:ln>
+          <a:effectLst/>
+        </p:spPr>
+        <p:txBody>
+          <a:bodyPr vert="horz" wrap="square" lIns="91440" tIns="45720" rIns="91440" bIns="45720" numCol="1" rtlCol="0" anchor="ctr" anchorCtr="1" compatLnSpc="1">
+            <a:prstTxWarp prst="textNoShape">
+              <a:avLst/>
+            </a:prstTxWarp>
+          </a:bodyPr>
+          <a:lstStyle/>
+          <a:p>
+            <a:pPr marL="0" marR="0" indent="0" algn="l" defTabSz="914400" rtl="0" eaLnBrk="0" fontAlgn="base" latinLnBrk="0" hangingPunct="0">
+              <a:lnSpc>
+                <a:spcPct val="100000"/>
+              </a:lnSpc>
+              <a:spcBef>
+                <a:spcPct val="0"/>
+              </a:spcBef>
+              <a:spcAft>
+                <a:spcPct val="0"/>
+              </a:spcAft>
+              <a:buClrTx/>
+              <a:buSzTx/>
+              <a:buFontTx/>
+              <a:buNone/>
+              <a:tabLst/>
+            </a:pPr>
+            <a:r>
+              <a:rPr kumimoji="0" lang="en-US" sz="2400" b="0" i="0" u="none" strike="noStrike" cap="none" normalizeH="0" baseline="0" dirty="0">
+                <a:ln>
+                  <a:noFill/>
+                </a:ln>
+                <a:solidFill>
+                  <a:schemeClr val="tx1"/>
+                </a:solidFill>
+                <a:effectLst/>
+                <a:latin typeface="Times New Roman" pitchFamily="18" charset="0"/>
+              </a:rPr>
+              <a:t>Database</a:t>
+            </a:r>
+          </a:p>
+        </p:txBody>
+      </p:sp>
+      <p:cxnSp>
+        <p:nvCxnSpPr>
+          <p:cNvPr id="14" name="Straight Arrow Connector 13">
+            <a:extLst>
+              <a:ext uri="{FF2B5EF4-FFF2-40B4-BE49-F238E27FC236}">
+                <a16:creationId xmlns:a16="http://schemas.microsoft.com/office/drawing/2014/main" id="{441FB017-54AE-D14A-926A-8CDC716F11F8}"/>
+              </a:ext>
+            </a:extLst>
+          </p:cNvPr>
+          <p:cNvCxnSpPr>
+            <a:cxnSpLocks/>
+            <a:stCxn id="13" idx="0"/>
+            <a:endCxn id="5" idx="2"/>
+          </p:cNvCxnSpPr>
+          <p:nvPr/>
+        </p:nvCxnSpPr>
+        <p:spPr bwMode="auto">
+          <a:xfrm flipH="1" flipV="1">
+            <a:off x="4379844" y="3571460"/>
+            <a:ext cx="3001617" cy="420618"/>
+          </a:xfrm>
+          <a:prstGeom prst="straightConnector1">
+            <a:avLst/>
+          </a:prstGeom>
+          <a:solidFill>
+            <a:schemeClr val="accent1"/>
+          </a:solidFill>
+          <a:ln w="9525" cap="flat" cmpd="sng" algn="ctr">
+            <a:solidFill>
+              <a:schemeClr val="tx1"/>
+            </a:solidFill>
+            <a:prstDash val="solid"/>
+            <a:round/>
+            <a:headEnd type="none" w="med" len="med"/>
+            <a:tailEnd type="triangle"/>
+          </a:ln>
+          <a:effectLst/>
+        </p:spPr>
+      </p:cxnSp>
+      <p:cxnSp>
+        <p:nvCxnSpPr>
+          <p:cNvPr id="17" name="Straight Arrow Connector 16">
+            <a:extLst>
+              <a:ext uri="{FF2B5EF4-FFF2-40B4-BE49-F238E27FC236}">
+                <a16:creationId xmlns:a16="http://schemas.microsoft.com/office/drawing/2014/main" id="{BF12E0B2-86C3-8741-917D-4CDC5B6CA458}"/>
+              </a:ext>
+            </a:extLst>
+          </p:cNvPr>
+          <p:cNvCxnSpPr>
+            <a:cxnSpLocks/>
+            <a:stCxn id="13" idx="2"/>
+          </p:cNvCxnSpPr>
+          <p:nvPr/>
+        </p:nvCxnSpPr>
+        <p:spPr bwMode="auto">
+          <a:xfrm>
+            <a:off x="7381461" y="4508913"/>
+            <a:ext cx="1762538" cy="596347"/>
+          </a:xfrm>
+          <a:prstGeom prst="straightConnector1">
+            <a:avLst/>
+          </a:prstGeom>
+          <a:solidFill>
+            <a:schemeClr val="accent1"/>
+          </a:solidFill>
+          <a:ln w="9525" cap="flat" cmpd="sng" algn="ctr">
+            <a:solidFill>
+              <a:schemeClr val="tx1"/>
+            </a:solidFill>
+            <a:prstDash val="solid"/>
+            <a:round/>
+            <a:headEnd type="none" w="med" len="med"/>
+            <a:tailEnd type="triangle"/>
+          </a:ln>
+          <a:effectLst/>
+        </p:spPr>
+      </p:cxnSp>
     </p:spTree>
     <p:extLst>
       <p:ext uri="{BB962C8B-B14F-4D97-AF65-F5344CB8AC3E}">
@@ -36626,13 +36890,6 @@
   <p:clrMapOvr>
     <a:masterClrMapping/>
   </p:clrMapOvr>
-  <p:timing>
-    <p:tnLst>
-      <p:par>
-        <p:cTn xmlns:p14="http://schemas.microsoft.com/office/powerpoint/2010/main" id="1" dur="indefinite" restart="never" nodeType="tmRoot"/>
-      </p:par>
-    </p:tnLst>
-  </p:timing>
 </p:sld>
 </file>
 
@@ -36675,15 +36932,15 @@
           <a:p>
             <a:pPr algn="just"/>
             <a:r>
-              <a:rPr lang="en-US" dirty="0" smtClean="0"/>
+              <a:rPr lang="en-US" dirty="0"/>
               <a:t>Base Class: </a:t>
             </a:r>
             <a:r>
-              <a:rPr lang="en-US" dirty="0" err="1" smtClean="0"/>
+              <a:rPr lang="en-US" dirty="0" err="1"/>
               <a:t>XDataObject.</a:t>
             </a:r>
             <a:r>
-              <a:rPr lang="en-US" dirty="0" err="1" smtClean="0">
+              <a:rPr lang="en-US" dirty="0" err="1">
                 <a:solidFill>
                   <a:schemeClr val="accent1"/>
                 </a:solidFill>
@@ -36691,11 +36948,11 @@
               <a:t>DataObject</a:t>
             </a:r>
             <a:r>
-              <a:rPr lang="en-US" dirty="0" smtClean="0"/>
+              <a:rPr lang="en-US" dirty="0"/>
               <a:t>( </a:t>
             </a:r>
             <a:r>
-              <a:rPr lang="en-US" dirty="0" err="1" smtClean="0">
+              <a:rPr lang="en-US" dirty="0" err="1">
                 <a:solidFill>
                   <a:schemeClr val="accent6"/>
                 </a:solidFill>
@@ -36703,7 +36960,7 @@
               <a:t>BaseType</a:t>
             </a:r>
             <a:r>
-              <a:rPr lang="en-US" dirty="0" smtClean="0">
+              <a:rPr lang="en-US" dirty="0">
                 <a:solidFill>
                   <a:schemeClr val="accent6"/>
                 </a:solidFill>
@@ -36711,46 +36968,46 @@
               <a:t> </a:t>
             </a:r>
             <a:r>
-              <a:rPr lang="en-US" dirty="0" smtClean="0"/>
+              <a:rPr lang="en-US" dirty="0"/>
               <a:t>)</a:t>
             </a:r>
           </a:p>
           <a:p>
             <a:pPr lvl="1" algn="just"/>
             <a:r>
-              <a:rPr lang="en-US" dirty="0" smtClean="0"/>
+              <a:rPr lang="en-US" dirty="0"/>
               <a:t>Input specifications, </a:t>
             </a:r>
             <a:r>
-              <a:rPr lang="en-US" dirty="0" err="1" smtClean="0"/>
+              <a:rPr lang="en-US" dirty="0" err="1"/>
               <a:t>readMoreXML</a:t>
             </a:r>
             <a:r>
-              <a:rPr lang="en-US" dirty="0" smtClean="0"/>
+              <a:rPr lang="en-US" dirty="0"/>
               <a:t>, </a:t>
             </a:r>
             <a:r>
-              <a:rPr lang="en-US" dirty="0" err="1" smtClean="0"/>
+              <a:rPr lang="en-US" dirty="0" err="1"/>
               <a:t>setPivotParams</a:t>
             </a:r>
-            <a:endParaRPr lang="en-US" dirty="0" smtClean="0"/>
+            <a:endParaRPr lang="en-US" dirty="0"/>
           </a:p>
           <a:p>
             <a:pPr lvl="1" algn="just"/>
-            <a:endParaRPr lang="en-US" dirty="0" smtClean="0"/>
+            <a:endParaRPr lang="en-US" dirty="0"/>
           </a:p>
           <a:p>
             <a:pPr algn="just"/>
             <a:r>
-              <a:rPr lang="en-US" dirty="0" smtClean="0"/>
+              <a:rPr lang="en-US" dirty="0"/>
               <a:t>ND set: </a:t>
             </a:r>
             <a:r>
-              <a:rPr lang="en-US" dirty="0" err="1" smtClean="0"/>
+              <a:rPr lang="en-US" dirty="0" err="1"/>
               <a:t>XDataSet.</a:t>
             </a:r>
             <a:r>
-              <a:rPr lang="en-US" dirty="0" err="1" smtClean="0">
+              <a:rPr lang="en-US" dirty="0" err="1">
                 <a:solidFill>
                   <a:srgbClr val="FF6600"/>
                 </a:solidFill>
@@ -36758,11 +37015,11 @@
               <a:t>DataSet</a:t>
             </a:r>
             <a:r>
-              <a:rPr lang="en-US" dirty="0" smtClean="0"/>
+              <a:rPr lang="en-US" dirty="0"/>
               <a:t>( </a:t>
             </a:r>
             <a:r>
-              <a:rPr lang="en-US" dirty="0" err="1" smtClean="0">
+              <a:rPr lang="en-US" dirty="0" err="1">
                 <a:solidFill>
                   <a:schemeClr val="accent1"/>
                 </a:solidFill>
@@ -36770,7 +37027,7 @@
               <a:t>DataObject</a:t>
             </a:r>
             <a:r>
-              <a:rPr lang="en-US" dirty="0" smtClean="0">
+              <a:rPr lang="en-US" dirty="0">
                 <a:solidFill>
                   <a:schemeClr val="accent1"/>
                 </a:solidFill>
@@ -36778,21 +37035,21 @@
               <a:t> </a:t>
             </a:r>
             <a:r>
-              <a:rPr lang="en-US" dirty="0" smtClean="0"/>
+              <a:rPr lang="en-US" dirty="0"/>
               <a:t>)</a:t>
             </a:r>
           </a:p>
           <a:p>
             <a:pPr lvl="1" algn="just"/>
             <a:r>
-              <a:rPr lang="en-US" dirty="0" smtClean="0"/>
+              <a:rPr lang="en-US" dirty="0"/>
               <a:t>General implementation, works for arbitrary ragged data</a:t>
             </a:r>
           </a:p>
           <a:p>
             <a:pPr lvl="1" algn="just"/>
             <a:r>
-              <a:rPr lang="en-US" dirty="0" smtClean="0"/>
+              <a:rPr lang="en-US" dirty="0"/>
               <a:t>API is fully defined here, not customized in other objects</a:t>
             </a:r>
           </a:p>
@@ -36803,19 +37060,19 @@
           <a:p>
             <a:pPr algn="just"/>
             <a:r>
-              <a:rPr lang="en-US" dirty="0" smtClean="0"/>
+              <a:rPr lang="en-US" dirty="0"/>
               <a:t>Point set: </a:t>
             </a:r>
             <a:r>
-              <a:rPr lang="en-US" dirty="0" err="1" smtClean="0"/>
+              <a:rPr lang="en-US" dirty="0" err="1"/>
               <a:t>XPointSet.PointSet</a:t>
             </a:r>
             <a:r>
-              <a:rPr lang="en-US" dirty="0" smtClean="0"/>
+              <a:rPr lang="en-US" dirty="0"/>
               <a:t>( </a:t>
             </a:r>
             <a:r>
-              <a:rPr lang="en-US" dirty="0" err="1" smtClean="0">
+              <a:rPr lang="en-US" dirty="0" err="1">
                 <a:solidFill>
                   <a:srgbClr val="FF6600"/>
                 </a:solidFill>
@@ -36823,7 +37080,7 @@
               <a:t>DataSet</a:t>
             </a:r>
             <a:r>
-              <a:rPr lang="en-US" dirty="0" smtClean="0">
+              <a:rPr lang="en-US" dirty="0">
                 <a:solidFill>
                   <a:srgbClr val="FF6600"/>
                 </a:solidFill>
@@ -36831,28 +37088,28 @@
               <a:t> </a:t>
             </a:r>
             <a:r>
-              <a:rPr lang="en-US" dirty="0" smtClean="0"/>
+              <a:rPr lang="en-US" dirty="0"/>
               <a:t>)</a:t>
             </a:r>
           </a:p>
           <a:p>
             <a:pPr lvl="1" algn="just"/>
             <a:r>
-              <a:rPr lang="en-US" dirty="0" smtClean="0"/>
+              <a:rPr lang="en-US" dirty="0"/>
               <a:t>Requires all single-value entries for inputs, outputs</a:t>
             </a:r>
           </a:p>
           <a:p>
             <a:pPr lvl="1" algn="just"/>
             <a:r>
-              <a:rPr lang="en-US" dirty="0" smtClean="0"/>
+              <a:rPr lang="en-US" dirty="0"/>
               <a:t>Specialization of </a:t>
             </a:r>
             <a:r>
-              <a:rPr lang="en-US" dirty="0" err="1" smtClean="0"/>
+              <a:rPr lang="en-US" dirty="0" err="1"/>
               <a:t>DataSet</a:t>
             </a:r>
-            <a:endParaRPr lang="en-US" dirty="0" smtClean="0"/>
+            <a:endParaRPr lang="en-US" dirty="0"/>
           </a:p>
           <a:p>
             <a:pPr lvl="1" algn="just"/>
@@ -36861,19 +37118,19 @@
           <a:p>
             <a:pPr algn="just"/>
             <a:r>
-              <a:rPr lang="en-US" dirty="0" smtClean="0"/>
+              <a:rPr lang="en-US" dirty="0"/>
               <a:t>History set: </a:t>
             </a:r>
             <a:r>
-              <a:rPr lang="en-US" dirty="0" err="1" smtClean="0"/>
+              <a:rPr lang="en-US" dirty="0" err="1"/>
               <a:t>XHistorySet.HistorySet</a:t>
             </a:r>
             <a:r>
-              <a:rPr lang="en-US" dirty="0" smtClean="0"/>
+              <a:rPr lang="en-US" dirty="0"/>
               <a:t>( </a:t>
             </a:r>
             <a:r>
-              <a:rPr lang="en-US" dirty="0" err="1" smtClean="0">
+              <a:rPr lang="en-US" dirty="0" err="1">
                 <a:solidFill>
                   <a:srgbClr val="FF6600"/>
                 </a:solidFill>
@@ -36881,7 +37138,7 @@
               <a:t>DataSet</a:t>
             </a:r>
             <a:r>
-              <a:rPr lang="en-US" dirty="0" smtClean="0">
+              <a:rPr lang="en-US" dirty="0">
                 <a:solidFill>
                   <a:srgbClr val="FF6600"/>
                 </a:solidFill>
@@ -36889,25 +37146,25 @@
               <a:t> </a:t>
             </a:r>
             <a:r>
-              <a:rPr lang="en-US" dirty="0" smtClean="0"/>
+              <a:rPr lang="en-US" dirty="0"/>
               <a:t>)</a:t>
             </a:r>
           </a:p>
           <a:p>
             <a:pPr lvl="1" algn="just"/>
             <a:r>
-              <a:rPr lang="en-US" dirty="0" smtClean="0"/>
+              <a:rPr lang="en-US" dirty="0"/>
               <a:t>Requires single-value inputs, shared-pivot outputs</a:t>
             </a:r>
           </a:p>
           <a:p>
             <a:pPr lvl="1" algn="just"/>
             <a:r>
-              <a:rPr lang="en-US" dirty="0" smtClean="0"/>
+              <a:rPr lang="en-US" dirty="0"/>
               <a:t>Specialization of </a:t>
             </a:r>
             <a:r>
-              <a:rPr lang="en-US" dirty="0" err="1" smtClean="0"/>
+              <a:rPr lang="en-US" dirty="0" err="1"/>
               <a:t>DataSet</a:t>
             </a:r>
             <a:endParaRPr lang="en-US" dirty="0"/>
@@ -36959,10 +37216,9 @@
           <a:lstStyle/>
           <a:p>
             <a:r>
-              <a:rPr lang="en-US" dirty="0" smtClean="0"/>
+              <a:rPr lang="en-US" dirty="0"/>
               <a:t>New Structure</a:t>
             </a:r>
-            <a:endParaRPr lang="en-US" dirty="0"/>
           </a:p>
         </p:txBody>
       </p:sp>
@@ -36988,13 +37244,6 @@
       </p:transition>
     </mc:Fallback>
   </mc:AlternateContent>
-  <p:timing>
-    <p:tnLst>
-      <p:par>
-        <p:cTn xmlns:p14="http://schemas.microsoft.com/office/powerpoint/2010/main" id="1" dur="indefinite" restart="never" nodeType="tmRoot"/>
-      </p:par>
-    </p:tnLst>
-  </p:timing>
 </p:sld>
 </file>
 
@@ -37037,11 +37286,11 @@
           <a:p>
             <a:pPr algn="just"/>
             <a:r>
-              <a:rPr lang="en-US" dirty="0" smtClean="0"/>
+              <a:rPr lang="en-US" dirty="0"/>
               <a:t>Defined in the first part of </a:t>
             </a:r>
             <a:r>
-              <a:rPr lang="en-US" dirty="0" err="1" smtClean="0">
+              <a:rPr lang="en-US" dirty="0" err="1">
                 <a:solidFill>
                   <a:srgbClr val="FF6600"/>
                 </a:solidFill>
@@ -37049,7 +37298,7 @@
               <a:t>DataSet</a:t>
             </a:r>
             <a:r>
-              <a:rPr lang="en-US" dirty="0" smtClean="0">
+              <a:rPr lang="en-US" dirty="0">
                 <a:solidFill>
                   <a:srgbClr val="FF6600"/>
                 </a:solidFill>
@@ -37057,59 +37306,58 @@
               <a:t> </a:t>
             </a:r>
             <a:r>
-              <a:rPr lang="en-US" dirty="0" smtClean="0"/>
+              <a:rPr lang="en-US" dirty="0"/>
               <a:t>class in </a:t>
             </a:r>
             <a:r>
-              <a:rPr lang="en-US" dirty="0" err="1" smtClean="0"/>
+              <a:rPr lang="en-US" dirty="0" err="1"/>
               <a:t>XDataSet.py</a:t>
             </a:r>
-            <a:endParaRPr lang="en-US" dirty="0" smtClean="0"/>
+            <a:endParaRPr lang="en-US" dirty="0"/>
           </a:p>
           <a:p>
             <a:pPr lvl="1" algn="just"/>
-            <a:endParaRPr lang="en-US" dirty="0" smtClean="0"/>
+            <a:endParaRPr lang="en-US" dirty="0"/>
           </a:p>
           <a:p>
             <a:pPr lvl="1" algn="just"/>
             <a:r>
-              <a:rPr lang="en-US" dirty="0" smtClean="0"/>
+              <a:rPr lang="en-US" dirty="0"/>
               <a:t>No overlap with existing API</a:t>
             </a:r>
           </a:p>
           <a:p>
             <a:pPr lvl="2" algn="just"/>
             <a:r>
-              <a:rPr lang="en-US" dirty="0" smtClean="0"/>
+              <a:rPr lang="en-US" dirty="0"/>
               <a:t>When transitioning, all old </a:t>
             </a:r>
             <a:r>
-              <a:rPr lang="en-US" dirty="0" err="1" smtClean="0"/>
+              <a:rPr lang="en-US" dirty="0" err="1"/>
               <a:t>DataObject</a:t>
             </a:r>
             <a:r>
-              <a:rPr lang="en-US" dirty="0" smtClean="0"/>
+              <a:rPr lang="en-US" dirty="0"/>
               <a:t> calls will error</a:t>
             </a:r>
           </a:p>
           <a:p>
             <a:pPr lvl="1" algn="just"/>
-            <a:endParaRPr lang="en-US" dirty="0" smtClean="0"/>
+            <a:endParaRPr lang="en-US" dirty="0"/>
           </a:p>
           <a:p>
             <a:pPr lvl="1" algn="just"/>
             <a:r>
-              <a:rPr lang="en-US" dirty="0" smtClean="0"/>
+              <a:rPr lang="en-US" dirty="0"/>
               <a:t>Most methods only do 1 action</a:t>
             </a:r>
           </a:p>
           <a:p>
             <a:pPr lvl="2" algn="just"/>
             <a:r>
-              <a:rPr lang="en-US" dirty="0" smtClean="0"/>
+              <a:rPr lang="en-US" dirty="0"/>
               <a:t>Call sub-methods for other actions</a:t>
             </a:r>
-            <a:endParaRPr lang="en-US" dirty="0"/>
           </a:p>
         </p:txBody>
       </p:sp>
@@ -37158,10 +37406,9 @@
           <a:lstStyle/>
           <a:p>
             <a:r>
-              <a:rPr lang="en-US" b="0" dirty="0" smtClean="0"/>
+              <a:rPr lang="en-US" b="0" dirty="0"/>
               <a:t>New API</a:t>
             </a:r>
-            <a:endParaRPr lang="en-US" b="0" dirty="0"/>
           </a:p>
         </p:txBody>
       </p:sp>
@@ -37187,7 +37434,7 @@
         </p:blipFill>
         <p:spPr>
           <a:xfrm>
-            <a:off x="723549" y="0"/>
+            <a:off x="1280411" y="-87085"/>
             <a:ext cx="7695314" cy="6858000"/>
           </a:xfrm>
           <a:prstGeom prst="rect">
@@ -37220,7 +37467,7 @@
   <p:timing>
     <p:tnLst>
       <p:par>
-        <p:cTn xmlns:p14="http://schemas.microsoft.com/office/powerpoint/2010/main" id="1" dur="indefinite" restart="never" nodeType="tmRoot">
+        <p:cTn id="1" dur="indefinite" restart="never" nodeType="tmRoot">
           <p:childTnLst>
             <p:seq concurrent="1" nextAc="seek">
               <p:cTn id="2" dur="indefinite" nodeType="mainSeq">
@@ -37342,11 +37589,11 @@
           <a:p>
             <a:pPr algn="just"/>
             <a:r>
-              <a:rPr lang="en-US" dirty="0" smtClean="0"/>
+              <a:rPr lang="en-US" dirty="0"/>
               <a:t>Want to add a </a:t>
             </a:r>
             <a:r>
-              <a:rPr lang="en-US" dirty="0" smtClean="0">
+              <a:rPr lang="en-US" dirty="0">
                 <a:solidFill>
                   <a:srgbClr val="00B050"/>
                 </a:solidFill>
@@ -37354,14 +37601,14 @@
               <a:t>realization</a:t>
             </a:r>
             <a:r>
-              <a:rPr lang="en-US" dirty="0" smtClean="0"/>
+              <a:rPr lang="en-US" dirty="0"/>
               <a:t>?</a:t>
             </a:r>
           </a:p>
           <a:p>
             <a:pPr lvl="1" algn="just"/>
             <a:r>
-              <a:rPr lang="en-US" dirty="0" err="1" smtClean="0">
+              <a:rPr lang="en-US" dirty="0" err="1">
                 <a:latin typeface="Consolas" charset="0"/>
                 <a:ea typeface="Consolas" charset="0"/>
                 <a:cs typeface="Consolas" charset="0"/>
@@ -37369,7 +37616,7 @@
               <a:t>data.addRealization</a:t>
             </a:r>
             <a:r>
-              <a:rPr lang="en-US" dirty="0" smtClean="0">
+              <a:rPr lang="en-US" dirty="0">
                 <a:latin typeface="Consolas" charset="0"/>
                 <a:ea typeface="Consolas" charset="0"/>
                 <a:cs typeface="Consolas" charset="0"/>
@@ -37377,7 +37624,7 @@
               <a:t>(</a:t>
             </a:r>
             <a:r>
-              <a:rPr lang="en-US" dirty="0" err="1" smtClean="0">
+              <a:rPr lang="en-US" dirty="0" err="1">
                 <a:latin typeface="Consolas" charset="0"/>
                 <a:ea typeface="Consolas" charset="0"/>
                 <a:cs typeface="Consolas" charset="0"/>
@@ -37385,7 +37632,7 @@
               <a:t>rlz</a:t>
             </a:r>
             <a:r>
-              <a:rPr lang="en-US" dirty="0" smtClean="0">
+              <a:rPr lang="en-US" dirty="0">
                 <a:latin typeface="Consolas" charset="0"/>
                 <a:ea typeface="Consolas" charset="0"/>
                 <a:cs typeface="Consolas" charset="0"/>
@@ -37396,29 +37643,29 @@
           <a:p>
             <a:pPr lvl="2" algn="just"/>
             <a:r>
-              <a:rPr lang="en-US" dirty="0" smtClean="0"/>
+              <a:rPr lang="en-US" dirty="0"/>
               <a:t>Takes a dictionary of </a:t>
             </a:r>
             <a:r>
-              <a:rPr lang="en-US" dirty="0" err="1" smtClean="0"/>
+              <a:rPr lang="en-US" dirty="0" err="1"/>
               <a:t>np.array</a:t>
             </a:r>
             <a:r>
-              <a:rPr lang="en-US" dirty="0" smtClean="0"/>
+              <a:rPr lang="en-US" dirty="0"/>
               <a:t> (1-d for single-value)</a:t>
             </a:r>
           </a:p>
           <a:p>
             <a:pPr lvl="2" algn="just"/>
             <a:r>
-              <a:rPr lang="en-US" dirty="0" smtClean="0"/>
+              <a:rPr lang="en-US" dirty="0"/>
               <a:t>Coordinates added separate from dependents</a:t>
             </a:r>
           </a:p>
           <a:p>
             <a:pPr lvl="2" algn="just"/>
             <a:r>
-              <a:rPr lang="en-US" dirty="0" smtClean="0"/>
+              <a:rPr lang="en-US" dirty="0"/>
               <a:t>Example:</a:t>
             </a:r>
           </a:p>
@@ -37428,16 +37675,16 @@
           </a:p>
           <a:p>
             <a:pPr algn="just"/>
-            <a:endParaRPr lang="en-US" dirty="0" smtClean="0"/>
+            <a:endParaRPr lang="en-US" dirty="0"/>
           </a:p>
           <a:p>
             <a:pPr algn="just"/>
             <a:r>
-              <a:rPr lang="en-US" dirty="0" smtClean="0"/>
+              <a:rPr lang="en-US" dirty="0"/>
               <a:t>Want to add a </a:t>
             </a:r>
             <a:r>
-              <a:rPr lang="en-US" dirty="0" smtClean="0">
+              <a:rPr lang="en-US" dirty="0">
                 <a:solidFill>
                   <a:srgbClr val="00B050"/>
                 </a:solidFill>
@@ -37445,14 +37692,14 @@
               <a:t>new variable</a:t>
             </a:r>
             <a:r>
-              <a:rPr lang="en-US" dirty="0" smtClean="0"/>
+              <a:rPr lang="en-US" dirty="0"/>
               <a:t>?</a:t>
             </a:r>
           </a:p>
           <a:p>
             <a:pPr lvl="1" algn="just"/>
             <a:r>
-              <a:rPr lang="en-US" dirty="0" err="1" smtClean="0">
+              <a:rPr lang="en-US" dirty="0" err="1">
                 <a:latin typeface="Consolas" charset="0"/>
                 <a:ea typeface="Consolas" charset="0"/>
                 <a:cs typeface="Consolas" charset="0"/>
@@ -37460,7 +37707,7 @@
               <a:t>data.addVariable</a:t>
             </a:r>
             <a:r>
-              <a:rPr lang="en-US" dirty="0" smtClean="0">
+              <a:rPr lang="en-US" dirty="0">
                 <a:latin typeface="Consolas" charset="0"/>
                 <a:ea typeface="Consolas" charset="0"/>
                 <a:cs typeface="Consolas" charset="0"/>
@@ -37468,7 +37715,7 @@
               <a:t>(</a:t>
             </a:r>
             <a:r>
-              <a:rPr lang="en-US" dirty="0" err="1" smtClean="0">
+              <a:rPr lang="en-US" dirty="0" err="1">
                 <a:latin typeface="Consolas" charset="0"/>
                 <a:ea typeface="Consolas" charset="0"/>
                 <a:cs typeface="Consolas" charset="0"/>
@@ -37476,7 +37723,7 @@
               <a:t>varName,values</a:t>
             </a:r>
             <a:r>
-              <a:rPr lang="en-US" dirty="0" smtClean="0">
+              <a:rPr lang="en-US" dirty="0">
                 <a:latin typeface="Consolas" charset="0"/>
                 <a:ea typeface="Consolas" charset="0"/>
                 <a:cs typeface="Consolas" charset="0"/>
@@ -37487,44 +37734,44 @@
           <a:p>
             <a:pPr lvl="2" algn="just"/>
             <a:r>
-              <a:rPr lang="en-US" dirty="0" smtClean="0"/>
+              <a:rPr lang="en-US" dirty="0"/>
               <a:t>name is string name</a:t>
             </a:r>
           </a:p>
           <a:p>
             <a:pPr lvl="2" algn="just"/>
             <a:r>
-              <a:rPr lang="en-US" dirty="0" smtClean="0"/>
+              <a:rPr lang="en-US" dirty="0"/>
               <a:t>values is </a:t>
             </a:r>
             <a:r>
-              <a:rPr lang="en-US" dirty="0" err="1" smtClean="0"/>
+              <a:rPr lang="en-US" dirty="0" err="1"/>
               <a:t>np.ndarray</a:t>
             </a:r>
             <a:r>
-              <a:rPr lang="en-US" dirty="0" smtClean="0"/>
+              <a:rPr lang="en-US" dirty="0"/>
               <a:t> of:</a:t>
             </a:r>
           </a:p>
           <a:p>
             <a:pPr lvl="3" algn="just"/>
             <a:r>
-              <a:rPr lang="en-US" dirty="0" err="1" smtClean="0"/>
+              <a:rPr lang="en-US" dirty="0" err="1"/>
               <a:t>float,str</a:t>
             </a:r>
             <a:r>
-              <a:rPr lang="en-US" dirty="0" smtClean="0"/>
+              <a:rPr lang="en-US" dirty="0"/>
               <a:t> for single-valued (scalars)</a:t>
             </a:r>
           </a:p>
           <a:p>
             <a:pPr lvl="3" algn="just"/>
             <a:r>
-              <a:rPr lang="en-US" dirty="0" err="1" smtClean="0"/>
+              <a:rPr lang="en-US" dirty="0" err="1"/>
               <a:t>xr.DataArray</a:t>
             </a:r>
             <a:r>
-              <a:rPr lang="en-US" dirty="0" smtClean="0"/>
+              <a:rPr lang="en-US" dirty="0"/>
               <a:t> for histories/ND samples</a:t>
             </a:r>
           </a:p>
@@ -37575,18 +37822,17 @@
           <a:lstStyle/>
           <a:p>
             <a:r>
-              <a:rPr lang="en-US" dirty="0" smtClean="0"/>
+              <a:rPr lang="en-US" dirty="0"/>
               <a:t>New API </a:t>
             </a:r>
             <a:r>
-              <a:rPr lang="mr-IN" dirty="0" smtClean="0"/>
+              <a:rPr lang="mr-IN" dirty="0"/>
               <a:t>–</a:t>
             </a:r>
             <a:r>
-              <a:rPr lang="en-US" dirty="0" smtClean="0"/>
+              <a:rPr lang="en-US" dirty="0"/>
               <a:t> Adding Data</a:t>
             </a:r>
-            <a:endParaRPr lang="en-US" dirty="0"/>
           </a:p>
         </p:txBody>
       </p:sp>
@@ -37642,13 +37888,6 @@
       </p:transition>
     </mc:Fallback>
   </mc:AlternateContent>
-  <p:timing>
-    <p:tnLst>
-      <p:par>
-        <p:cTn xmlns:p14="http://schemas.microsoft.com/office/powerpoint/2010/main" id="1" dur="indefinite" restart="never" nodeType="tmRoot"/>
-      </p:par>
-    </p:tnLst>
-  </p:timing>
 </p:sld>
 </file>
 
@@ -37691,11 +37930,11 @@
           <a:p>
             <a:pPr algn="just"/>
             <a:r>
-              <a:rPr lang="en-US" dirty="0" smtClean="0"/>
+              <a:rPr lang="en-US" dirty="0"/>
               <a:t>Want to add </a:t>
             </a:r>
             <a:r>
-              <a:rPr lang="en-US" dirty="0" smtClean="0">
+              <a:rPr lang="en-US" dirty="0">
                 <a:solidFill>
                   <a:srgbClr val="00B050"/>
                 </a:solidFill>
@@ -37703,21 +37942,21 @@
               <a:t>metadata</a:t>
             </a:r>
             <a:r>
-              <a:rPr lang="en-US" dirty="0" smtClean="0"/>
+              <a:rPr lang="en-US" dirty="0"/>
               <a:t>?</a:t>
             </a:r>
           </a:p>
           <a:p>
             <a:pPr lvl="1" algn="just"/>
             <a:r>
-              <a:rPr lang="en-US" dirty="0" smtClean="0"/>
+              <a:rPr lang="en-US" dirty="0"/>
               <a:t>General Data (not pointwise, once per data object)</a:t>
             </a:r>
           </a:p>
           <a:p>
             <a:pPr lvl="2" algn="just"/>
             <a:r>
-              <a:rPr lang="en-US" dirty="0" err="1" smtClean="0">
+              <a:rPr lang="en-US" dirty="0" err="1">
                 <a:latin typeface="Consolas" charset="0"/>
                 <a:ea typeface="Consolas" charset="0"/>
                 <a:cs typeface="Consolas" charset="0"/>
@@ -37725,7 +37964,7 @@
               <a:t>data.addMeta</a:t>
             </a:r>
             <a:r>
-              <a:rPr lang="en-US" dirty="0" smtClean="0">
+              <a:rPr lang="en-US" dirty="0">
                 <a:latin typeface="Consolas" charset="0"/>
                 <a:ea typeface="Consolas" charset="0"/>
                 <a:cs typeface="Consolas" charset="0"/>
@@ -37733,7 +37972,7 @@
               <a:t>(</a:t>
             </a:r>
             <a:r>
-              <a:rPr lang="en-US" dirty="0" err="1" smtClean="0">
+              <a:rPr lang="en-US" dirty="0" err="1">
                 <a:latin typeface="Consolas" charset="0"/>
                 <a:ea typeface="Consolas" charset="0"/>
                 <a:cs typeface="Consolas" charset="0"/>
@@ -37741,7 +37980,7 @@
               <a:t>tag,xmlDict</a:t>
             </a:r>
             <a:r>
-              <a:rPr lang="en-US" dirty="0" smtClean="0">
+              <a:rPr lang="en-US" dirty="0">
                 <a:latin typeface="Consolas" charset="0"/>
                 <a:ea typeface="Consolas" charset="0"/>
                 <a:cs typeface="Consolas" charset="0"/>
@@ -37757,48 +37996,40 @@
                 <a:ea typeface="Consolas" charset="0"/>
                 <a:cs typeface="Consolas" charset="0"/>
               </a:rPr>
-              <a:t>t</a:t>
+              <a:t>tag</a:t>
             </a:r>
             <a:r>
-              <a:rPr lang="en-US" dirty="0" smtClean="0">
-                <a:latin typeface="Consolas" charset="0"/>
-                <a:ea typeface="Consolas" charset="0"/>
-                <a:cs typeface="Consolas" charset="0"/>
-              </a:rPr>
-              <a:t>ag</a:t>
-            </a:r>
-            <a:r>
-              <a:rPr lang="en-US" dirty="0" smtClean="0"/>
+              <a:rPr lang="en-US" dirty="0"/>
               <a:t> says which meta key to store under</a:t>
             </a:r>
           </a:p>
           <a:p>
             <a:pPr lvl="4" algn="just"/>
             <a:r>
-              <a:rPr lang="en-US" dirty="0" smtClean="0"/>
+              <a:rPr lang="en-US" dirty="0"/>
               <a:t>e.g. </a:t>
             </a:r>
             <a:r>
-              <a:rPr lang="en-US" dirty="0" err="1" smtClean="0"/>
+              <a:rPr lang="en-US" dirty="0" err="1"/>
               <a:t>BasicStastics</a:t>
             </a:r>
             <a:r>
-              <a:rPr lang="en-US" dirty="0" smtClean="0"/>
+              <a:rPr lang="en-US" dirty="0"/>
               <a:t>, </a:t>
             </a:r>
             <a:r>
-              <a:rPr lang="en-US" dirty="0" err="1" smtClean="0"/>
+              <a:rPr lang="en-US" dirty="0" err="1"/>
               <a:t>DataSet</a:t>
             </a:r>
             <a:r>
-              <a:rPr lang="en-US" dirty="0" smtClean="0"/>
+              <a:rPr lang="en-US" dirty="0"/>
               <a:t>, Optimizer, HSPS</a:t>
             </a:r>
           </a:p>
           <a:p>
             <a:pPr lvl="3" algn="just"/>
             <a:r>
-              <a:rPr lang="en-US" dirty="0" err="1" smtClean="0">
+              <a:rPr lang="en-US" dirty="0" err="1">
                 <a:latin typeface="Consolas" charset="0"/>
                 <a:ea typeface="Consolas" charset="0"/>
                 <a:cs typeface="Consolas" charset="0"/>
@@ -37806,51 +38037,51 @@
               <a:t>xmlDict</a:t>
             </a:r>
             <a:r>
-              <a:rPr lang="en-US" dirty="0" smtClean="0"/>
+              <a:rPr lang="en-US" dirty="0"/>
               <a:t> are the data to add</a:t>
             </a:r>
           </a:p>
           <a:p>
             <a:pPr lvl="4" algn="just"/>
             <a:r>
-              <a:rPr lang="en-US" dirty="0" smtClean="0"/>
+              <a:rPr lang="en-US" dirty="0"/>
               <a:t>e.g. </a:t>
             </a:r>
           </a:p>
           <a:p>
             <a:pPr lvl="1" algn="just"/>
-            <a:endParaRPr lang="en-US" dirty="0" smtClean="0"/>
+            <a:endParaRPr lang="en-US" dirty="0"/>
           </a:p>
           <a:p>
             <a:pPr lvl="1" algn="just"/>
-            <a:endParaRPr lang="en-US" dirty="0" smtClean="0"/>
+            <a:endParaRPr lang="en-US" dirty="0"/>
           </a:p>
           <a:p>
             <a:pPr lvl="1" algn="just"/>
             <a:r>
-              <a:rPr lang="en-US" dirty="0" smtClean="0"/>
+              <a:rPr lang="en-US" dirty="0"/>
               <a:t>Pointwise Data</a:t>
             </a:r>
           </a:p>
           <a:p>
             <a:pPr lvl="2" algn="just"/>
             <a:r>
-              <a:rPr lang="en-US" dirty="0" smtClean="0"/>
+              <a:rPr lang="en-US" dirty="0"/>
               <a:t>Include the data in </a:t>
             </a:r>
             <a:r>
-              <a:rPr lang="en-US" dirty="0" err="1" smtClean="0"/>
+              <a:rPr lang="en-US" dirty="0" err="1"/>
               <a:t>addRealization</a:t>
             </a:r>
             <a:r>
-              <a:rPr lang="en-US" dirty="0" smtClean="0"/>
+              <a:rPr lang="en-US" dirty="0"/>
               <a:t> dictionary</a:t>
             </a:r>
           </a:p>
           <a:p>
             <a:pPr lvl="3" algn="just"/>
             <a:r>
-              <a:rPr lang="en-US" dirty="0" smtClean="0"/>
+              <a:rPr lang="en-US" dirty="0"/>
               <a:t>variables not in input, output are added to metadata</a:t>
             </a:r>
           </a:p>
@@ -37901,18 +38132,17 @@
           <a:lstStyle/>
           <a:p>
             <a:r>
-              <a:rPr lang="en-US" dirty="0" smtClean="0"/>
+              <a:rPr lang="en-US" dirty="0"/>
               <a:t>New API </a:t>
             </a:r>
             <a:r>
-              <a:rPr lang="mr-IN" dirty="0" smtClean="0"/>
+              <a:rPr lang="mr-IN" dirty="0"/>
               <a:t>–</a:t>
             </a:r>
             <a:r>
-              <a:rPr lang="en-US" dirty="0" smtClean="0"/>
+              <a:rPr lang="en-US" dirty="0"/>
               <a:t> Adding Data</a:t>
             </a:r>
-            <a:endParaRPr lang="en-US" dirty="0"/>
           </a:p>
         </p:txBody>
       </p:sp>
@@ -37968,13 +38198,6 @@
       </p:transition>
     </mc:Fallback>
   </mc:AlternateContent>
-  <p:timing>
-    <p:tnLst>
-      <p:par>
-        <p:cTn xmlns:p14="http://schemas.microsoft.com/office/powerpoint/2010/main" id="1" dur="indefinite" restart="never" nodeType="tmRoot"/>
-      </p:par>
-    </p:tnLst>
-  </p:timing>
 </p:sld>
 </file>
 
@@ -38011,18 +38234,17 @@
           <a:lstStyle/>
           <a:p>
             <a:r>
-              <a:rPr lang="en-US" dirty="0" smtClean="0"/>
+              <a:rPr lang="en-US" dirty="0"/>
               <a:t>New API </a:t>
             </a:r>
             <a:r>
-              <a:rPr lang="mr-IN" dirty="0" smtClean="0"/>
+              <a:rPr lang="mr-IN" dirty="0"/>
               <a:t>–</a:t>
             </a:r>
             <a:r>
-              <a:rPr lang="en-US" dirty="0" smtClean="0"/>
+              <a:rPr lang="en-US" dirty="0"/>
               <a:t> Accessing Data</a:t>
             </a:r>
-            <a:endParaRPr lang="en-US" dirty="0"/>
           </a:p>
         </p:txBody>
       </p:sp>
@@ -38042,11 +38264,11 @@
           <a:lstStyle/>
           <a:p>
             <a:r>
-              <a:rPr lang="en-US" dirty="0" smtClean="0"/>
+              <a:rPr lang="en-US" dirty="0"/>
               <a:t>Get </a:t>
             </a:r>
             <a:r>
-              <a:rPr lang="en-US" dirty="0" smtClean="0">
+              <a:rPr lang="en-US" dirty="0">
                 <a:solidFill>
                   <a:srgbClr val="00B050"/>
                 </a:solidFill>
@@ -38054,14 +38276,14 @@
               <a:t>pivot </a:t>
             </a:r>
             <a:r>
-              <a:rPr lang="en-US" dirty="0" smtClean="0"/>
+              <a:rPr lang="en-US" dirty="0"/>
               <a:t>parameter(s)</a:t>
             </a:r>
           </a:p>
           <a:p>
             <a:pPr lvl="1"/>
             <a:r>
-              <a:rPr lang="en-US" dirty="0" err="1" smtClean="0">
+              <a:rPr lang="en-US" dirty="0" err="1">
                 <a:latin typeface="Consolas" charset="0"/>
                 <a:ea typeface="Consolas" charset="0"/>
                 <a:cs typeface="Consolas" charset="0"/>
@@ -38069,7 +38291,7 @@
               <a:t>data.getDimensions</a:t>
             </a:r>
             <a:r>
-              <a:rPr lang="en-US" dirty="0" smtClean="0">
+              <a:rPr lang="en-US" dirty="0">
                 <a:latin typeface="Consolas" charset="0"/>
                 <a:ea typeface="Consolas" charset="0"/>
                 <a:cs typeface="Consolas" charset="0"/>
@@ -38077,7 +38299,7 @@
               <a:t>(</a:t>
             </a:r>
             <a:r>
-              <a:rPr lang="en-US" dirty="0" err="1" smtClean="0">
+              <a:rPr lang="en-US" dirty="0" err="1">
                 <a:latin typeface="Consolas" charset="0"/>
                 <a:ea typeface="Consolas" charset="0"/>
                 <a:cs typeface="Consolas" charset="0"/>
@@ -38085,7 +38307,7 @@
               <a:t>varName</a:t>
             </a:r>
             <a:r>
-              <a:rPr lang="en-US" dirty="0" smtClean="0">
+              <a:rPr lang="en-US" dirty="0">
                 <a:latin typeface="Consolas" charset="0"/>
                 <a:ea typeface="Consolas" charset="0"/>
                 <a:cs typeface="Consolas" charset="0"/>
@@ -38095,11 +38317,11 @@
           </a:p>
           <a:p>
             <a:r>
-              <a:rPr lang="en-US" dirty="0" smtClean="0"/>
+              <a:rPr lang="en-US" dirty="0"/>
               <a:t>Get </a:t>
             </a:r>
             <a:r>
-              <a:rPr lang="en-US" dirty="0" smtClean="0">
+              <a:rPr lang="en-US" dirty="0">
                 <a:solidFill>
                   <a:srgbClr val="00B050"/>
                 </a:solidFill>
@@ -38107,14 +38329,14 @@
               <a:t>metadata</a:t>
             </a:r>
             <a:r>
-              <a:rPr lang="en-US" dirty="0" smtClean="0"/>
+              <a:rPr lang="en-US" dirty="0"/>
               <a:t> information</a:t>
             </a:r>
           </a:p>
           <a:p>
             <a:pPr lvl="1"/>
             <a:r>
-              <a:rPr lang="en-US" dirty="0" err="1" smtClean="0">
+              <a:rPr lang="en-US" dirty="0" err="1">
                 <a:latin typeface="Consolas" charset="0"/>
                 <a:ea typeface="Consolas" charset="0"/>
                 <a:cs typeface="Consolas" charset="0"/>
@@ -38122,7 +38344,7 @@
               <a:t>data.getMeta</a:t>
             </a:r>
             <a:r>
-              <a:rPr lang="en-US" dirty="0" smtClean="0">
+              <a:rPr lang="en-US" dirty="0">
                 <a:latin typeface="Consolas" charset="0"/>
                 <a:ea typeface="Consolas" charset="0"/>
                 <a:cs typeface="Consolas" charset="0"/>
@@ -38130,7 +38352,7 @@
               <a:t>(</a:t>
             </a:r>
             <a:r>
-              <a:rPr lang="en-US" dirty="0" err="1" smtClean="0">
+              <a:rPr lang="en-US" dirty="0" err="1">
                 <a:latin typeface="Consolas" charset="0"/>
                 <a:ea typeface="Consolas" charset="0"/>
                 <a:cs typeface="Consolas" charset="0"/>
@@ -38138,7 +38360,7 @@
               <a:t>keys,pointwise,general</a:t>
             </a:r>
             <a:r>
-              <a:rPr lang="en-US" dirty="0" smtClean="0">
+              <a:rPr lang="en-US" dirty="0">
                 <a:latin typeface="Consolas" charset="0"/>
                 <a:ea typeface="Consolas" charset="0"/>
                 <a:cs typeface="Consolas" charset="0"/>
@@ -38149,17 +38371,17 @@
           <a:p>
             <a:pPr lvl="2"/>
             <a:r>
-              <a:rPr lang="en-US" dirty="0" smtClean="0"/>
+              <a:rPr lang="en-US" dirty="0"/>
               <a:t>tell it to search in pointwise or general metadata</a:t>
             </a:r>
           </a:p>
           <a:p>
             <a:r>
-              <a:rPr lang="en-US" dirty="0" smtClean="0"/>
+              <a:rPr lang="en-US" dirty="0"/>
               <a:t>Get list of </a:t>
             </a:r>
             <a:r>
-              <a:rPr lang="en-US" dirty="0" smtClean="0">
+              <a:rPr lang="en-US" dirty="0">
                 <a:solidFill>
                   <a:srgbClr val="00B050"/>
                 </a:solidFill>
@@ -38170,7 +38392,7 @@
           <a:p>
             <a:pPr lvl="1"/>
             <a:r>
-              <a:rPr lang="en-US" dirty="0" err="1" smtClean="0">
+              <a:rPr lang="en-US" dirty="0" err="1">
                 <a:latin typeface="Consolas" charset="0"/>
                 <a:ea typeface="Consolas" charset="0"/>
                 <a:cs typeface="Consolas" charset="0"/>
@@ -38178,7 +38400,7 @@
               <a:t>data.getVars</a:t>
             </a:r>
             <a:r>
-              <a:rPr lang="en-US" dirty="0" smtClean="0">
+              <a:rPr lang="en-US" dirty="0">
                 <a:latin typeface="Consolas" charset="0"/>
                 <a:ea typeface="Consolas" charset="0"/>
                 <a:cs typeface="Consolas" charset="0"/>
@@ -38189,17 +38411,17 @@
           <a:p>
             <a:pPr lvl="2"/>
             <a:r>
-              <a:rPr lang="en-US" dirty="0" smtClean="0"/>
+              <a:rPr lang="en-US" dirty="0"/>
               <a:t>input, output, metadata; or None for all</a:t>
             </a:r>
           </a:p>
           <a:p>
             <a:r>
-              <a:rPr lang="en-US" dirty="0" smtClean="0"/>
+              <a:rPr lang="en-US" dirty="0"/>
               <a:t>Get </a:t>
             </a:r>
             <a:r>
-              <a:rPr lang="en-US" dirty="0" smtClean="0">
+              <a:rPr lang="en-US" dirty="0">
                 <a:solidFill>
                   <a:srgbClr val="00B050"/>
                 </a:solidFill>
@@ -38210,63 +38432,43 @@
           <a:p>
             <a:pPr lvl="1"/>
             <a:r>
-              <a:rPr lang="en-US" dirty="0" smtClean="0"/>
+              <a:rPr lang="en-US" dirty="0"/>
               <a:t>Best to access directly</a:t>
             </a:r>
           </a:p>
           <a:p>
             <a:pPr lvl="2"/>
             <a:r>
-              <a:rPr lang="en-US" sz="1600" dirty="0" smtClean="0"/>
-              <a:t>For </a:t>
+              <a:rPr lang="en-US" sz="1600" dirty="0"/>
+              <a:t>For more methods, see “</a:t>
+            </a:r>
+            <a:r>
+              <a:rPr lang="en-US" sz="1600" dirty="0" err="1"/>
+              <a:t>Xarray</a:t>
             </a:r>
             <a:r>
               <a:rPr lang="en-US" sz="1600" dirty="0"/>
-              <a:t>more methods, see </a:t>
-            </a:r>
-            <a:r>
-              <a:rPr lang="en-US" sz="1600" dirty="0" smtClean="0"/>
-              <a:t>“</a:t>
-            </a:r>
-            <a:r>
-              <a:rPr lang="en-US" sz="1600" dirty="0" err="1" smtClean="0"/>
-              <a:t>Xarray</a:t>
-            </a:r>
-            <a:r>
-              <a:rPr lang="en-US" sz="1600" dirty="0" smtClean="0"/>
               <a:t> Operations”, or </a:t>
-            </a:r>
-            <a:r>
-              <a:rPr lang="en-US" sz="1600" dirty="0" smtClean="0">
-                <a:hlinkClick r:id="rId2"/>
-              </a:rPr>
-              <a:t>http</a:t>
             </a:r>
             <a:r>
               <a:rPr lang="en-US" sz="1600" dirty="0">
                 <a:hlinkClick r:id="rId2"/>
               </a:rPr>
-              <a:t>://</a:t>
+              <a:t>http://xarray.pydata.org/en/stable/indexing.html#dataset-indexing</a:t>
             </a:r>
-            <a:r>
-              <a:rPr lang="en-US" sz="1600" dirty="0" smtClean="0">
-                <a:hlinkClick r:id="rId2"/>
-              </a:rPr>
-              <a:t>xarray.pydata.org/en/stable/indexing.html#dataset-indexing</a:t>
-            </a:r>
-            <a:endParaRPr lang="en-US" sz="1600" dirty="0" smtClean="0"/>
+            <a:endParaRPr lang="en-US" sz="1600" dirty="0"/>
           </a:p>
           <a:p>
             <a:pPr lvl="1"/>
             <a:r>
-              <a:rPr lang="en-US" dirty="0" smtClean="0"/>
+              <a:rPr lang="en-US" dirty="0"/>
               <a:t>Slower, as dictionary</a:t>
             </a:r>
           </a:p>
           <a:p>
             <a:pPr lvl="2"/>
             <a:r>
-              <a:rPr lang="en-US" dirty="0" err="1" smtClean="0">
+              <a:rPr lang="en-US" dirty="0" err="1">
                 <a:latin typeface="Consolas" charset="0"/>
                 <a:ea typeface="Consolas" charset="0"/>
                 <a:cs typeface="Consolas" charset="0"/>
@@ -38274,7 +38476,7 @@
               <a:t>data.getVarValues</a:t>
             </a:r>
             <a:r>
-              <a:rPr lang="en-US" dirty="0" smtClean="0">
+              <a:rPr lang="en-US" dirty="0">
                 <a:latin typeface="Consolas" charset="0"/>
                 <a:ea typeface="Consolas" charset="0"/>
                 <a:cs typeface="Consolas" charset="0"/>
@@ -38282,7 +38484,7 @@
               <a:t>(</a:t>
             </a:r>
             <a:r>
-              <a:rPr lang="en-US" dirty="0" err="1" smtClean="0">
+              <a:rPr lang="en-US" dirty="0" err="1">
                 <a:latin typeface="Consolas" charset="0"/>
                 <a:ea typeface="Consolas" charset="0"/>
                 <a:cs typeface="Consolas" charset="0"/>
@@ -38290,7 +38492,7 @@
               <a:t>var</a:t>
             </a:r>
             <a:r>
-              <a:rPr lang="en-US" dirty="0" smtClean="0">
+              <a:rPr lang="en-US" dirty="0">
                 <a:latin typeface="Consolas" charset="0"/>
                 <a:ea typeface="Consolas" charset="0"/>
                 <a:cs typeface="Consolas" charset="0"/>
@@ -38301,18 +38503,17 @@
           <a:p>
             <a:pPr lvl="3"/>
             <a:r>
-              <a:rPr lang="en-US" dirty="0" smtClean="0"/>
+              <a:rPr lang="en-US" dirty="0"/>
               <a:t>“</a:t>
             </a:r>
             <a:r>
-              <a:rPr lang="en-US" dirty="0" err="1" smtClean="0"/>
+              <a:rPr lang="en-US" dirty="0" err="1"/>
               <a:t>var</a:t>
             </a:r>
             <a:r>
-              <a:rPr lang="en-US" dirty="0" smtClean="0"/>
+              <a:rPr lang="en-US" dirty="0"/>
               <a:t>” can be list or single variable name</a:t>
             </a:r>
-            <a:endParaRPr lang="en-US" dirty="0"/>
           </a:p>
         </p:txBody>
       </p:sp>
@@ -38380,13 +38581,6 @@
   <p:clrMapOvr>
     <a:masterClrMapping/>
   </p:clrMapOvr>
-  <p:timing>
-    <p:tnLst>
-      <p:par>
-        <p:cTn xmlns:p14="http://schemas.microsoft.com/office/powerpoint/2010/main" id="1" dur="indefinite" restart="never" nodeType="tmRoot"/>
-      </p:par>
-    </p:tnLst>
-  </p:timing>
 </p:sld>
 </file>
 

</xml_diff>

<commit_message>
pre-merge review comments addressed: framework/DataObjects (#646)
* pre-merge review comments addressed for modules in framework/DataObjects, with the exception of merging DataObject into DataSet

* removed hierarchal unecessary use of [:]

* remainder of comments addressed
</commit_message>
<xml_diff>
--- a/doc/misc/dataobject-rework.pptx
+++ b/doc/misc/dataobject-rework.pptx
@@ -5,10 +5,10 @@
     <p:sldMasterId id="2147483648" r:id="rId1"/>
   </p:sldMasterIdLst>
   <p:notesMasterIdLst>
-    <p:notesMasterId r:id="rId18"/>
+    <p:notesMasterId r:id="rId19"/>
   </p:notesMasterIdLst>
   <p:handoutMasterIdLst>
-    <p:handoutMasterId r:id="rId19"/>
+    <p:handoutMasterId r:id="rId20"/>
   </p:handoutMasterIdLst>
   <p:sldIdLst>
     <p:sldId id="272" r:id="rId2"/>
@@ -21,12 +21,13 @@
     <p:sldId id="304" r:id="rId9"/>
     <p:sldId id="305" r:id="rId10"/>
     <p:sldId id="306" r:id="rId11"/>
-    <p:sldId id="307" r:id="rId12"/>
-    <p:sldId id="308" r:id="rId13"/>
-    <p:sldId id="310" r:id="rId14"/>
-    <p:sldId id="311" r:id="rId15"/>
-    <p:sldId id="312" r:id="rId16"/>
-    <p:sldId id="313" r:id="rId17"/>
+    <p:sldId id="314" r:id="rId12"/>
+    <p:sldId id="307" r:id="rId13"/>
+    <p:sldId id="308" r:id="rId14"/>
+    <p:sldId id="310" r:id="rId15"/>
+    <p:sldId id="311" r:id="rId16"/>
+    <p:sldId id="312" r:id="rId17"/>
+    <p:sldId id="313" r:id="rId18"/>
   </p:sldIdLst>
   <p:sldSz cx="9144000" cy="6858000" type="screen4x3"/>
   <p:notesSz cx="7010400" cy="9296400"/>
@@ -157,7 +158,7 @@
   </p:defaultTextStyle>
   <p:extLst>
     <p:ext uri="{EFAFB233-063F-42B5-8137-9DF3F51BA10A}">
-      <p15:sldGuideLst xmlns:p15="http://schemas.microsoft.com/office/powerpoint/2012/main" xmlns="">
+      <p15:sldGuideLst xmlns:p15="http://schemas.microsoft.com/office/powerpoint/2012/main">
         <p15:guide id="1" orient="horz" pos="2160">
           <p15:clr>
             <a:srgbClr val="A4A3A4"/>
@@ -480,35 +481,35 @@
           <a:p>
             <a:pPr lvl="0"/>
             <a:r>
-              <a:rPr lang="en-US" smtClean="0"/>
+              <a:rPr lang="en-US"/>
               <a:t>Click to edit Master text styles</a:t>
             </a:r>
           </a:p>
           <a:p>
             <a:pPr lvl="1"/>
             <a:r>
-              <a:rPr lang="en-US" smtClean="0"/>
+              <a:rPr lang="en-US"/>
               <a:t>Second level</a:t>
             </a:r>
           </a:p>
           <a:p>
             <a:pPr lvl="2"/>
             <a:r>
-              <a:rPr lang="en-US" smtClean="0"/>
+              <a:rPr lang="en-US"/>
               <a:t>Third level</a:t>
             </a:r>
           </a:p>
           <a:p>
             <a:pPr lvl="3"/>
             <a:r>
-              <a:rPr lang="en-US" smtClean="0"/>
+              <a:rPr lang="en-US"/>
               <a:t>Fourth level</a:t>
             </a:r>
           </a:p>
           <a:p>
             <a:pPr lvl="4"/>
             <a:r>
-              <a:rPr lang="en-US" smtClean="0"/>
+              <a:rPr lang="en-US"/>
               <a:t>Fifth level</a:t>
             </a:r>
           </a:p>
@@ -16997,10 +16998,9 @@
           <a:lstStyle/>
           <a:p>
             <a:r>
-              <a:rPr lang="en-US" smtClean="0"/>
+              <a:rPr lang="en-US"/>
               <a:t>Click to edit Master title style</a:t>
             </a:r>
-            <a:endParaRPr lang="en-US"/>
           </a:p>
         </p:txBody>
       </p:sp>
@@ -17021,38 +17021,37 @@
           <a:p>
             <a:pPr lvl="0"/>
             <a:r>
-              <a:rPr lang="en-US" smtClean="0"/>
+              <a:rPr lang="en-US"/>
               <a:t>Click to edit Master text styles</a:t>
             </a:r>
           </a:p>
           <a:p>
             <a:pPr lvl="1"/>
             <a:r>
-              <a:rPr lang="en-US" smtClean="0"/>
+              <a:rPr lang="en-US"/>
               <a:t>Second level</a:t>
             </a:r>
           </a:p>
           <a:p>
             <a:pPr lvl="2"/>
             <a:r>
-              <a:rPr lang="en-US" smtClean="0"/>
+              <a:rPr lang="en-US"/>
               <a:t>Third level</a:t>
             </a:r>
           </a:p>
           <a:p>
             <a:pPr lvl="3"/>
             <a:r>
-              <a:rPr lang="en-US" smtClean="0"/>
+              <a:rPr lang="en-US"/>
               <a:t>Fourth level</a:t>
             </a:r>
           </a:p>
           <a:p>
             <a:pPr lvl="4"/>
             <a:r>
-              <a:rPr lang="en-US" smtClean="0"/>
+              <a:rPr lang="en-US"/>
               <a:t>Fifth level</a:t>
             </a:r>
-            <a:endParaRPr lang="en-US"/>
           </a:p>
         </p:txBody>
       </p:sp>
@@ -17153,10 +17152,9 @@
           <a:lstStyle/>
           <a:p>
             <a:r>
-              <a:rPr lang="en-US" smtClean="0"/>
+              <a:rPr lang="en-US"/>
               <a:t>Click to edit Master title style</a:t>
             </a:r>
-            <a:endParaRPr lang="en-US"/>
           </a:p>
         </p:txBody>
       </p:sp>
@@ -17182,38 +17180,37 @@
           <a:p>
             <a:pPr lvl="0"/>
             <a:r>
-              <a:rPr lang="en-US" smtClean="0"/>
+              <a:rPr lang="en-US"/>
               <a:t>Click to edit Master text styles</a:t>
             </a:r>
           </a:p>
           <a:p>
             <a:pPr lvl="1"/>
             <a:r>
-              <a:rPr lang="en-US" smtClean="0"/>
+              <a:rPr lang="en-US"/>
               <a:t>Second level</a:t>
             </a:r>
           </a:p>
           <a:p>
             <a:pPr lvl="2"/>
             <a:r>
-              <a:rPr lang="en-US" smtClean="0"/>
+              <a:rPr lang="en-US"/>
               <a:t>Third level</a:t>
             </a:r>
           </a:p>
           <a:p>
             <a:pPr lvl="3"/>
             <a:r>
-              <a:rPr lang="en-US" smtClean="0"/>
+              <a:rPr lang="en-US"/>
               <a:t>Fourth level</a:t>
             </a:r>
           </a:p>
           <a:p>
             <a:pPr lvl="4"/>
             <a:r>
-              <a:rPr lang="en-US" smtClean="0"/>
+              <a:rPr lang="en-US"/>
               <a:t>Fifth level</a:t>
             </a:r>
-            <a:endParaRPr lang="en-US"/>
           </a:p>
         </p:txBody>
       </p:sp>
@@ -17309,10 +17306,9 @@
           <a:lstStyle/>
           <a:p>
             <a:r>
-              <a:rPr lang="en-US" smtClean="0"/>
+              <a:rPr lang="en-US"/>
               <a:t>Click to edit Master title style</a:t>
             </a:r>
-            <a:endParaRPr lang="en-US"/>
           </a:p>
         </p:txBody>
       </p:sp>
@@ -17333,38 +17329,37 @@
           <a:p>
             <a:pPr lvl="0"/>
             <a:r>
-              <a:rPr lang="en-US" smtClean="0"/>
+              <a:rPr lang="en-US"/>
               <a:t>Click to edit Master text styles</a:t>
             </a:r>
           </a:p>
           <a:p>
             <a:pPr lvl="1"/>
             <a:r>
-              <a:rPr lang="en-US" smtClean="0"/>
+              <a:rPr lang="en-US"/>
               <a:t>Second level</a:t>
             </a:r>
           </a:p>
           <a:p>
             <a:pPr lvl="2"/>
             <a:r>
-              <a:rPr lang="en-US" smtClean="0"/>
+              <a:rPr lang="en-US"/>
               <a:t>Third level</a:t>
             </a:r>
           </a:p>
           <a:p>
             <a:pPr lvl="3"/>
             <a:r>
-              <a:rPr lang="en-US" smtClean="0"/>
+              <a:rPr lang="en-US"/>
               <a:t>Fourth level</a:t>
             </a:r>
           </a:p>
           <a:p>
             <a:pPr lvl="4"/>
             <a:r>
-              <a:rPr lang="en-US" smtClean="0"/>
+              <a:rPr lang="en-US"/>
               <a:t>Fifth level</a:t>
             </a:r>
-            <a:endParaRPr lang="en-US"/>
           </a:p>
         </p:txBody>
       </p:sp>
@@ -17469,10 +17464,9 @@
           </a:lstStyle>
           <a:p>
             <a:r>
-              <a:rPr lang="en-US" smtClean="0"/>
+              <a:rPr lang="en-US"/>
               <a:t>Click to edit Master title style</a:t>
             </a:r>
-            <a:endParaRPr lang="en-US"/>
           </a:p>
         </p:txBody>
       </p:sp>
@@ -17535,7 +17529,7 @@
           <a:p>
             <a:pPr lvl="0"/>
             <a:r>
-              <a:rPr lang="en-US" smtClean="0"/>
+              <a:rPr lang="en-US"/>
               <a:t>Click to edit Master text styles</a:t>
             </a:r>
           </a:p>
@@ -17633,10 +17627,9 @@
           <a:lstStyle/>
           <a:p>
             <a:r>
-              <a:rPr lang="en-US" smtClean="0"/>
+              <a:rPr lang="en-US"/>
               <a:t>Click to edit Master title style</a:t>
             </a:r>
-            <a:endParaRPr lang="en-US"/>
           </a:p>
         </p:txBody>
       </p:sp>
@@ -17690,38 +17683,37 @@
           <a:p>
             <a:pPr lvl="0"/>
             <a:r>
-              <a:rPr lang="en-US" smtClean="0"/>
+              <a:rPr lang="en-US"/>
               <a:t>Click to edit Master text styles</a:t>
             </a:r>
           </a:p>
           <a:p>
             <a:pPr lvl="1"/>
             <a:r>
-              <a:rPr lang="en-US" smtClean="0"/>
+              <a:rPr lang="en-US"/>
               <a:t>Second level</a:t>
             </a:r>
           </a:p>
           <a:p>
             <a:pPr lvl="2"/>
             <a:r>
-              <a:rPr lang="en-US" smtClean="0"/>
+              <a:rPr lang="en-US"/>
               <a:t>Third level</a:t>
             </a:r>
           </a:p>
           <a:p>
             <a:pPr lvl="3"/>
             <a:r>
-              <a:rPr lang="en-US" smtClean="0"/>
+              <a:rPr lang="en-US"/>
               <a:t>Fourth level</a:t>
             </a:r>
           </a:p>
           <a:p>
             <a:pPr lvl="4"/>
             <a:r>
-              <a:rPr lang="en-US" smtClean="0"/>
+              <a:rPr lang="en-US"/>
               <a:t>Fifth level</a:t>
             </a:r>
-            <a:endParaRPr lang="en-US"/>
           </a:p>
         </p:txBody>
       </p:sp>
@@ -17775,38 +17767,37 @@
           <a:p>
             <a:pPr lvl="0"/>
             <a:r>
-              <a:rPr lang="en-US" smtClean="0"/>
+              <a:rPr lang="en-US"/>
               <a:t>Click to edit Master text styles</a:t>
             </a:r>
           </a:p>
           <a:p>
             <a:pPr lvl="1"/>
             <a:r>
-              <a:rPr lang="en-US" smtClean="0"/>
+              <a:rPr lang="en-US"/>
               <a:t>Second level</a:t>
             </a:r>
           </a:p>
           <a:p>
             <a:pPr lvl="2"/>
             <a:r>
-              <a:rPr lang="en-US" smtClean="0"/>
+              <a:rPr lang="en-US"/>
               <a:t>Third level</a:t>
             </a:r>
           </a:p>
           <a:p>
             <a:pPr lvl="3"/>
             <a:r>
-              <a:rPr lang="en-US" smtClean="0"/>
+              <a:rPr lang="en-US"/>
               <a:t>Fourth level</a:t>
             </a:r>
           </a:p>
           <a:p>
             <a:pPr lvl="4"/>
             <a:r>
-              <a:rPr lang="en-US" smtClean="0"/>
+              <a:rPr lang="en-US"/>
               <a:t>Fifth level</a:t>
             </a:r>
-            <a:endParaRPr lang="en-US"/>
           </a:p>
         </p:txBody>
       </p:sp>
@@ -17911,10 +17902,9 @@
           </a:lstStyle>
           <a:p>
             <a:r>
-              <a:rPr lang="en-US" smtClean="0"/>
+              <a:rPr lang="en-US"/>
               <a:t>Click to edit Master title style</a:t>
             </a:r>
-            <a:endParaRPr lang="en-US"/>
           </a:p>
         </p:txBody>
       </p:sp>
@@ -17977,7 +17967,7 @@
           <a:p>
             <a:pPr lvl="0"/>
             <a:r>
-              <a:rPr lang="en-US" smtClean="0"/>
+              <a:rPr lang="en-US"/>
               <a:t>Click to edit Master text styles</a:t>
             </a:r>
           </a:p>
@@ -18033,38 +18023,37 @@
           <a:p>
             <a:pPr lvl="0"/>
             <a:r>
-              <a:rPr lang="en-US" smtClean="0"/>
+              <a:rPr lang="en-US"/>
               <a:t>Click to edit Master text styles</a:t>
             </a:r>
           </a:p>
           <a:p>
             <a:pPr lvl="1"/>
             <a:r>
-              <a:rPr lang="en-US" smtClean="0"/>
+              <a:rPr lang="en-US"/>
               <a:t>Second level</a:t>
             </a:r>
           </a:p>
           <a:p>
             <a:pPr lvl="2"/>
             <a:r>
-              <a:rPr lang="en-US" smtClean="0"/>
+              <a:rPr lang="en-US"/>
               <a:t>Third level</a:t>
             </a:r>
           </a:p>
           <a:p>
             <a:pPr lvl="3"/>
             <a:r>
-              <a:rPr lang="en-US" smtClean="0"/>
+              <a:rPr lang="en-US"/>
               <a:t>Fourth level</a:t>
             </a:r>
           </a:p>
           <a:p>
             <a:pPr lvl="4"/>
             <a:r>
-              <a:rPr lang="en-US" smtClean="0"/>
+              <a:rPr lang="en-US"/>
               <a:t>Fifth level</a:t>
             </a:r>
-            <a:endParaRPr lang="en-US"/>
           </a:p>
         </p:txBody>
       </p:sp>
@@ -18127,7 +18116,7 @@
           <a:p>
             <a:pPr lvl="0"/>
             <a:r>
-              <a:rPr lang="en-US" smtClean="0"/>
+              <a:rPr lang="en-US"/>
               <a:t>Click to edit Master text styles</a:t>
             </a:r>
           </a:p>
@@ -18183,38 +18172,37 @@
           <a:p>
             <a:pPr lvl="0"/>
             <a:r>
-              <a:rPr lang="en-US" smtClean="0"/>
+              <a:rPr lang="en-US"/>
               <a:t>Click to edit Master text styles</a:t>
             </a:r>
           </a:p>
           <a:p>
             <a:pPr lvl="1"/>
             <a:r>
-              <a:rPr lang="en-US" smtClean="0"/>
+              <a:rPr lang="en-US"/>
               <a:t>Second level</a:t>
             </a:r>
           </a:p>
           <a:p>
             <a:pPr lvl="2"/>
             <a:r>
-              <a:rPr lang="en-US" smtClean="0"/>
+              <a:rPr lang="en-US"/>
               <a:t>Third level</a:t>
             </a:r>
           </a:p>
           <a:p>
             <a:pPr lvl="3"/>
             <a:r>
-              <a:rPr lang="en-US" smtClean="0"/>
+              <a:rPr lang="en-US"/>
               <a:t>Fourth level</a:t>
             </a:r>
           </a:p>
           <a:p>
             <a:pPr lvl="4"/>
             <a:r>
-              <a:rPr lang="en-US" smtClean="0"/>
+              <a:rPr lang="en-US"/>
               <a:t>Fifth level</a:t>
             </a:r>
-            <a:endParaRPr lang="en-US"/>
           </a:p>
         </p:txBody>
       </p:sp>
@@ -18310,10 +18298,9 @@
           <a:lstStyle/>
           <a:p>
             <a:r>
-              <a:rPr lang="en-US" smtClean="0"/>
+              <a:rPr lang="en-US"/>
               <a:t>Click to edit Master title style</a:t>
             </a:r>
-            <a:endParaRPr lang="en-US"/>
           </a:p>
         </p:txBody>
       </p:sp>
@@ -18494,10 +18481,9 @@
           </a:lstStyle>
           <a:p>
             <a:r>
-              <a:rPr lang="en-US" smtClean="0"/>
+              <a:rPr lang="en-US"/>
               <a:t>Click to edit Master title style</a:t>
             </a:r>
-            <a:endParaRPr lang="en-US"/>
           </a:p>
         </p:txBody>
       </p:sp>
@@ -18551,38 +18537,37 @@
           <a:p>
             <a:pPr lvl="0"/>
             <a:r>
-              <a:rPr lang="en-US" smtClean="0"/>
+              <a:rPr lang="en-US"/>
               <a:t>Click to edit Master text styles</a:t>
             </a:r>
           </a:p>
           <a:p>
             <a:pPr lvl="1"/>
             <a:r>
-              <a:rPr lang="en-US" smtClean="0"/>
+              <a:rPr lang="en-US"/>
               <a:t>Second level</a:t>
             </a:r>
           </a:p>
           <a:p>
             <a:pPr lvl="2"/>
             <a:r>
-              <a:rPr lang="en-US" smtClean="0"/>
+              <a:rPr lang="en-US"/>
               <a:t>Third level</a:t>
             </a:r>
           </a:p>
           <a:p>
             <a:pPr lvl="3"/>
             <a:r>
-              <a:rPr lang="en-US" smtClean="0"/>
+              <a:rPr lang="en-US"/>
               <a:t>Fourth level</a:t>
             </a:r>
           </a:p>
           <a:p>
             <a:pPr lvl="4"/>
             <a:r>
-              <a:rPr lang="en-US" smtClean="0"/>
+              <a:rPr lang="en-US"/>
               <a:t>Fifth level</a:t>
             </a:r>
-            <a:endParaRPr lang="en-US"/>
           </a:p>
         </p:txBody>
       </p:sp>
@@ -18645,7 +18630,7 @@
           <a:p>
             <a:pPr lvl="0"/>
             <a:r>
-              <a:rPr lang="en-US" smtClean="0"/>
+              <a:rPr lang="en-US"/>
               <a:t>Click to edit Master text styles</a:t>
             </a:r>
           </a:p>
@@ -18752,10 +18737,9 @@
           </a:lstStyle>
           <a:p>
             <a:r>
-              <a:rPr lang="en-US" smtClean="0"/>
+              <a:rPr lang="en-US"/>
               <a:t>Click to edit Master title style</a:t>
             </a:r>
-            <a:endParaRPr lang="en-US"/>
           </a:p>
         </p:txBody>
       </p:sp>
@@ -18879,7 +18863,7 @@
           <a:p>
             <a:pPr lvl="0"/>
             <a:r>
-              <a:rPr lang="en-US" smtClean="0"/>
+              <a:rPr lang="en-US"/>
               <a:t>Click to edit Master text styles</a:t>
             </a:r>
           </a:p>
@@ -19011,7 +18995,7 @@
           <a:p>
             <a:pPr lvl="0"/>
             <a:r>
-              <a:rPr lang="en-US" smtClean="0"/>
+              <a:rPr lang="en-US"/>
               <a:t>Click to edit Master title style</a:t>
             </a:r>
           </a:p>
@@ -19054,35 +19038,35 @@
           <a:p>
             <a:pPr lvl="0"/>
             <a:r>
-              <a:rPr lang="en-US" smtClean="0"/>
+              <a:rPr lang="en-US"/>
               <a:t>Click to edit Master text styles</a:t>
             </a:r>
           </a:p>
           <a:p>
             <a:pPr lvl="1"/>
             <a:r>
-              <a:rPr lang="en-US" smtClean="0"/>
+              <a:rPr lang="en-US"/>
               <a:t>Second level</a:t>
             </a:r>
           </a:p>
           <a:p>
             <a:pPr lvl="2"/>
             <a:r>
-              <a:rPr lang="en-US" smtClean="0"/>
+              <a:rPr lang="en-US"/>
               <a:t>Third level</a:t>
             </a:r>
           </a:p>
           <a:p>
             <a:pPr lvl="3"/>
             <a:r>
-              <a:rPr lang="en-US" smtClean="0"/>
+              <a:rPr lang="en-US"/>
               <a:t>Fourth level</a:t>
             </a:r>
           </a:p>
           <a:p>
             <a:pPr lvl="4"/>
             <a:r>
-              <a:rPr lang="en-US" smtClean="0"/>
+              <a:rPr lang="en-US"/>
               <a:t>Fifth level</a:t>
             </a:r>
           </a:p>
@@ -33649,10 +33633,9 @@
           <a:lstStyle/>
           <a:p>
             <a:r>
-              <a:rPr lang="en-US" b="0" dirty="0" smtClean="0"/>
+              <a:rPr lang="en-US" b="0" dirty="0"/>
               <a:t>Changing Data Object API</a:t>
             </a:r>
-            <a:endParaRPr lang="en-US" b="0" dirty="0"/>
           </a:p>
         </p:txBody>
       </p:sp>
@@ -33677,7 +33660,7 @@
           <a:lstStyle/>
           <a:p>
             <a:r>
-              <a:rPr lang="en-US" b="0" dirty="0" smtClean="0"/>
+              <a:rPr lang="en-US" b="0" dirty="0"/>
               <a:t>RAVEN Sprint, November 2017</a:t>
             </a:r>
           </a:p>
@@ -33740,13 +33723,6 @@
       </p:transition>
     </mc:Fallback>
   </mc:AlternateContent>
-  <p:timing>
-    <p:tnLst>
-      <p:par>
-        <p:cTn xmlns:p14="http://schemas.microsoft.com/office/powerpoint/2010/main" id="1" dur="indefinite" restart="never" nodeType="tmRoot"/>
-      </p:par>
-    </p:tnLst>
-  </p:timing>
 </p:sld>
 </file>
 
@@ -33783,18 +33759,17 @@
           <a:lstStyle/>
           <a:p>
             <a:r>
-              <a:rPr lang="en-US" dirty="0" smtClean="0"/>
+              <a:rPr lang="en-US" dirty="0"/>
               <a:t>New API </a:t>
             </a:r>
             <a:r>
-              <a:rPr lang="mr-IN" dirty="0" smtClean="0"/>
+              <a:rPr lang="mr-IN" dirty="0"/>
               <a:t>–</a:t>
             </a:r>
             <a:r>
-              <a:rPr lang="en-US" dirty="0" smtClean="0"/>
+              <a:rPr lang="en-US" dirty="0"/>
               <a:t> Get A Realization/Sample</a:t>
             </a:r>
-            <a:endParaRPr lang="en-US" dirty="0"/>
           </a:p>
         </p:txBody>
       </p:sp>
@@ -33814,14 +33789,14 @@
           <a:lstStyle/>
           <a:p>
             <a:r>
-              <a:rPr lang="en-US" dirty="0" smtClean="0"/>
+              <a:rPr lang="en-US" dirty="0"/>
               <a:t>By index</a:t>
             </a:r>
           </a:p>
           <a:p>
             <a:pPr lvl="1"/>
             <a:r>
-              <a:rPr lang="en-US" dirty="0" err="1" smtClean="0">
+              <a:rPr lang="en-US" dirty="0" err="1">
                 <a:latin typeface="Consolas" charset="0"/>
                 <a:ea typeface="Consolas" charset="0"/>
                 <a:cs typeface="Consolas" charset="0"/>
@@ -33829,7 +33804,7 @@
               <a:t>data.realization</a:t>
             </a:r>
             <a:r>
-              <a:rPr lang="en-US" dirty="0" smtClean="0">
+              <a:rPr lang="en-US" dirty="0">
                 <a:latin typeface="Consolas" charset="0"/>
                 <a:ea typeface="Consolas" charset="0"/>
                 <a:cs typeface="Consolas" charset="0"/>
@@ -33840,22 +33815,22 @@
           <a:p>
             <a:pPr lvl="2"/>
             <a:r>
-              <a:rPr lang="en-US" dirty="0" smtClean="0"/>
+              <a:rPr lang="en-US" dirty="0"/>
               <a:t>Returns dictionary realization (</a:t>
             </a:r>
             <a:r>
-              <a:rPr lang="en-US" dirty="0" err="1" smtClean="0"/>
+              <a:rPr lang="en-US" dirty="0" err="1"/>
               <a:t>IndexError</a:t>
             </a:r>
             <a:r>
-              <a:rPr lang="en-US" dirty="0" smtClean="0"/>
+              <a:rPr lang="en-US" dirty="0"/>
               <a:t> if past bounds)</a:t>
             </a:r>
           </a:p>
           <a:p>
             <a:pPr lvl="2"/>
             <a:r>
-              <a:rPr lang="en-US" dirty="0" smtClean="0"/>
+              <a:rPr lang="en-US" dirty="0"/>
               <a:t>Negative indices count back from the end</a:t>
             </a:r>
           </a:p>
@@ -33864,14 +33839,14 @@
           </a:p>
           <a:p>
             <a:r>
-              <a:rPr lang="en-US" dirty="0" smtClean="0"/>
+              <a:rPr lang="en-US" dirty="0"/>
               <a:t>By matching value</a:t>
             </a:r>
           </a:p>
           <a:p>
             <a:pPr lvl="1"/>
             <a:r>
-              <a:rPr lang="en-US" dirty="0" err="1" smtClean="0">
+              <a:rPr lang="en-US" dirty="0" err="1">
                 <a:latin typeface="Consolas" charset="0"/>
                 <a:ea typeface="Consolas" charset="0"/>
                 <a:cs typeface="Consolas" charset="0"/>
@@ -33879,7 +33854,7 @@
               <a:t>data.realization</a:t>
             </a:r>
             <a:r>
-              <a:rPr lang="en-US" dirty="0" smtClean="0">
+              <a:rPr lang="en-US" dirty="0">
                 <a:latin typeface="Consolas" charset="0"/>
                 <a:ea typeface="Consolas" charset="0"/>
                 <a:cs typeface="Consolas" charset="0"/>
@@ -33887,7 +33862,7 @@
               <a:t>(</a:t>
             </a:r>
             <a:r>
-              <a:rPr lang="en-US" dirty="0" err="1" smtClean="0">
+              <a:rPr lang="en-US" dirty="0" err="1">
                 <a:latin typeface="Consolas" charset="0"/>
                 <a:ea typeface="Consolas" charset="0"/>
                 <a:cs typeface="Consolas" charset="0"/>
@@ -33895,7 +33870,7 @@
               <a:t>matchDict</a:t>
             </a:r>
             <a:r>
-              <a:rPr lang="en-US" dirty="0" smtClean="0">
+              <a:rPr lang="en-US" dirty="0">
                 <a:latin typeface="Consolas" charset="0"/>
                 <a:ea typeface="Consolas" charset="0"/>
                 <a:cs typeface="Consolas" charset="0"/>
@@ -33903,7 +33878,7 @@
               <a:t>={</a:t>
             </a:r>
             <a:r>
-              <a:rPr lang="mr-IN" dirty="0" smtClean="0">
+              <a:rPr lang="mr-IN" dirty="0">
                 <a:latin typeface="Consolas" charset="0"/>
                 <a:ea typeface="Consolas" charset="0"/>
                 <a:cs typeface="Consolas" charset="0"/>
@@ -33911,7 +33886,7 @@
               <a:t>…</a:t>
             </a:r>
             <a:r>
-              <a:rPr lang="en-US" dirty="0" smtClean="0">
+              <a:rPr lang="en-US" dirty="0">
                 <a:latin typeface="Consolas" charset="0"/>
                 <a:ea typeface="Consolas" charset="0"/>
                 <a:cs typeface="Consolas" charset="0"/>
@@ -33922,36 +33897,35 @@
           <a:p>
             <a:pPr lvl="2"/>
             <a:r>
-              <a:rPr lang="en-US" dirty="0" err="1" smtClean="0"/>
+              <a:rPr lang="en-US" dirty="0" err="1"/>
               <a:t>matchDict</a:t>
             </a:r>
             <a:r>
-              <a:rPr lang="en-US" dirty="0" smtClean="0"/>
+              <a:rPr lang="en-US" dirty="0"/>
               <a:t> can include inputs, outputs, pointwise metadata</a:t>
             </a:r>
           </a:p>
           <a:p>
             <a:pPr lvl="2"/>
             <a:r>
-              <a:rPr lang="en-US" dirty="0" smtClean="0"/>
+              <a:rPr lang="en-US" dirty="0"/>
               <a:t>Returns (index, </a:t>
             </a:r>
             <a:r>
-              <a:rPr lang="en-US" dirty="0" err="1" smtClean="0"/>
+              <a:rPr lang="en-US" dirty="0" err="1"/>
               <a:t>dict</a:t>
             </a:r>
             <a:r>
-              <a:rPr lang="en-US" dirty="0" smtClean="0"/>
+              <a:rPr lang="en-US" dirty="0"/>
               <a:t>) of the first match found</a:t>
             </a:r>
           </a:p>
           <a:p>
             <a:pPr lvl="2"/>
             <a:r>
-              <a:rPr lang="en-US" dirty="0" smtClean="0"/>
+              <a:rPr lang="en-US" dirty="0"/>
               <a:t>Returns (0,None) if not found</a:t>
             </a:r>
-            <a:endParaRPr lang="en-US" dirty="0"/>
           </a:p>
         </p:txBody>
       </p:sp>
@@ -33989,13 +33963,6 @@
   <p:clrMapOvr>
     <a:masterClrMapping/>
   </p:clrMapOvr>
-  <p:timing>
-    <p:tnLst>
-      <p:par>
-        <p:cTn xmlns:p14="http://schemas.microsoft.com/office/powerpoint/2010/main" id="1" dur="indefinite" restart="never" nodeType="tmRoot"/>
-      </p:par>
-    </p:tnLst>
-  </p:timing>
 </p:sld>
 </file>
 
@@ -34032,18 +33999,17 @@
           <a:lstStyle/>
           <a:p>
             <a:r>
-              <a:rPr lang="en-US" dirty="0" smtClean="0"/>
+              <a:rPr lang="en-US" dirty="0"/>
               <a:t>New API </a:t>
             </a:r>
             <a:r>
-              <a:rPr lang="mr-IN" dirty="0" smtClean="0"/>
+              <a:rPr lang="mr-IN" dirty="0"/>
               <a:t>–</a:t>
             </a:r>
             <a:r>
-              <a:rPr lang="en-US" dirty="0" smtClean="0"/>
-              <a:t> Properties</a:t>
+              <a:rPr lang="en-US" dirty="0"/>
+              <a:t> Get Each Realization</a:t>
             </a:r>
-            <a:endParaRPr lang="en-US" dirty="0"/>
           </a:p>
         </p:txBody>
       </p:sp>
@@ -34062,108 +34028,107 @@
           <a:bodyPr/>
           <a:lstStyle/>
           <a:p>
-            <a:r>
-              <a:rPr lang="en-US" dirty="0" err="1" smtClean="0">
-                <a:latin typeface="Consolas" charset="0"/>
-                <a:ea typeface="Consolas" charset="0"/>
-                <a:cs typeface="Consolas" charset="0"/>
-              </a:rPr>
-              <a:t>len</a:t>
-            </a:r>
-            <a:r>
-              <a:rPr lang="en-US" dirty="0" smtClean="0">
-                <a:latin typeface="Consolas" charset="0"/>
-                <a:ea typeface="Consolas" charset="0"/>
-                <a:cs typeface="Consolas" charset="0"/>
-              </a:rPr>
-              <a:t>(data) </a:t>
-            </a:r>
-            <a:r>
-              <a:rPr lang="en-US" dirty="0" smtClean="0"/>
-              <a:t>gives number of realizations (rows)</a:t>
-            </a:r>
-          </a:p>
-          <a:p>
-            <a:endParaRPr lang="en-US" dirty="0" smtClean="0"/>
-          </a:p>
-          <a:p>
-            <a:r>
-              <a:rPr lang="en-US" dirty="0" err="1" smtClean="0">
-                <a:latin typeface="Consolas" charset="0"/>
-                <a:ea typeface="Consolas" charset="0"/>
-                <a:cs typeface="Consolas" charset="0"/>
-              </a:rPr>
-              <a:t>data.size</a:t>
-            </a:r>
-            <a:r>
-              <a:rPr lang="en-US" dirty="0" smtClean="0">
-                <a:latin typeface="Consolas" charset="0"/>
-                <a:ea typeface="Consolas" charset="0"/>
-                <a:cs typeface="Consolas" charset="0"/>
-              </a:rPr>
-              <a:t> </a:t>
-            </a:r>
-            <a:r>
-              <a:rPr lang="en-US" dirty="0" smtClean="0"/>
-              <a:t>also gives number of realizations</a:t>
-            </a:r>
-          </a:p>
-          <a:p>
-            <a:endParaRPr lang="en-US" dirty="0" smtClean="0"/>
-          </a:p>
-          <a:p>
-            <a:r>
-              <a:rPr lang="en-US" dirty="0" err="1" smtClean="0">
-                <a:latin typeface="Consolas" charset="0"/>
-                <a:ea typeface="Consolas" charset="0"/>
-                <a:cs typeface="Consolas" charset="0"/>
-              </a:rPr>
-              <a:t>data.vars</a:t>
-            </a:r>
-            <a:r>
-              <a:rPr lang="en-US" dirty="0" smtClean="0">
-                <a:latin typeface="Consolas" charset="0"/>
-                <a:ea typeface="Consolas" charset="0"/>
-                <a:cs typeface="Consolas" charset="0"/>
-              </a:rPr>
-              <a:t> </a:t>
-            </a:r>
-            <a:r>
-              <a:rPr lang="en-US" dirty="0" smtClean="0"/>
-              <a:t>gives list of all input, output, pointwise metadata</a:t>
-            </a:r>
+            <a:endParaRPr lang="en-US" dirty="0"/>
           </a:p>
           <a:p>
             <a:endParaRPr lang="en-US" dirty="0"/>
           </a:p>
           <a:p>
             <a:r>
-              <a:rPr lang="en-US" dirty="0" err="1" smtClean="0">
+              <a:rPr lang="en-US" dirty="0"/>
+              <a:t>By slices</a:t>
+            </a:r>
+          </a:p>
+          <a:p>
+            <a:pPr lvl="1"/>
+            <a:r>
+              <a:rPr lang="en-US" dirty="0" err="1">
                 <a:latin typeface="Consolas" charset="0"/>
                 <a:ea typeface="Consolas" charset="0"/>
                 <a:cs typeface="Consolas" charset="0"/>
               </a:rPr>
-              <a:t>data.indexes</a:t>
+              <a:t>data.sliceByRealization</a:t>
             </a:r>
             <a:r>
-              <a:rPr lang="en-US" dirty="0" smtClean="0">
+              <a:rPr lang="en-US" dirty="0">
                 <a:latin typeface="Consolas" charset="0"/>
                 <a:ea typeface="Consolas" charset="0"/>
                 <a:cs typeface="Consolas" charset="0"/>
               </a:rPr>
+              <a:t>(index=</a:t>
+            </a:r>
+            <a:r>
+              <a:rPr lang="en-US" dirty="0" err="1">
+                <a:latin typeface="Consolas" charset="0"/>
+                <a:ea typeface="Consolas" charset="0"/>
+                <a:cs typeface="Consolas" charset="0"/>
+              </a:rPr>
+              <a:t>data.sampleTag</a:t>
+            </a:r>
+            <a:r>
+              <a:rPr lang="en-US" dirty="0">
+                <a:latin typeface="Consolas" charset="0"/>
+                <a:ea typeface="Consolas" charset="0"/>
+                <a:cs typeface="Consolas" charset="0"/>
+              </a:rPr>
+              <a:t>)</a:t>
+            </a:r>
+          </a:p>
+          <a:p>
+            <a:pPr lvl="2"/>
+            <a:r>
+              <a:rPr lang="en-US" dirty="0"/>
+              <a:t>Returns a list of each realization (as an </a:t>
+            </a:r>
+            <a:r>
+              <a:rPr lang="en-US" dirty="0" err="1"/>
+              <a:t>xarray</a:t>
+            </a:r>
+            <a:r>
+              <a:rPr lang="en-US" dirty="0"/>
+              <a:t>)</a:t>
+            </a:r>
+          </a:p>
+          <a:p>
+            <a:pPr lvl="2"/>
+            <a:r>
+              <a:rPr lang="en-US" dirty="0"/>
+              <a:t>Fills in </a:t>
+            </a:r>
+            <a:r>
+              <a:rPr lang="en-US" dirty="0" err="1"/>
+              <a:t>NaN</a:t>
+            </a:r>
+            <a:r>
+              <a:rPr lang="en-US" dirty="0"/>
+              <a:t> if variable has missing values for a realization</a:t>
+            </a:r>
+          </a:p>
+          <a:p>
+            <a:pPr lvl="2"/>
+            <a:r>
+              <a:rPr lang="en-US" dirty="0"/>
+              <a:t>This is the best way to see what value a pivot parameter has for an </a:t>
+            </a:r>
+            <a:r>
+              <a:rPr lang="en-US" dirty="0" err="1"/>
+              <a:t>unsynchonized</a:t>
+            </a:r>
+            <a:r>
+              <a:rPr lang="en-US" dirty="0"/>
               <a:t> </a:t>
             </a:r>
             <a:r>
-              <a:rPr lang="en-US" dirty="0" smtClean="0"/>
-              <a:t>gives list of dependent coordinates (</a:t>
+              <a:rPr lang="en-US" dirty="0" err="1"/>
+              <a:t>DataSet</a:t>
             </a:r>
             <a:r>
-              <a:rPr lang="en-US" dirty="0" err="1" smtClean="0"/>
-              <a:t>pivotParameters</a:t>
+              <a:rPr lang="en-US" dirty="0"/>
+              <a:t> or </a:t>
             </a:r>
             <a:r>
-              <a:rPr lang="en-US" dirty="0" smtClean="0"/>
-              <a:t>)</a:t>
+              <a:rPr lang="en-US" dirty="0" err="1"/>
+              <a:t>HistorySet</a:t>
             </a:r>
             <a:endParaRPr lang="en-US" dirty="0"/>
           </a:p>
@@ -34196,20 +34161,13 @@
     </p:spTree>
     <p:extLst>
       <p:ext uri="{BB962C8B-B14F-4D97-AF65-F5344CB8AC3E}">
-        <p14:creationId xmlns:p14="http://schemas.microsoft.com/office/powerpoint/2010/main" val="265489246"/>
+        <p14:creationId xmlns:p14="http://schemas.microsoft.com/office/powerpoint/2010/main" val="1208746391"/>
       </p:ext>
     </p:extLst>
   </p:cSld>
   <p:clrMapOvr>
     <a:masterClrMapping/>
   </p:clrMapOvr>
-  <p:timing>
-    <p:tnLst>
-      <p:par>
-        <p:cTn xmlns:p14="http://schemas.microsoft.com/office/powerpoint/2010/main" id="1" dur="indefinite" restart="never" nodeType="tmRoot"/>
-      </p:par>
-    </p:tnLst>
-  </p:timing>
 </p:sld>
 </file>
 
@@ -34246,14 +34204,218 @@
           <a:lstStyle/>
           <a:p>
             <a:r>
-              <a:rPr lang="en-US" dirty="0" err="1" smtClean="0"/>
+              <a:rPr lang="en-US" dirty="0"/>
+              <a:t>New API </a:t>
+            </a:r>
+            <a:r>
+              <a:rPr lang="mr-IN" dirty="0"/>
+              <a:t>–</a:t>
+            </a:r>
+            <a:r>
+              <a:rPr lang="en-US" dirty="0"/>
+              <a:t> Properties</a:t>
+            </a:r>
+          </a:p>
+        </p:txBody>
+      </p:sp>
+      <p:sp>
+        <p:nvSpPr>
+          <p:cNvPr id="3" name="Content Placeholder 2"/>
+          <p:cNvSpPr>
+            <a:spLocks noGrp="1"/>
+          </p:cNvSpPr>
+          <p:nvPr>
+            <p:ph idx="1"/>
+          </p:nvPr>
+        </p:nvSpPr>
+        <p:spPr/>
+        <p:txBody>
+          <a:bodyPr/>
+          <a:lstStyle/>
+          <a:p>
+            <a:r>
+              <a:rPr lang="en-US" dirty="0" err="1">
+                <a:latin typeface="Consolas" charset="0"/>
+                <a:ea typeface="Consolas" charset="0"/>
+                <a:cs typeface="Consolas" charset="0"/>
+              </a:rPr>
+              <a:t>len</a:t>
+            </a:r>
+            <a:r>
+              <a:rPr lang="en-US" dirty="0">
+                <a:latin typeface="Consolas" charset="0"/>
+                <a:ea typeface="Consolas" charset="0"/>
+                <a:cs typeface="Consolas" charset="0"/>
+              </a:rPr>
+              <a:t>(data) </a:t>
+            </a:r>
+            <a:r>
+              <a:rPr lang="en-US" dirty="0"/>
+              <a:t>gives number of realizations (rows)</a:t>
+            </a:r>
+          </a:p>
+          <a:p>
+            <a:endParaRPr lang="en-US" dirty="0"/>
+          </a:p>
+          <a:p>
+            <a:r>
+              <a:rPr lang="en-US" dirty="0" err="1">
+                <a:latin typeface="Consolas" charset="0"/>
+                <a:ea typeface="Consolas" charset="0"/>
+                <a:cs typeface="Consolas" charset="0"/>
+              </a:rPr>
+              <a:t>data.size</a:t>
+            </a:r>
+            <a:r>
+              <a:rPr lang="en-US" dirty="0">
+                <a:latin typeface="Consolas" charset="0"/>
+                <a:ea typeface="Consolas" charset="0"/>
+                <a:cs typeface="Consolas" charset="0"/>
+              </a:rPr>
+              <a:t> </a:t>
+            </a:r>
+            <a:r>
+              <a:rPr lang="en-US" dirty="0"/>
+              <a:t>also gives number of realizations</a:t>
+            </a:r>
+          </a:p>
+          <a:p>
+            <a:endParaRPr lang="en-US" dirty="0"/>
+          </a:p>
+          <a:p>
+            <a:r>
+              <a:rPr lang="en-US" dirty="0" err="1">
+                <a:latin typeface="Consolas" charset="0"/>
+                <a:ea typeface="Consolas" charset="0"/>
+                <a:cs typeface="Consolas" charset="0"/>
+              </a:rPr>
+              <a:t>data.vars</a:t>
+            </a:r>
+            <a:r>
+              <a:rPr lang="en-US" dirty="0">
+                <a:latin typeface="Consolas" charset="0"/>
+                <a:ea typeface="Consolas" charset="0"/>
+                <a:cs typeface="Consolas" charset="0"/>
+              </a:rPr>
+              <a:t> </a:t>
+            </a:r>
+            <a:r>
+              <a:rPr lang="en-US" dirty="0"/>
+              <a:t>gives list of all input, output, pointwise metadata</a:t>
+            </a:r>
+          </a:p>
+          <a:p>
+            <a:endParaRPr lang="en-US" dirty="0"/>
+          </a:p>
+          <a:p>
+            <a:r>
+              <a:rPr lang="en-US" dirty="0" err="1">
+                <a:latin typeface="Consolas" charset="0"/>
+                <a:ea typeface="Consolas" charset="0"/>
+                <a:cs typeface="Consolas" charset="0"/>
+              </a:rPr>
+              <a:t>data.indexes</a:t>
+            </a:r>
+            <a:r>
+              <a:rPr lang="en-US" dirty="0">
+                <a:latin typeface="Consolas" charset="0"/>
+                <a:ea typeface="Consolas" charset="0"/>
+                <a:cs typeface="Consolas" charset="0"/>
+              </a:rPr>
+              <a:t> </a:t>
+            </a:r>
+            <a:r>
+              <a:rPr lang="en-US" dirty="0"/>
+              <a:t>gives list of dependent coordinates (</a:t>
+            </a:r>
+            <a:r>
+              <a:rPr lang="en-US" dirty="0" err="1"/>
+              <a:t>pivotParameters</a:t>
+            </a:r>
+            <a:r>
+              <a:rPr lang="en-US" dirty="0"/>
+              <a:t>)</a:t>
+            </a:r>
+          </a:p>
+        </p:txBody>
+      </p:sp>
+      <p:sp>
+        <p:nvSpPr>
+          <p:cNvPr id="4" name="Slide Number Placeholder 3"/>
+          <p:cNvSpPr>
+            <a:spLocks noGrp="1"/>
+          </p:cNvSpPr>
+          <p:nvPr>
+            <p:ph type="sldNum" sz="quarter" idx="11"/>
+          </p:nvPr>
+        </p:nvSpPr>
+        <p:spPr/>
+        <p:txBody>
+          <a:bodyPr/>
+          <a:lstStyle/>
+          <a:p>
+            <a:fld id="{4B4332F1-BAE3-4172-AA6D-91F763B329EF}" type="slidenum">
+              <a:rPr lang="en-US" smtClean="0"/>
+              <a:pPr/>
+              <a:t>12</a:t>
+            </a:fld>
+            <a:endParaRPr lang="en-US"/>
+          </a:p>
+        </p:txBody>
+      </p:sp>
+    </p:spTree>
+    <p:extLst>
+      <p:ext uri="{BB962C8B-B14F-4D97-AF65-F5344CB8AC3E}">
+        <p14:creationId xmlns:p14="http://schemas.microsoft.com/office/powerpoint/2010/main" val="265489246"/>
+      </p:ext>
+    </p:extLst>
+  </p:cSld>
+  <p:clrMapOvr>
+    <a:masterClrMapping/>
+  </p:clrMapOvr>
+</p:sld>
+</file>
+
+<file path=ppt/slides/slide13.xml><?xml version="1.0" encoding="utf-8"?>
+<p:sld xmlns:a="http://schemas.openxmlformats.org/drawingml/2006/main" xmlns:r="http://schemas.openxmlformats.org/officeDocument/2006/relationships" xmlns:p="http://schemas.openxmlformats.org/presentationml/2006/main">
+  <p:cSld>
+    <p:spTree>
+      <p:nvGrpSpPr>
+        <p:cNvPr id="1" name=""/>
+        <p:cNvGrpSpPr/>
+        <p:nvPr/>
+      </p:nvGrpSpPr>
+      <p:grpSpPr>
+        <a:xfrm>
+          <a:off x="0" y="0"/>
+          <a:ext cx="0" cy="0"/>
+          <a:chOff x="0" y="0"/>
+          <a:chExt cx="0" cy="0"/>
+        </a:xfrm>
+      </p:grpSpPr>
+      <p:sp>
+        <p:nvSpPr>
+          <p:cNvPr id="2" name="Title 1"/>
+          <p:cNvSpPr>
+            <a:spLocks noGrp="1"/>
+          </p:cNvSpPr>
+          <p:nvPr>
+            <p:ph type="title"/>
+          </p:nvPr>
+        </p:nvSpPr>
+        <p:spPr/>
+        <p:txBody>
+          <a:bodyPr/>
+          <a:lstStyle/>
+          <a:p>
+            <a:r>
+              <a:rPr lang="en-US" dirty="0" err="1"/>
               <a:t>Xarray</a:t>
             </a:r>
             <a:r>
-              <a:rPr lang="en-US" dirty="0" smtClean="0"/>
+              <a:rPr lang="en-US" dirty="0"/>
               <a:t> Operations</a:t>
             </a:r>
-            <a:endParaRPr lang="en-US" dirty="0"/>
           </a:p>
         </p:txBody>
       </p:sp>
@@ -34278,41 +34440,33 @@
           <a:lstStyle/>
           <a:p>
             <a:r>
-              <a:rPr lang="en-US" dirty="0" smtClean="0"/>
+              <a:rPr lang="en-US" dirty="0"/>
               <a:t>ds = </a:t>
             </a:r>
             <a:r>
-              <a:rPr lang="en-US" dirty="0" err="1" smtClean="0"/>
+              <a:rPr lang="en-US" dirty="0" err="1"/>
               <a:t>data.asDataset</a:t>
             </a:r>
             <a:r>
-              <a:rPr lang="en-US" dirty="0" smtClean="0"/>
+              <a:rPr lang="en-US" dirty="0"/>
               <a:t>()</a:t>
             </a:r>
           </a:p>
           <a:p>
             <a:pPr lvl="1"/>
             <a:r>
-              <a:rPr lang="en-US" dirty="0" smtClean="0"/>
-              <a:t>Select the entries at the “</a:t>
-            </a:r>
-            <a:r>
               <a:rPr lang="en-US" dirty="0"/>
-              <a:t>7</a:t>
-            </a:r>
-            <a:r>
-              <a:rPr lang="en-US" dirty="0" smtClean="0"/>
-              <a:t>th” burnup entry:</a:t>
+              <a:t>Select the entries at the “7th” burnup entry:</a:t>
             </a:r>
           </a:p>
           <a:p>
             <a:pPr lvl="1"/>
-            <a:endParaRPr lang="en-US" dirty="0" smtClean="0"/>
+            <a:endParaRPr lang="en-US" dirty="0"/>
           </a:p>
           <a:p>
             <a:pPr lvl="1"/>
             <a:r>
-              <a:rPr lang="en-US" dirty="0" smtClean="0"/>
+              <a:rPr lang="en-US" dirty="0"/>
               <a:t>Select the entry where time is 15:</a:t>
             </a:r>
           </a:p>
@@ -34323,7 +34477,7 @@
           <a:p>
             <a:pPr lvl="1"/>
             <a:r>
-              <a:rPr lang="en-US" dirty="0" smtClean="0"/>
+              <a:rPr lang="en-US" dirty="0"/>
               <a:t>Nearest neighbor lookup</a:t>
             </a:r>
           </a:p>
@@ -34334,7 +34488,7 @@
           <a:p>
             <a:pPr lvl="1"/>
             <a:r>
-              <a:rPr lang="en-US" dirty="0" smtClean="0"/>
+              <a:rPr lang="en-US" dirty="0"/>
               <a:t>Values of “x” between 0.2 and 0.8</a:t>
             </a:r>
           </a:p>
@@ -34345,15 +34499,15 @@
           <a:p>
             <a:pPr lvl="1"/>
             <a:r>
-              <a:rPr lang="en-US" dirty="0" smtClean="0"/>
+              <a:rPr lang="en-US" dirty="0"/>
               <a:t>Get the </a:t>
             </a:r>
             <a:r>
-              <a:rPr lang="en-US" dirty="0" err="1" smtClean="0"/>
+              <a:rPr lang="en-US" dirty="0" err="1"/>
               <a:t>np.array</a:t>
             </a:r>
             <a:r>
-              <a:rPr lang="en-US" dirty="0" smtClean="0"/>
+              <a:rPr lang="en-US" dirty="0"/>
               <a:t> of values for “a”:</a:t>
             </a:r>
           </a:p>
@@ -34364,7 +34518,7 @@
           <a:p>
             <a:pPr lvl="1"/>
             <a:r>
-              <a:rPr lang="en-US" dirty="0" smtClean="0"/>
+              <a:rPr lang="en-US" dirty="0"/>
               <a:t>Elementwise Operations:</a:t>
             </a:r>
           </a:p>
@@ -34375,30 +34529,29 @@
           <a:p>
             <a:pPr lvl="1"/>
             <a:r>
-              <a:rPr lang="en-US" dirty="0" smtClean="0"/>
+              <a:rPr lang="en-US" dirty="0"/>
               <a:t>Many </a:t>
             </a:r>
             <a:r>
-              <a:rPr lang="en-US" dirty="0" err="1" smtClean="0"/>
+              <a:rPr lang="en-US" dirty="0" err="1"/>
               <a:t>builtin</a:t>
             </a:r>
             <a:r>
-              <a:rPr lang="en-US" dirty="0" smtClean="0"/>
+              <a:rPr lang="en-US" dirty="0"/>
               <a:t> functions: mean, </a:t>
             </a:r>
             <a:r>
-              <a:rPr lang="en-US" dirty="0" err="1" smtClean="0"/>
+              <a:rPr lang="en-US" dirty="0" err="1"/>
               <a:t>std</a:t>
             </a:r>
             <a:r>
-              <a:rPr lang="en-US" dirty="0" smtClean="0"/>
+              <a:rPr lang="en-US" dirty="0"/>
               <a:t>, where</a:t>
             </a:r>
-            <a:endParaRPr lang="en-US" dirty="0"/>
           </a:p>
           <a:p>
             <a:pPr lvl="1"/>
-            <a:endParaRPr lang="en-US" dirty="0" smtClean="0"/>
+            <a:endParaRPr lang="en-US" dirty="0"/>
           </a:p>
           <a:p>
             <a:pPr lvl="1"/>
@@ -34424,7 +34577,7 @@
             <a:fld id="{4B4332F1-BAE3-4172-AA6D-91F763B329EF}" type="slidenum">
               <a:rPr lang="en-US" smtClean="0"/>
               <a:pPr/>
-              <a:t>12</a:t>
+              <a:t>13</a:t>
             </a:fld>
             <a:endParaRPr lang="en-US"/>
           </a:p>
@@ -34620,17 +34773,10 @@
   <p:clrMapOvr>
     <a:masterClrMapping/>
   </p:clrMapOvr>
-  <p:timing>
-    <p:tnLst>
-      <p:par>
-        <p:cTn xmlns:p14="http://schemas.microsoft.com/office/powerpoint/2010/main" id="1" dur="indefinite" restart="never" nodeType="tmRoot"/>
-      </p:par>
-    </p:tnLst>
-  </p:timing>
 </p:sld>
 </file>
 
-<file path=ppt/slides/slide13.xml><?xml version="1.0" encoding="utf-8"?>
+<file path=ppt/slides/slide14.xml><?xml version="1.0" encoding="utf-8"?>
 <p:sld xmlns:a="http://schemas.openxmlformats.org/drawingml/2006/main" xmlns:r="http://schemas.openxmlformats.org/officeDocument/2006/relationships" xmlns:p="http://schemas.openxmlformats.org/presentationml/2006/main">
   <p:cSld>
     <p:spTree>
@@ -34663,10 +34809,9 @@
           <a:lstStyle/>
           <a:p>
             <a:r>
-              <a:rPr lang="en-US" dirty="0" smtClean="0"/>
+              <a:rPr lang="en-US" dirty="0"/>
               <a:t>Realizations</a:t>
             </a:r>
-            <a:endParaRPr lang="en-US" dirty="0"/>
           </a:p>
         </p:txBody>
       </p:sp>
@@ -34686,25 +34831,25 @@
           <a:lstStyle/>
           <a:p>
             <a:r>
-              <a:rPr lang="en-US" dirty="0" smtClean="0"/>
+              <a:rPr lang="en-US" dirty="0"/>
               <a:t>Old way:</a:t>
             </a:r>
           </a:p>
           <a:p>
             <a:pPr lvl="1"/>
             <a:r>
-              <a:rPr lang="en-US" dirty="0" smtClean="0"/>
+              <a:rPr lang="en-US" dirty="0"/>
               <a:t>Used dictionaries of ‘inputs’, ‘outputs’, ‘metadata’</a:t>
             </a:r>
           </a:p>
           <a:p>
             <a:pPr lvl="1"/>
             <a:r>
-              <a:rPr lang="en-US" dirty="0" smtClean="0"/>
+              <a:rPr lang="en-US" dirty="0"/>
               <a:t>Each entry is </a:t>
             </a:r>
             <a:r>
-              <a:rPr lang="en-US" dirty="0" smtClean="0">
+              <a:rPr lang="en-US" dirty="0">
                 <a:latin typeface="Consolas" charset="0"/>
                 <a:ea typeface="Consolas" charset="0"/>
                 <a:cs typeface="Consolas" charset="0"/>
@@ -34712,18 +34857,18 @@
               <a:t>c1darray</a:t>
             </a:r>
             <a:r>
-              <a:rPr lang="en-US" dirty="0" smtClean="0"/>
+              <a:rPr lang="en-US" dirty="0"/>
               <a:t> or </a:t>
             </a:r>
             <a:r>
-              <a:rPr lang="en-US" dirty="0" err="1" smtClean="0">
+              <a:rPr lang="en-US" dirty="0" err="1">
                 <a:latin typeface="Consolas" charset="0"/>
                 <a:ea typeface="Consolas" charset="0"/>
                 <a:cs typeface="Consolas" charset="0"/>
               </a:rPr>
               <a:t>np.ndarray</a:t>
             </a:r>
-            <a:endParaRPr lang="en-US" dirty="0" smtClean="0">
+            <a:endParaRPr lang="en-US" dirty="0">
               <a:latin typeface="Consolas" charset="0"/>
               <a:ea typeface="Consolas" charset="0"/>
               <a:cs typeface="Consolas" charset="0"/>
@@ -34735,25 +34880,25 @@
           </a:p>
           <a:p>
             <a:r>
-              <a:rPr lang="en-US" dirty="0" smtClean="0"/>
+              <a:rPr lang="en-US" dirty="0"/>
               <a:t>New way:</a:t>
             </a:r>
           </a:p>
           <a:p>
             <a:pPr lvl="1"/>
             <a:r>
-              <a:rPr lang="en-US" dirty="0" smtClean="0"/>
+              <a:rPr lang="en-US" dirty="0"/>
               <a:t>All inputs, outputs, pointwise metadata in same space</a:t>
             </a:r>
           </a:p>
           <a:p>
             <a:pPr lvl="1"/>
             <a:r>
-              <a:rPr lang="en-US" dirty="0" smtClean="0"/>
+              <a:rPr lang="en-US" dirty="0"/>
               <a:t>Each entry is still </a:t>
             </a:r>
             <a:r>
-              <a:rPr lang="en-US" dirty="0" err="1" smtClean="0">
+              <a:rPr lang="en-US" dirty="0" err="1">
                 <a:latin typeface="Consolas" charset="0"/>
                 <a:ea typeface="Consolas" charset="0"/>
                 <a:cs typeface="Consolas" charset="0"/>
@@ -34761,7 +34906,7 @@
               <a:t>np.ndarray</a:t>
             </a:r>
             <a:r>
-              <a:rPr lang="en-US" dirty="0" smtClean="0">
+              <a:rPr lang="en-US" dirty="0">
                 <a:latin typeface="Consolas" charset="0"/>
                 <a:ea typeface="Consolas" charset="0"/>
                 <a:cs typeface="Consolas" charset="0"/>
@@ -34769,11 +34914,11 @@
               <a:t> </a:t>
             </a:r>
             <a:r>
-              <a:rPr lang="en-US" dirty="0" smtClean="0"/>
+              <a:rPr lang="en-US" dirty="0"/>
               <a:t>(or </a:t>
             </a:r>
             <a:r>
-              <a:rPr lang="en-US" dirty="0" smtClean="0">
+              <a:rPr lang="en-US" dirty="0">
                 <a:latin typeface="Consolas" charset="0"/>
                 <a:ea typeface="Consolas" charset="0"/>
                 <a:cs typeface="Consolas" charset="0"/>
@@ -34781,18 +34926,18 @@
               <a:t>c1darray</a:t>
             </a:r>
             <a:r>
-              <a:rPr lang="en-US" dirty="0" smtClean="0"/>
+              <a:rPr lang="en-US" dirty="0"/>
               <a:t>)</a:t>
             </a:r>
           </a:p>
           <a:p>
             <a:pPr lvl="2"/>
             <a:r>
-              <a:rPr lang="en-US" dirty="0" smtClean="0"/>
+              <a:rPr lang="en-US" dirty="0"/>
               <a:t>size 1 if scalar (</a:t>
             </a:r>
             <a:r>
-              <a:rPr lang="en-US" dirty="0" smtClean="0">
+              <a:rPr lang="en-US" dirty="0">
                 <a:latin typeface="Consolas" charset="0"/>
                 <a:ea typeface="Consolas" charset="0"/>
                 <a:cs typeface="Consolas" charset="0"/>
@@ -34800,7 +34945,7 @@
               <a:t>float, </a:t>
             </a:r>
             <a:r>
-              <a:rPr lang="en-US" dirty="0" err="1" smtClean="0">
+              <a:rPr lang="en-US" dirty="0" err="1">
                 <a:latin typeface="Consolas" charset="0"/>
                 <a:ea typeface="Consolas" charset="0"/>
                 <a:cs typeface="Consolas" charset="0"/>
@@ -34808,7 +34953,7 @@
               <a:t>str</a:t>
             </a:r>
             <a:r>
-              <a:rPr lang="en-US" dirty="0" smtClean="0">
+              <a:rPr lang="en-US" dirty="0">
                 <a:latin typeface="Consolas" charset="0"/>
                 <a:ea typeface="Consolas" charset="0"/>
                 <a:cs typeface="Consolas" charset="0"/>
@@ -34816,7 +34961,7 @@
               <a:t>, </a:t>
             </a:r>
             <a:r>
-              <a:rPr lang="en-US" dirty="0" err="1" smtClean="0">
+              <a:rPr lang="en-US" dirty="0" err="1">
                 <a:latin typeface="Consolas" charset="0"/>
                 <a:ea typeface="Consolas" charset="0"/>
                 <a:cs typeface="Consolas" charset="0"/>
@@ -34824,7 +34969,7 @@
               <a:t>unicode</a:t>
             </a:r>
             <a:r>
-              <a:rPr lang="en-US" dirty="0" smtClean="0">
+              <a:rPr lang="en-US" dirty="0">
                 <a:latin typeface="Consolas" charset="0"/>
                 <a:ea typeface="Consolas" charset="0"/>
                 <a:cs typeface="Consolas" charset="0"/>
@@ -34832,7 +34977,7 @@
               <a:t>, </a:t>
             </a:r>
             <a:r>
-              <a:rPr lang="en-US" dirty="0" err="1" smtClean="0">
+              <a:rPr lang="en-US" dirty="0" err="1">
                 <a:latin typeface="Consolas" charset="0"/>
                 <a:ea typeface="Consolas" charset="0"/>
                 <a:cs typeface="Consolas" charset="0"/>
@@ -34840,17 +34985,16 @@
               <a:t>int</a:t>
             </a:r>
             <a:r>
-              <a:rPr lang="en-US" dirty="0" smtClean="0"/>
+              <a:rPr lang="en-US" dirty="0"/>
               <a:t>)</a:t>
             </a:r>
           </a:p>
           <a:p>
             <a:pPr lvl="2"/>
             <a:r>
-              <a:rPr lang="en-US" dirty="0" smtClean="0"/>
+              <a:rPr lang="en-US" dirty="0"/>
               <a:t>longer if history</a:t>
             </a:r>
-            <a:endParaRPr lang="en-US" dirty="0"/>
           </a:p>
         </p:txBody>
       </p:sp>
@@ -34872,7 +35016,7 @@
             <a:fld id="{4B4332F1-BAE3-4172-AA6D-91F763B329EF}" type="slidenum">
               <a:rPr lang="en-US" smtClean="0"/>
               <a:pPr/>
-              <a:t>13</a:t>
+              <a:t>14</a:t>
             </a:fld>
             <a:endParaRPr lang="en-US"/>
           </a:p>
@@ -34918,17 +35062,10 @@
   <p:clrMapOvr>
     <a:masterClrMapping/>
   </p:clrMapOvr>
-  <p:timing>
-    <p:tnLst>
-      <p:par>
-        <p:cTn xmlns:p14="http://schemas.microsoft.com/office/powerpoint/2010/main" id="1" dur="indefinite" restart="never" nodeType="tmRoot"/>
-      </p:par>
-    </p:tnLst>
-  </p:timing>
 </p:sld>
 </file>
 
-<file path=ppt/slides/slide14.xml><?xml version="1.0" encoding="utf-8"?>
+<file path=ppt/slides/slide15.xml><?xml version="1.0" encoding="utf-8"?>
 <p:sld xmlns:a="http://schemas.openxmlformats.org/drawingml/2006/main" xmlns:r="http://schemas.openxmlformats.org/officeDocument/2006/relationships" xmlns:p="http://schemas.openxmlformats.org/presentationml/2006/main">
   <p:cSld>
     <p:spTree>
@@ -34961,10 +35098,9 @@
           <a:lstStyle/>
           <a:p>
             <a:r>
-              <a:rPr lang="en-US" dirty="0" smtClean="0"/>
+              <a:rPr lang="en-US" dirty="0"/>
               <a:t>Example Conversion: Adding Realization</a:t>
             </a:r>
-            <a:endParaRPr lang="en-US" dirty="0"/>
           </a:p>
         </p:txBody>
       </p:sp>
@@ -34984,18 +35120,18 @@
           <a:lstStyle/>
           <a:p>
             <a:r>
-              <a:rPr lang="en-US" dirty="0" smtClean="0"/>
+              <a:rPr lang="en-US" dirty="0"/>
               <a:t>Old way, taken from </a:t>
             </a:r>
             <a:r>
-              <a:rPr lang="en-US" dirty="0" err="1" smtClean="0">
+              <a:rPr lang="en-US" dirty="0" err="1">
                 <a:latin typeface="Consolas" charset="0"/>
                 <a:ea typeface="Consolas" charset="0"/>
                 <a:cs typeface="Consolas" charset="0"/>
               </a:rPr>
               <a:t>Dummy.collectOutputFromDict</a:t>
             </a:r>
-            <a:endParaRPr lang="en-US" dirty="0" smtClean="0">
+            <a:endParaRPr lang="en-US" dirty="0">
               <a:latin typeface="Consolas" charset="0"/>
               <a:ea typeface="Consolas" charset="0"/>
               <a:cs typeface="Consolas" charset="0"/>
@@ -35005,26 +35141,25 @@
             <a:endParaRPr lang="en-US" dirty="0"/>
           </a:p>
           <a:p>
-            <a:endParaRPr lang="en-US" dirty="0" smtClean="0"/>
+            <a:endParaRPr lang="en-US" dirty="0"/>
           </a:p>
           <a:p>
             <a:endParaRPr lang="en-US" dirty="0"/>
           </a:p>
           <a:p>
-            <a:endParaRPr lang="en-US" dirty="0" smtClean="0"/>
+            <a:endParaRPr lang="en-US" dirty="0"/>
           </a:p>
           <a:p>
             <a:endParaRPr lang="en-US" dirty="0"/>
           </a:p>
           <a:p>
-            <a:endParaRPr lang="en-US" dirty="0" smtClean="0"/>
+            <a:endParaRPr lang="en-US" dirty="0"/>
           </a:p>
           <a:p>
             <a:r>
-              <a:rPr lang="en-US" dirty="0" smtClean="0"/>
+              <a:rPr lang="en-US" dirty="0"/>
               <a:t>New way:</a:t>
             </a:r>
-            <a:endParaRPr lang="en-US" dirty="0"/>
           </a:p>
         </p:txBody>
       </p:sp>
@@ -35046,7 +35181,7 @@
             <a:fld id="{4B4332F1-BAE3-4172-AA6D-91F763B329EF}" type="slidenum">
               <a:rPr lang="en-US" smtClean="0"/>
               <a:pPr/>
-              <a:t>14</a:t>
+              <a:t>15</a:t>
             </a:fld>
             <a:endParaRPr lang="en-US"/>
           </a:p>
@@ -35125,7 +35260,7 @@
 </p:sld>
 </file>
 
-<file path=ppt/slides/slide15.xml><?xml version="1.0" encoding="utf-8"?>
+<file path=ppt/slides/slide16.xml><?xml version="1.0" encoding="utf-8"?>
 <p:sld xmlns:a="http://schemas.openxmlformats.org/drawingml/2006/main" xmlns:r="http://schemas.openxmlformats.org/officeDocument/2006/relationships" xmlns:p="http://schemas.openxmlformats.org/presentationml/2006/main">
   <p:cSld>
     <p:spTree>
@@ -35158,19 +35293,19 @@
           <a:lstStyle/>
           <a:p>
             <a:r>
-              <a:rPr lang="en-US" dirty="0" smtClean="0"/>
+              <a:rPr lang="en-US" dirty="0"/>
               <a:t>Common Issues </a:t>
             </a:r>
             <a:r>
-              <a:rPr lang="mr-IN" dirty="0" smtClean="0"/>
+              <a:rPr lang="mr-IN" dirty="0"/>
               <a:t>–</a:t>
             </a:r>
             <a:r>
-              <a:rPr lang="en-US" dirty="0" smtClean="0"/>
+              <a:rPr lang="en-US" dirty="0"/>
               <a:t> object </a:t>
             </a:r>
             <a:r>
-              <a:rPr lang="en-US" dirty="0" err="1" smtClean="0"/>
+              <a:rPr lang="en-US" dirty="0" err="1"/>
               <a:t>dtype</a:t>
             </a:r>
             <a:endParaRPr lang="en-US" dirty="0"/>
@@ -35193,11 +35328,11 @@
           <a:lstStyle/>
           <a:p>
             <a:r>
-              <a:rPr lang="en-US" dirty="0" smtClean="0"/>
+              <a:rPr lang="en-US" dirty="0"/>
               <a:t>Data is stored in </a:t>
             </a:r>
             <a:r>
-              <a:rPr lang="en-US" dirty="0" err="1" smtClean="0">
+              <a:rPr lang="en-US" dirty="0" err="1">
                 <a:latin typeface="Consolas" charset="0"/>
                 <a:ea typeface="Consolas" charset="0"/>
                 <a:cs typeface="Consolas" charset="0"/>
@@ -35205,11 +35340,11 @@
               <a:t>np.ndarray</a:t>
             </a:r>
             <a:r>
-              <a:rPr lang="en-US" dirty="0" smtClean="0"/>
+              <a:rPr lang="en-US" dirty="0"/>
               <a:t> with </a:t>
             </a:r>
             <a:r>
-              <a:rPr lang="en-US" dirty="0" err="1" smtClean="0">
+              <a:rPr lang="en-US" dirty="0" err="1">
                 <a:latin typeface="Consolas" charset="0"/>
                 <a:ea typeface="Consolas" charset="0"/>
                 <a:cs typeface="Consolas" charset="0"/>
@@ -35217,7 +35352,7 @@
               <a:t>dtype</a:t>
             </a:r>
             <a:r>
-              <a:rPr lang="en-US" dirty="0" smtClean="0">
+              <a:rPr lang="en-US" dirty="0">
                 <a:latin typeface="Consolas" charset="0"/>
                 <a:ea typeface="Consolas" charset="0"/>
                 <a:cs typeface="Consolas" charset="0"/>
@@ -35227,22 +35362,22 @@
           </a:p>
           <a:p>
             <a:r>
-              <a:rPr lang="en-US" dirty="0" smtClean="0"/>
+              <a:rPr lang="en-US" dirty="0"/>
               <a:t>Most tools are fine with this.  However,</a:t>
             </a:r>
           </a:p>
           <a:p>
             <a:pPr lvl="1"/>
             <a:r>
-              <a:rPr lang="en-US" dirty="0" err="1" smtClean="0"/>
+              <a:rPr lang="en-US" dirty="0" err="1"/>
               <a:t>sklearn</a:t>
             </a:r>
             <a:r>
-              <a:rPr lang="en-US" dirty="0" smtClean="0"/>
+              <a:rPr lang="en-US" dirty="0"/>
               <a:t> ROMs demand </a:t>
             </a:r>
             <a:r>
-              <a:rPr lang="en-US" dirty="0" err="1" smtClean="0">
+              <a:rPr lang="en-US" dirty="0" err="1">
                 <a:latin typeface="Consolas" charset="0"/>
                 <a:ea typeface="Consolas" charset="0"/>
                 <a:cs typeface="Consolas" charset="0"/>
@@ -35250,7 +35385,7 @@
               <a:t>dtype</a:t>
             </a:r>
             <a:r>
-              <a:rPr lang="en-US" dirty="0" smtClean="0">
+              <a:rPr lang="en-US" dirty="0">
                 <a:latin typeface="Consolas" charset="0"/>
                 <a:ea typeface="Consolas" charset="0"/>
                 <a:cs typeface="Consolas" charset="0"/>
@@ -35258,7 +35393,7 @@
               <a:t>=float </a:t>
             </a:r>
             <a:r>
-              <a:rPr lang="en-US" dirty="0" smtClean="0"/>
+              <a:rPr lang="en-US" dirty="0"/>
               <a:t>or similar</a:t>
             </a:r>
           </a:p>
@@ -35268,7 +35403,7 @@
           </a:p>
           <a:p>
             <a:r>
-              <a:rPr lang="en-US" dirty="0" smtClean="0"/>
+              <a:rPr lang="en-US" dirty="0"/>
               <a:t>How to fix this?  Convert type when obtaining data</a:t>
             </a:r>
           </a:p>
@@ -35296,7 +35431,7 @@
             <a:fld id="{4B4332F1-BAE3-4172-AA6D-91F763B329EF}" type="slidenum">
               <a:rPr lang="en-US" smtClean="0"/>
               <a:pPr/>
-              <a:t>15</a:t>
+              <a:t>16</a:t>
             </a:fld>
             <a:endParaRPr lang="en-US"/>
           </a:p>
@@ -35345,7 +35480,7 @@
 </p:sld>
 </file>
 
-<file path=ppt/slides/slide16.xml><?xml version="1.0" encoding="utf-8"?>
+<file path=ppt/slides/slide17.xml><?xml version="1.0" encoding="utf-8"?>
 <p:sld xmlns:a="http://schemas.openxmlformats.org/drawingml/2006/main" xmlns:r="http://schemas.openxmlformats.org/officeDocument/2006/relationships" xmlns:p="http://schemas.openxmlformats.org/presentationml/2006/main">
   <p:cSld>
     <p:spTree>
@@ -35378,18 +35513,17 @@
           <a:lstStyle/>
           <a:p>
             <a:r>
-              <a:rPr lang="en-US" dirty="0" smtClean="0"/>
+              <a:rPr lang="en-US" dirty="0"/>
               <a:t>Common Issues </a:t>
             </a:r>
             <a:r>
-              <a:rPr lang="mr-IN" dirty="0" smtClean="0"/>
+              <a:rPr lang="mr-IN" dirty="0"/>
               <a:t>–</a:t>
             </a:r>
             <a:r>
-              <a:rPr lang="en-US" dirty="0" smtClean="0"/>
+              <a:rPr lang="en-US" dirty="0"/>
               <a:t> Obtaining pivot values</a:t>
             </a:r>
-            <a:endParaRPr lang="en-US" dirty="0"/>
           </a:p>
         </p:txBody>
       </p:sp>
@@ -35409,27 +35543,27 @@
           <a:lstStyle/>
           <a:p>
             <a:r>
-              <a:rPr lang="en-US" dirty="0" smtClean="0"/>
+              <a:rPr lang="en-US" dirty="0"/>
               <a:t>Pivot values are stored in the coordinates of the variables that depend on them</a:t>
             </a:r>
           </a:p>
           <a:p>
             <a:r>
-              <a:rPr lang="en-US" dirty="0" smtClean="0"/>
+              <a:rPr lang="en-US" dirty="0"/>
               <a:t>They are not stored as variables themselves</a:t>
             </a:r>
           </a:p>
           <a:p>
             <a:r>
-              <a:rPr lang="en-US" dirty="0" smtClean="0"/>
+              <a:rPr lang="en-US" dirty="0"/>
               <a:t>Example: Retrieving “time” from inside an </a:t>
             </a:r>
             <a:r>
-              <a:rPr lang="en-US" dirty="0" err="1" smtClean="0"/>
+              <a:rPr lang="en-US" dirty="0" err="1"/>
               <a:t>ExternalModel</a:t>
             </a:r>
             <a:r>
-              <a:rPr lang="en-US" dirty="0" smtClean="0"/>
+              <a:rPr lang="en-US" dirty="0"/>
               <a:t>:</a:t>
             </a:r>
           </a:p>
@@ -35437,31 +35571,27 @@
             <a:endParaRPr lang="en-US" dirty="0"/>
           </a:p>
           <a:p>
-            <a:endParaRPr lang="en-US" dirty="0" smtClean="0"/>
+            <a:endParaRPr lang="en-US" dirty="0"/>
           </a:p>
           <a:p>
-            <a:endParaRPr lang="en-US" dirty="0" smtClean="0"/>
+            <a:endParaRPr lang="en-US" dirty="0"/>
           </a:p>
           <a:p>
             <a:r>
-              <a:rPr lang="en-US" dirty="0" smtClean="0"/>
-              <a:t>From inside RAVEN can access on the data object directly</a:t>
-            </a:r>
-            <a:r>
-              <a:rPr lang="en-US" dirty="0" smtClean="0"/>
-              <a:t>:</a:t>
+              <a:rPr lang="en-US" dirty="0"/>
+              <a:t>From inside RAVEN can access on the data object directly:</a:t>
             </a:r>
           </a:p>
           <a:p>
-            <a:endParaRPr lang="en-US" dirty="0" smtClean="0"/>
+            <a:endParaRPr lang="en-US" dirty="0"/>
           </a:p>
           <a:p>
             <a:r>
-              <a:rPr lang="en-US" dirty="0" smtClean="0"/>
+              <a:rPr lang="en-US" dirty="0"/>
               <a:t>‘time’ should not be listed as input or output variables in the new </a:t>
             </a:r>
             <a:r>
-              <a:rPr lang="en-US" smtClean="0"/>
+              <a:rPr lang="en-US"/>
               <a:t>dataobjects</a:t>
             </a:r>
             <a:endParaRPr lang="en-US" dirty="0"/>
@@ -35471,7 +35601,7 @@
               <a:buNone/>
             </a:pPr>
             <a:r>
-              <a:rPr lang="en-US" dirty="0" smtClean="0"/>
+              <a:rPr lang="en-US" dirty="0"/>
               <a:t>	</a:t>
             </a:r>
           </a:p>
@@ -35495,7 +35625,7 @@
             <a:fld id="{4B4332F1-BAE3-4172-AA6D-91F763B329EF}" type="slidenum">
               <a:rPr lang="en-US" smtClean="0"/>
               <a:pPr/>
-              <a:t>16</a:t>
+              <a:t>17</a:t>
             </a:fld>
             <a:endParaRPr lang="en-US"/>
           </a:p>
@@ -35612,10 +35742,9 @@
           <a:lstStyle/>
           <a:p>
             <a:r>
-              <a:rPr lang="en-US" b="0" dirty="0" smtClean="0"/>
+              <a:rPr lang="en-US" b="0" dirty="0"/>
               <a:t>Outline</a:t>
             </a:r>
-            <a:endParaRPr lang="en-US" b="0" dirty="0"/>
           </a:p>
         </p:txBody>
       </p:sp>
@@ -35639,18 +35768,18 @@
               <a:buAutoNum type="arabicPeriod"/>
             </a:pPr>
             <a:r>
-              <a:rPr lang="en-US" dirty="0" smtClean="0">
+              <a:rPr lang="en-US" dirty="0">
                 <a:solidFill>
                   <a:srgbClr val="3333CC"/>
                 </a:solidFill>
               </a:rPr>
               <a:t>Scope</a:t>
             </a:r>
-            <a:endParaRPr lang="en-US" dirty="0" smtClean="0"/>
+            <a:endParaRPr lang="en-US" dirty="0"/>
           </a:p>
           <a:p>
             <a:pPr lvl="1"/>
-            <a:endParaRPr lang="en-US" dirty="0" smtClean="0"/>
+            <a:endParaRPr lang="en-US" dirty="0"/>
           </a:p>
           <a:p>
             <a:pPr marL="457200" indent="-457200">
@@ -35658,7 +35787,7 @@
               <a:buAutoNum type="arabicPeriod"/>
             </a:pPr>
             <a:r>
-              <a:rPr lang="en-US" dirty="0" smtClean="0">
+              <a:rPr lang="en-US" dirty="0">
                 <a:solidFill>
                   <a:srgbClr val="3333CC"/>
                 </a:solidFill>
@@ -35671,7 +35800,7 @@
               <a:buFont typeface="+mj-lt"/>
               <a:buAutoNum type="arabicPeriod"/>
             </a:pPr>
-            <a:endParaRPr lang="en-US" dirty="0" smtClean="0">
+            <a:endParaRPr lang="en-US" dirty="0">
               <a:solidFill>
                 <a:srgbClr val="3333CC"/>
               </a:solidFill>
@@ -35683,7 +35812,7 @@
               <a:buAutoNum type="arabicPeriod"/>
             </a:pPr>
             <a:r>
-              <a:rPr lang="en-US" dirty="0" smtClean="0">
+              <a:rPr lang="en-US" dirty="0">
                 <a:solidFill>
                   <a:srgbClr val="3333CC"/>
                 </a:solidFill>
@@ -35708,7 +35837,7 @@
               <a:buAutoNum type="arabicPeriod"/>
             </a:pPr>
             <a:r>
-              <a:rPr lang="en-US" dirty="0" smtClean="0">
+              <a:rPr lang="en-US" dirty="0">
                 <a:solidFill>
                   <a:srgbClr val="3333CC"/>
                 </a:solidFill>
@@ -35733,7 +35862,7 @@
               <a:buAutoNum type="arabicPeriod"/>
             </a:pPr>
             <a:r>
-              <a:rPr lang="en-US" dirty="0" smtClean="0">
+              <a:rPr lang="en-US" dirty="0">
                 <a:solidFill>
                   <a:srgbClr val="3333CC"/>
                 </a:solidFill>
@@ -35744,7 +35873,7 @@
           </a:p>
           <a:p>
             <a:pPr lvl="1"/>
-            <a:endParaRPr lang="en-US" dirty="0" smtClean="0"/>
+            <a:endParaRPr lang="en-US" dirty="0"/>
           </a:p>
         </p:txBody>
       </p:sp>
@@ -35789,13 +35918,6 @@
       </p:transition>
     </mc:Fallback>
   </mc:AlternateContent>
-  <p:timing>
-    <p:tnLst>
-      <p:par>
-        <p:cTn xmlns:p14="http://schemas.microsoft.com/office/powerpoint/2010/main" id="1" dur="indefinite" restart="never" nodeType="tmRoot"/>
-      </p:par>
-    </p:tnLst>
-  </p:timing>
 </p:sld>
 </file>
 
@@ -35838,21 +35960,21 @@
           <a:p>
             <a:pPr algn="just"/>
             <a:r>
-              <a:rPr lang="en-US" dirty="0" smtClean="0"/>
+              <a:rPr lang="en-US" dirty="0"/>
               <a:t>The current Data Objects are good, but limited</a:t>
             </a:r>
           </a:p>
           <a:p>
             <a:pPr lvl="1" algn="just"/>
             <a:r>
-              <a:rPr lang="en-US" dirty="0" smtClean="0"/>
+              <a:rPr lang="en-US" dirty="0"/>
               <a:t>1000 variables</a:t>
             </a:r>
           </a:p>
           <a:p>
             <a:pPr lvl="1" algn="just"/>
             <a:r>
-              <a:rPr lang="en-US" dirty="0" smtClean="0"/>
+              <a:rPr lang="en-US" dirty="0"/>
               <a:t>5000 samples</a:t>
             </a:r>
           </a:p>
@@ -35863,58 +35985,58 @@
           <a:p>
             <a:pPr algn="just"/>
             <a:r>
-              <a:rPr lang="en-US" dirty="0" smtClean="0"/>
+              <a:rPr lang="en-US" dirty="0"/>
               <a:t>Reworked </a:t>
             </a:r>
             <a:r>
-              <a:rPr lang="en-US" dirty="0" err="1" smtClean="0"/>
+              <a:rPr lang="en-US" dirty="0" err="1"/>
               <a:t>DataObjects</a:t>
             </a:r>
             <a:r>
-              <a:rPr lang="en-US" dirty="0" smtClean="0"/>
+              <a:rPr lang="en-US" dirty="0"/>
               <a:t> improve by:</a:t>
             </a:r>
           </a:p>
           <a:p>
             <a:pPr lvl="1" algn="just"/>
             <a:r>
-              <a:rPr lang="en-US" dirty="0" smtClean="0"/>
+              <a:rPr lang="en-US" dirty="0"/>
               <a:t>Removing loops over variables</a:t>
             </a:r>
           </a:p>
           <a:p>
             <a:pPr lvl="1" algn="just"/>
             <a:r>
-              <a:rPr lang="en-US" dirty="0" smtClean="0"/>
+              <a:rPr lang="en-US" dirty="0"/>
               <a:t>Adding data by rows/columns instead of single entries</a:t>
             </a:r>
           </a:p>
           <a:p>
             <a:pPr lvl="1" algn="just"/>
             <a:r>
-              <a:rPr lang="en-US" dirty="0" smtClean="0"/>
+              <a:rPr lang="en-US" dirty="0"/>
               <a:t>Accessing powerful data structure management tools</a:t>
             </a:r>
           </a:p>
           <a:p>
             <a:pPr lvl="2" algn="just"/>
             <a:r>
-              <a:rPr lang="en-US" dirty="0" smtClean="0"/>
+              <a:rPr lang="en-US" dirty="0"/>
               <a:t>Pandas, </a:t>
             </a:r>
             <a:r>
-              <a:rPr lang="en-US" dirty="0" err="1" smtClean="0"/>
+              <a:rPr lang="en-US" dirty="0" err="1"/>
               <a:t>Xarray</a:t>
             </a:r>
             <a:r>
-              <a:rPr lang="en-US" dirty="0" smtClean="0"/>
+              <a:rPr lang="en-US" dirty="0"/>
               <a:t>, </a:t>
             </a:r>
             <a:r>
-              <a:rPr lang="en-US" dirty="0" err="1" smtClean="0"/>
+              <a:rPr lang="en-US" dirty="0" err="1"/>
               <a:t>Dask</a:t>
             </a:r>
-            <a:endParaRPr lang="en-US" dirty="0" smtClean="0"/>
+            <a:endParaRPr lang="en-US" dirty="0"/>
           </a:p>
           <a:p>
             <a:pPr lvl="2" algn="just"/>
@@ -35923,28 +36045,28 @@
           <a:p>
             <a:pPr algn="just"/>
             <a:r>
-              <a:rPr lang="en-US" dirty="0" smtClean="0"/>
+              <a:rPr lang="en-US" dirty="0"/>
               <a:t>Sprint work:</a:t>
             </a:r>
           </a:p>
           <a:p>
             <a:pPr lvl="1" algn="just"/>
             <a:r>
-              <a:rPr lang="en-US" dirty="0" smtClean="0"/>
+              <a:rPr lang="en-US" dirty="0"/>
               <a:t>Convert RAVEN entities to use new API</a:t>
             </a:r>
           </a:p>
           <a:p>
             <a:pPr lvl="2" algn="just"/>
             <a:r>
-              <a:rPr lang="en-US" dirty="0" smtClean="0"/>
+              <a:rPr lang="en-US" dirty="0"/>
               <a:t>Simple API conversion</a:t>
             </a:r>
           </a:p>
           <a:p>
             <a:pPr lvl="2" algn="just"/>
             <a:r>
-              <a:rPr lang="en-US" dirty="0" smtClean="0"/>
+              <a:rPr lang="en-US" dirty="0"/>
               <a:t>Rethinking implementation</a:t>
             </a:r>
           </a:p>
@@ -35995,10 +36117,9 @@
           <a:lstStyle/>
           <a:p>
             <a:r>
-              <a:rPr lang="en-US" dirty="0" smtClean="0"/>
+              <a:rPr lang="en-US" dirty="0"/>
               <a:t>Scope</a:t>
             </a:r>
-            <a:endParaRPr lang="en-US" dirty="0"/>
           </a:p>
         </p:txBody>
       </p:sp>
@@ -36024,13 +36145,6 @@
       </p:transition>
     </mc:Fallback>
   </mc:AlternateContent>
-  <p:timing>
-    <p:tnLst>
-      <p:par>
-        <p:cTn xmlns:p14="http://schemas.microsoft.com/office/powerpoint/2010/main" id="1" dur="indefinite" restart="never" nodeType="tmRoot"/>
-      </p:par>
-    </p:tnLst>
-  </p:timing>
 </p:sld>
 </file>
 
@@ -36067,10 +36181,9 @@
           <a:lstStyle/>
           <a:p>
             <a:r>
-              <a:rPr lang="en-US" dirty="0" smtClean="0"/>
+              <a:rPr lang="en-US" dirty="0"/>
               <a:t>New Structure</a:t>
             </a:r>
-            <a:endParaRPr lang="en-US" dirty="0"/>
           </a:p>
         </p:txBody>
       </p:sp>
@@ -36151,7 +36264,7 @@
               <a:tabLst/>
             </a:pPr>
             <a:r>
-              <a:rPr kumimoji="0" lang="en-US" sz="2400" b="0" i="0" u="none" strike="noStrike" cap="none" normalizeH="0" baseline="0" smtClean="0">
+              <a:rPr kumimoji="0" lang="en-US" sz="2400" b="0" i="0" u="none" strike="noStrike" cap="none" normalizeH="0" baseline="0">
                 <a:ln>
                   <a:noFill/>
                 </a:ln>
@@ -36163,7 +36276,7 @@
               </a:rPr>
               <a:t>DataObject</a:t>
             </a:r>
-            <a:endParaRPr kumimoji="0" lang="en-US" sz="2400" b="0" i="0" u="none" strike="noStrike" cap="none" normalizeH="0" baseline="0" dirty="0" smtClean="0">
+            <a:endParaRPr kumimoji="0" lang="en-US" sz="2400" b="0" i="0" u="none" strike="noStrike" cap="none" normalizeH="0" baseline="0" dirty="0">
               <a:ln>
                 <a:noFill/>
               </a:ln>
@@ -36229,7 +36342,7 @@
               <a:tabLst/>
             </a:pPr>
             <a:r>
-              <a:rPr kumimoji="0" lang="en-US" sz="2400" b="0" i="0" u="none" strike="noStrike" cap="none" normalizeH="0" baseline="0" smtClean="0">
+              <a:rPr kumimoji="0" lang="en-US" sz="2400" b="0" i="0" u="none" strike="noStrike" cap="none" normalizeH="0" baseline="0">
                 <a:ln>
                   <a:noFill/>
                 </a:ln>
@@ -36241,7 +36354,7 @@
               </a:rPr>
               <a:t>DataSet</a:t>
             </a:r>
-            <a:endParaRPr kumimoji="0" lang="en-US" sz="2400" b="0" i="0" u="none" strike="noStrike" cap="none" normalizeH="0" baseline="0" dirty="0" smtClean="0">
+            <a:endParaRPr kumimoji="0" lang="en-US" sz="2400" b="0" i="0" u="none" strike="noStrike" cap="none" normalizeH="0" baseline="0" dirty="0">
               <a:ln>
                 <a:noFill/>
               </a:ln>
@@ -36307,7 +36420,7 @@
               <a:tabLst/>
             </a:pPr>
             <a:r>
-              <a:rPr kumimoji="0" lang="en-US" sz="2400" b="0" i="0" u="none" strike="noStrike" cap="none" normalizeH="0" baseline="0" dirty="0" err="1" smtClean="0">
+              <a:rPr kumimoji="0" lang="en-US" sz="2400" b="0" i="0" u="none" strike="noStrike" cap="none" normalizeH="0" baseline="0" dirty="0" err="1">
                 <a:ln>
                   <a:noFill/>
                 </a:ln>
@@ -36319,7 +36432,7 @@
               </a:rPr>
               <a:t>PointSet</a:t>
             </a:r>
-            <a:endParaRPr kumimoji="0" lang="en-US" sz="2400" b="0" i="0" u="none" strike="noStrike" cap="none" normalizeH="0" baseline="0" dirty="0" smtClean="0">
+            <a:endParaRPr kumimoji="0" lang="en-US" sz="2400" b="0" i="0" u="none" strike="noStrike" cap="none" normalizeH="0" baseline="0" dirty="0">
               <a:ln>
                 <a:noFill/>
               </a:ln>
@@ -36385,7 +36498,7 @@
               <a:tabLst/>
             </a:pPr>
             <a:r>
-              <a:rPr kumimoji="0" lang="en-US" sz="2400" b="0" i="0" u="none" strike="noStrike" cap="none" normalizeH="0" baseline="0" dirty="0" err="1" smtClean="0">
+              <a:rPr kumimoji="0" lang="en-US" sz="2400" b="0" i="0" u="none" strike="noStrike" cap="none" normalizeH="0" baseline="0" dirty="0" err="1">
                 <a:ln>
                   <a:noFill/>
                 </a:ln>
@@ -36397,7 +36510,7 @@
               </a:rPr>
               <a:t>HistorySet</a:t>
             </a:r>
-            <a:endParaRPr kumimoji="0" lang="en-US" sz="2400" b="0" i="0" u="none" strike="noStrike" cap="none" normalizeH="0" baseline="0" dirty="0" smtClean="0">
+            <a:endParaRPr kumimoji="0" lang="en-US" sz="2400" b="0" i="0" u="none" strike="noStrike" cap="none" normalizeH="0" baseline="0" dirty="0">
               <a:ln>
                 <a:noFill/>
               </a:ln>
@@ -36559,7 +36672,7 @@
               <a:tabLst/>
             </a:pPr>
             <a:r>
-              <a:rPr kumimoji="0" lang="en-US" sz="2400" b="0" i="0" u="none" strike="noStrike" cap="none" normalizeH="0" baseline="0" dirty="0" err="1" smtClean="0">
+              <a:rPr kumimoji="0" lang="en-US" sz="2400" b="0" i="0" u="none" strike="noStrike" cap="none" normalizeH="0" baseline="0" dirty="0" err="1">
                 <a:ln>
                   <a:noFill/>
                 </a:ln>
@@ -36571,7 +36684,7 @@
               </a:rPr>
               <a:t>BaseType</a:t>
             </a:r>
-            <a:endParaRPr kumimoji="0" lang="en-US" sz="2400" b="0" i="0" u="none" strike="noStrike" cap="none" normalizeH="0" baseline="0" dirty="0" smtClean="0">
+            <a:endParaRPr kumimoji="0" lang="en-US" sz="2400" b="0" i="0" u="none" strike="noStrike" cap="none" normalizeH="0" baseline="0" dirty="0">
               <a:ln>
                 <a:noFill/>
               </a:ln>
@@ -36616,6 +36729,157 @@
           <a:effectLst/>
         </p:spPr>
       </p:cxnSp>
+      <p:sp>
+        <p:nvSpPr>
+          <p:cNvPr id="13" name="Rounded Rectangle 12">
+            <a:extLst>
+              <a:ext uri="{FF2B5EF4-FFF2-40B4-BE49-F238E27FC236}">
+                <a16:creationId xmlns:a16="http://schemas.microsoft.com/office/drawing/2014/main" id="{390D45A6-588E-8B4E-9734-EDDD57206C1A}"/>
+              </a:ext>
+            </a:extLst>
+          </p:cNvPr>
+          <p:cNvSpPr/>
+          <p:nvPr/>
+        </p:nvSpPr>
+        <p:spPr bwMode="auto">
+          <a:xfrm>
+            <a:off x="6500191" y="3992078"/>
+            <a:ext cx="1762539" cy="516835"/>
+          </a:xfrm>
+          <a:prstGeom prst="roundRect">
+            <a:avLst/>
+          </a:prstGeom>
+          <a:solidFill>
+            <a:srgbClr val="FF6600"/>
+          </a:solidFill>
+          <a:ln w="9525" cap="flat" cmpd="sng" algn="ctr">
+            <a:solidFill>
+              <a:schemeClr val="tx1"/>
+            </a:solidFill>
+            <a:prstDash val="solid"/>
+            <a:round/>
+            <a:headEnd type="none" w="med" len="med"/>
+            <a:tailEnd type="none" w="med" len="med"/>
+          </a:ln>
+          <a:effectLst/>
+        </p:spPr>
+        <p:txBody>
+          <a:bodyPr vert="horz" wrap="square" lIns="91440" tIns="45720" rIns="91440" bIns="45720" numCol="1" rtlCol="0" anchor="ctr" anchorCtr="1" compatLnSpc="1">
+            <a:prstTxWarp prst="textNoShape">
+              <a:avLst/>
+            </a:prstTxWarp>
+          </a:bodyPr>
+          <a:lstStyle/>
+          <a:p>
+            <a:pPr marL="0" marR="0" indent="0" algn="l" defTabSz="914400" rtl="0" eaLnBrk="0" fontAlgn="base" latinLnBrk="0" hangingPunct="0">
+              <a:lnSpc>
+                <a:spcPct val="100000"/>
+              </a:lnSpc>
+              <a:spcBef>
+                <a:spcPct val="0"/>
+              </a:spcBef>
+              <a:spcAft>
+                <a:spcPct val="0"/>
+              </a:spcAft>
+              <a:buClrTx/>
+              <a:buSzTx/>
+              <a:buFontTx/>
+              <a:buNone/>
+              <a:tabLst/>
+            </a:pPr>
+            <a:r>
+              <a:rPr kumimoji="0" lang="en-US" sz="2400" b="0" i="0" u="none" strike="noStrike" cap="none" normalizeH="0" baseline="0" dirty="0">
+                <a:ln>
+                  <a:noFill/>
+                </a:ln>
+                <a:solidFill>
+                  <a:schemeClr val="tx1"/>
+                </a:solidFill>
+                <a:effectLst/>
+                <a:latin typeface="Times New Roman" pitchFamily="18" charset="0"/>
+              </a:rPr>
+              <a:t>Database</a:t>
+            </a:r>
+          </a:p>
+        </p:txBody>
+      </p:sp>
+      <p:cxnSp>
+        <p:nvCxnSpPr>
+          <p:cNvPr id="14" name="Straight Arrow Connector 13">
+            <a:extLst>
+              <a:ext uri="{FF2B5EF4-FFF2-40B4-BE49-F238E27FC236}">
+                <a16:creationId xmlns:a16="http://schemas.microsoft.com/office/drawing/2014/main" id="{441FB017-54AE-D14A-926A-8CDC716F11F8}"/>
+              </a:ext>
+            </a:extLst>
+          </p:cNvPr>
+          <p:cNvCxnSpPr>
+            <a:cxnSpLocks/>
+            <a:stCxn id="13" idx="0"/>
+            <a:endCxn id="5" idx="2"/>
+          </p:cNvCxnSpPr>
+          <p:nvPr/>
+        </p:nvCxnSpPr>
+        <p:spPr bwMode="auto">
+          <a:xfrm flipH="1" flipV="1">
+            <a:off x="4379844" y="3571460"/>
+            <a:ext cx="3001617" cy="420618"/>
+          </a:xfrm>
+          <a:prstGeom prst="straightConnector1">
+            <a:avLst/>
+          </a:prstGeom>
+          <a:solidFill>
+            <a:schemeClr val="accent1"/>
+          </a:solidFill>
+          <a:ln w="9525" cap="flat" cmpd="sng" algn="ctr">
+            <a:solidFill>
+              <a:schemeClr val="tx1"/>
+            </a:solidFill>
+            <a:prstDash val="solid"/>
+            <a:round/>
+            <a:headEnd type="none" w="med" len="med"/>
+            <a:tailEnd type="triangle"/>
+          </a:ln>
+          <a:effectLst/>
+        </p:spPr>
+      </p:cxnSp>
+      <p:cxnSp>
+        <p:nvCxnSpPr>
+          <p:cNvPr id="17" name="Straight Arrow Connector 16">
+            <a:extLst>
+              <a:ext uri="{FF2B5EF4-FFF2-40B4-BE49-F238E27FC236}">
+                <a16:creationId xmlns:a16="http://schemas.microsoft.com/office/drawing/2014/main" id="{BF12E0B2-86C3-8741-917D-4CDC5B6CA458}"/>
+              </a:ext>
+            </a:extLst>
+          </p:cNvPr>
+          <p:cNvCxnSpPr>
+            <a:cxnSpLocks/>
+            <a:stCxn id="13" idx="2"/>
+          </p:cNvCxnSpPr>
+          <p:nvPr/>
+        </p:nvCxnSpPr>
+        <p:spPr bwMode="auto">
+          <a:xfrm>
+            <a:off x="7381461" y="4508913"/>
+            <a:ext cx="1762538" cy="596347"/>
+          </a:xfrm>
+          <a:prstGeom prst="straightConnector1">
+            <a:avLst/>
+          </a:prstGeom>
+          <a:solidFill>
+            <a:schemeClr val="accent1"/>
+          </a:solidFill>
+          <a:ln w="9525" cap="flat" cmpd="sng" algn="ctr">
+            <a:solidFill>
+              <a:schemeClr val="tx1"/>
+            </a:solidFill>
+            <a:prstDash val="solid"/>
+            <a:round/>
+            <a:headEnd type="none" w="med" len="med"/>
+            <a:tailEnd type="triangle"/>
+          </a:ln>
+          <a:effectLst/>
+        </p:spPr>
+      </p:cxnSp>
     </p:spTree>
     <p:extLst>
       <p:ext uri="{BB962C8B-B14F-4D97-AF65-F5344CB8AC3E}">
@@ -36626,13 +36890,6 @@
   <p:clrMapOvr>
     <a:masterClrMapping/>
   </p:clrMapOvr>
-  <p:timing>
-    <p:tnLst>
-      <p:par>
-        <p:cTn xmlns:p14="http://schemas.microsoft.com/office/powerpoint/2010/main" id="1" dur="indefinite" restart="never" nodeType="tmRoot"/>
-      </p:par>
-    </p:tnLst>
-  </p:timing>
 </p:sld>
 </file>
 
@@ -36675,15 +36932,15 @@
           <a:p>
             <a:pPr algn="just"/>
             <a:r>
-              <a:rPr lang="en-US" dirty="0" smtClean="0"/>
+              <a:rPr lang="en-US" dirty="0"/>
               <a:t>Base Class: </a:t>
             </a:r>
             <a:r>
-              <a:rPr lang="en-US" dirty="0" err="1" smtClean="0"/>
+              <a:rPr lang="en-US" dirty="0" err="1"/>
               <a:t>XDataObject.</a:t>
             </a:r>
             <a:r>
-              <a:rPr lang="en-US" dirty="0" err="1" smtClean="0">
+              <a:rPr lang="en-US" dirty="0" err="1">
                 <a:solidFill>
                   <a:schemeClr val="accent1"/>
                 </a:solidFill>
@@ -36691,11 +36948,11 @@
               <a:t>DataObject</a:t>
             </a:r>
             <a:r>
-              <a:rPr lang="en-US" dirty="0" smtClean="0"/>
+              <a:rPr lang="en-US" dirty="0"/>
               <a:t>( </a:t>
             </a:r>
             <a:r>
-              <a:rPr lang="en-US" dirty="0" err="1" smtClean="0">
+              <a:rPr lang="en-US" dirty="0" err="1">
                 <a:solidFill>
                   <a:schemeClr val="accent6"/>
                 </a:solidFill>
@@ -36703,7 +36960,7 @@
               <a:t>BaseType</a:t>
             </a:r>
             <a:r>
-              <a:rPr lang="en-US" dirty="0" smtClean="0">
+              <a:rPr lang="en-US" dirty="0">
                 <a:solidFill>
                   <a:schemeClr val="accent6"/>
                 </a:solidFill>
@@ -36711,46 +36968,46 @@
               <a:t> </a:t>
             </a:r>
             <a:r>
-              <a:rPr lang="en-US" dirty="0" smtClean="0"/>
+              <a:rPr lang="en-US" dirty="0"/>
               <a:t>)</a:t>
             </a:r>
           </a:p>
           <a:p>
             <a:pPr lvl="1" algn="just"/>
             <a:r>
-              <a:rPr lang="en-US" dirty="0" smtClean="0"/>
+              <a:rPr lang="en-US" dirty="0"/>
               <a:t>Input specifications, </a:t>
             </a:r>
             <a:r>
-              <a:rPr lang="en-US" dirty="0" err="1" smtClean="0"/>
+              <a:rPr lang="en-US" dirty="0" err="1"/>
               <a:t>readMoreXML</a:t>
             </a:r>
             <a:r>
-              <a:rPr lang="en-US" dirty="0" smtClean="0"/>
+              <a:rPr lang="en-US" dirty="0"/>
               <a:t>, </a:t>
             </a:r>
             <a:r>
-              <a:rPr lang="en-US" dirty="0" err="1" smtClean="0"/>
+              <a:rPr lang="en-US" dirty="0" err="1"/>
               <a:t>setPivotParams</a:t>
             </a:r>
-            <a:endParaRPr lang="en-US" dirty="0" smtClean="0"/>
+            <a:endParaRPr lang="en-US" dirty="0"/>
           </a:p>
           <a:p>
             <a:pPr lvl="1" algn="just"/>
-            <a:endParaRPr lang="en-US" dirty="0" smtClean="0"/>
+            <a:endParaRPr lang="en-US" dirty="0"/>
           </a:p>
           <a:p>
             <a:pPr algn="just"/>
             <a:r>
-              <a:rPr lang="en-US" dirty="0" smtClean="0"/>
+              <a:rPr lang="en-US" dirty="0"/>
               <a:t>ND set: </a:t>
             </a:r>
             <a:r>
-              <a:rPr lang="en-US" dirty="0" err="1" smtClean="0"/>
+              <a:rPr lang="en-US" dirty="0" err="1"/>
               <a:t>XDataSet.</a:t>
             </a:r>
             <a:r>
-              <a:rPr lang="en-US" dirty="0" err="1" smtClean="0">
+              <a:rPr lang="en-US" dirty="0" err="1">
                 <a:solidFill>
                   <a:srgbClr val="FF6600"/>
                 </a:solidFill>
@@ -36758,11 +37015,11 @@
               <a:t>DataSet</a:t>
             </a:r>
             <a:r>
-              <a:rPr lang="en-US" dirty="0" smtClean="0"/>
+              <a:rPr lang="en-US" dirty="0"/>
               <a:t>( </a:t>
             </a:r>
             <a:r>
-              <a:rPr lang="en-US" dirty="0" err="1" smtClean="0">
+              <a:rPr lang="en-US" dirty="0" err="1">
                 <a:solidFill>
                   <a:schemeClr val="accent1"/>
                 </a:solidFill>
@@ -36770,7 +37027,7 @@
               <a:t>DataObject</a:t>
             </a:r>
             <a:r>
-              <a:rPr lang="en-US" dirty="0" smtClean="0">
+              <a:rPr lang="en-US" dirty="0">
                 <a:solidFill>
                   <a:schemeClr val="accent1"/>
                 </a:solidFill>
@@ -36778,21 +37035,21 @@
               <a:t> </a:t>
             </a:r>
             <a:r>
-              <a:rPr lang="en-US" dirty="0" smtClean="0"/>
+              <a:rPr lang="en-US" dirty="0"/>
               <a:t>)</a:t>
             </a:r>
           </a:p>
           <a:p>
             <a:pPr lvl="1" algn="just"/>
             <a:r>
-              <a:rPr lang="en-US" dirty="0" smtClean="0"/>
+              <a:rPr lang="en-US" dirty="0"/>
               <a:t>General implementation, works for arbitrary ragged data</a:t>
             </a:r>
           </a:p>
           <a:p>
             <a:pPr lvl="1" algn="just"/>
             <a:r>
-              <a:rPr lang="en-US" dirty="0" smtClean="0"/>
+              <a:rPr lang="en-US" dirty="0"/>
               <a:t>API is fully defined here, not customized in other objects</a:t>
             </a:r>
           </a:p>
@@ -36803,19 +37060,19 @@
           <a:p>
             <a:pPr algn="just"/>
             <a:r>
-              <a:rPr lang="en-US" dirty="0" smtClean="0"/>
+              <a:rPr lang="en-US" dirty="0"/>
               <a:t>Point set: </a:t>
             </a:r>
             <a:r>
-              <a:rPr lang="en-US" dirty="0" err="1" smtClean="0"/>
+              <a:rPr lang="en-US" dirty="0" err="1"/>
               <a:t>XPointSet.PointSet</a:t>
             </a:r>
             <a:r>
-              <a:rPr lang="en-US" dirty="0" smtClean="0"/>
+              <a:rPr lang="en-US" dirty="0"/>
               <a:t>( </a:t>
             </a:r>
             <a:r>
-              <a:rPr lang="en-US" dirty="0" err="1" smtClean="0">
+              <a:rPr lang="en-US" dirty="0" err="1">
                 <a:solidFill>
                   <a:srgbClr val="FF6600"/>
                 </a:solidFill>
@@ -36823,7 +37080,7 @@
               <a:t>DataSet</a:t>
             </a:r>
             <a:r>
-              <a:rPr lang="en-US" dirty="0" smtClean="0">
+              <a:rPr lang="en-US" dirty="0">
                 <a:solidFill>
                   <a:srgbClr val="FF6600"/>
                 </a:solidFill>
@@ -36831,28 +37088,28 @@
               <a:t> </a:t>
             </a:r>
             <a:r>
-              <a:rPr lang="en-US" dirty="0" smtClean="0"/>
+              <a:rPr lang="en-US" dirty="0"/>
               <a:t>)</a:t>
             </a:r>
           </a:p>
           <a:p>
             <a:pPr lvl="1" algn="just"/>
             <a:r>
-              <a:rPr lang="en-US" dirty="0" smtClean="0"/>
+              <a:rPr lang="en-US" dirty="0"/>
               <a:t>Requires all single-value entries for inputs, outputs</a:t>
             </a:r>
           </a:p>
           <a:p>
             <a:pPr lvl="1" algn="just"/>
             <a:r>
-              <a:rPr lang="en-US" dirty="0" smtClean="0"/>
+              <a:rPr lang="en-US" dirty="0"/>
               <a:t>Specialization of </a:t>
             </a:r>
             <a:r>
-              <a:rPr lang="en-US" dirty="0" err="1" smtClean="0"/>
+              <a:rPr lang="en-US" dirty="0" err="1"/>
               <a:t>DataSet</a:t>
             </a:r>
-            <a:endParaRPr lang="en-US" dirty="0" smtClean="0"/>
+            <a:endParaRPr lang="en-US" dirty="0"/>
           </a:p>
           <a:p>
             <a:pPr lvl="1" algn="just"/>
@@ -36861,19 +37118,19 @@
           <a:p>
             <a:pPr algn="just"/>
             <a:r>
-              <a:rPr lang="en-US" dirty="0" smtClean="0"/>
+              <a:rPr lang="en-US" dirty="0"/>
               <a:t>History set: </a:t>
             </a:r>
             <a:r>
-              <a:rPr lang="en-US" dirty="0" err="1" smtClean="0"/>
+              <a:rPr lang="en-US" dirty="0" err="1"/>
               <a:t>XHistorySet.HistorySet</a:t>
             </a:r>
             <a:r>
-              <a:rPr lang="en-US" dirty="0" smtClean="0"/>
+              <a:rPr lang="en-US" dirty="0"/>
               <a:t>( </a:t>
             </a:r>
             <a:r>
-              <a:rPr lang="en-US" dirty="0" err="1" smtClean="0">
+              <a:rPr lang="en-US" dirty="0" err="1">
                 <a:solidFill>
                   <a:srgbClr val="FF6600"/>
                 </a:solidFill>
@@ -36881,7 +37138,7 @@
               <a:t>DataSet</a:t>
             </a:r>
             <a:r>
-              <a:rPr lang="en-US" dirty="0" smtClean="0">
+              <a:rPr lang="en-US" dirty="0">
                 <a:solidFill>
                   <a:srgbClr val="FF6600"/>
                 </a:solidFill>
@@ -36889,25 +37146,25 @@
               <a:t> </a:t>
             </a:r>
             <a:r>
-              <a:rPr lang="en-US" dirty="0" smtClean="0"/>
+              <a:rPr lang="en-US" dirty="0"/>
               <a:t>)</a:t>
             </a:r>
           </a:p>
           <a:p>
             <a:pPr lvl="1" algn="just"/>
             <a:r>
-              <a:rPr lang="en-US" dirty="0" smtClean="0"/>
+              <a:rPr lang="en-US" dirty="0"/>
               <a:t>Requires single-value inputs, shared-pivot outputs</a:t>
             </a:r>
           </a:p>
           <a:p>
             <a:pPr lvl="1" algn="just"/>
             <a:r>
-              <a:rPr lang="en-US" dirty="0" smtClean="0"/>
+              <a:rPr lang="en-US" dirty="0"/>
               <a:t>Specialization of </a:t>
             </a:r>
             <a:r>
-              <a:rPr lang="en-US" dirty="0" err="1" smtClean="0"/>
+              <a:rPr lang="en-US" dirty="0" err="1"/>
               <a:t>DataSet</a:t>
             </a:r>
             <a:endParaRPr lang="en-US" dirty="0"/>
@@ -36959,10 +37216,9 @@
           <a:lstStyle/>
           <a:p>
             <a:r>
-              <a:rPr lang="en-US" dirty="0" smtClean="0"/>
+              <a:rPr lang="en-US" dirty="0"/>
               <a:t>New Structure</a:t>
             </a:r>
-            <a:endParaRPr lang="en-US" dirty="0"/>
           </a:p>
         </p:txBody>
       </p:sp>
@@ -36988,13 +37244,6 @@
       </p:transition>
     </mc:Fallback>
   </mc:AlternateContent>
-  <p:timing>
-    <p:tnLst>
-      <p:par>
-        <p:cTn xmlns:p14="http://schemas.microsoft.com/office/powerpoint/2010/main" id="1" dur="indefinite" restart="never" nodeType="tmRoot"/>
-      </p:par>
-    </p:tnLst>
-  </p:timing>
 </p:sld>
 </file>
 
@@ -37037,11 +37286,11 @@
           <a:p>
             <a:pPr algn="just"/>
             <a:r>
-              <a:rPr lang="en-US" dirty="0" smtClean="0"/>
+              <a:rPr lang="en-US" dirty="0"/>
               <a:t>Defined in the first part of </a:t>
             </a:r>
             <a:r>
-              <a:rPr lang="en-US" dirty="0" err="1" smtClean="0">
+              <a:rPr lang="en-US" dirty="0" err="1">
                 <a:solidFill>
                   <a:srgbClr val="FF6600"/>
                 </a:solidFill>
@@ -37049,7 +37298,7 @@
               <a:t>DataSet</a:t>
             </a:r>
             <a:r>
-              <a:rPr lang="en-US" dirty="0" smtClean="0">
+              <a:rPr lang="en-US" dirty="0">
                 <a:solidFill>
                   <a:srgbClr val="FF6600"/>
                 </a:solidFill>
@@ -37057,59 +37306,58 @@
               <a:t> </a:t>
             </a:r>
             <a:r>
-              <a:rPr lang="en-US" dirty="0" smtClean="0"/>
+              <a:rPr lang="en-US" dirty="0"/>
               <a:t>class in </a:t>
             </a:r>
             <a:r>
-              <a:rPr lang="en-US" dirty="0" err="1" smtClean="0"/>
+              <a:rPr lang="en-US" dirty="0" err="1"/>
               <a:t>XDataSet.py</a:t>
             </a:r>
-            <a:endParaRPr lang="en-US" dirty="0" smtClean="0"/>
+            <a:endParaRPr lang="en-US" dirty="0"/>
           </a:p>
           <a:p>
             <a:pPr lvl="1" algn="just"/>
-            <a:endParaRPr lang="en-US" dirty="0" smtClean="0"/>
+            <a:endParaRPr lang="en-US" dirty="0"/>
           </a:p>
           <a:p>
             <a:pPr lvl="1" algn="just"/>
             <a:r>
-              <a:rPr lang="en-US" dirty="0" smtClean="0"/>
+              <a:rPr lang="en-US" dirty="0"/>
               <a:t>No overlap with existing API</a:t>
             </a:r>
           </a:p>
           <a:p>
             <a:pPr lvl="2" algn="just"/>
             <a:r>
-              <a:rPr lang="en-US" dirty="0" smtClean="0"/>
+              <a:rPr lang="en-US" dirty="0"/>
               <a:t>When transitioning, all old </a:t>
             </a:r>
             <a:r>
-              <a:rPr lang="en-US" dirty="0" err="1" smtClean="0"/>
+              <a:rPr lang="en-US" dirty="0" err="1"/>
               <a:t>DataObject</a:t>
             </a:r>
             <a:r>
-              <a:rPr lang="en-US" dirty="0" smtClean="0"/>
+              <a:rPr lang="en-US" dirty="0"/>
               <a:t> calls will error</a:t>
             </a:r>
           </a:p>
           <a:p>
             <a:pPr lvl="1" algn="just"/>
-            <a:endParaRPr lang="en-US" dirty="0" smtClean="0"/>
+            <a:endParaRPr lang="en-US" dirty="0"/>
           </a:p>
           <a:p>
             <a:pPr lvl="1" algn="just"/>
             <a:r>
-              <a:rPr lang="en-US" dirty="0" smtClean="0"/>
+              <a:rPr lang="en-US" dirty="0"/>
               <a:t>Most methods only do 1 action</a:t>
             </a:r>
           </a:p>
           <a:p>
             <a:pPr lvl="2" algn="just"/>
             <a:r>
-              <a:rPr lang="en-US" dirty="0" smtClean="0"/>
+              <a:rPr lang="en-US" dirty="0"/>
               <a:t>Call sub-methods for other actions</a:t>
             </a:r>
-            <a:endParaRPr lang="en-US" dirty="0"/>
           </a:p>
         </p:txBody>
       </p:sp>
@@ -37158,10 +37406,9 @@
           <a:lstStyle/>
           <a:p>
             <a:r>
-              <a:rPr lang="en-US" b="0" dirty="0" smtClean="0"/>
+              <a:rPr lang="en-US" b="0" dirty="0"/>
               <a:t>New API</a:t>
             </a:r>
-            <a:endParaRPr lang="en-US" b="0" dirty="0"/>
           </a:p>
         </p:txBody>
       </p:sp>
@@ -37187,7 +37434,7 @@
         </p:blipFill>
         <p:spPr>
           <a:xfrm>
-            <a:off x="723549" y="0"/>
+            <a:off x="1280411" y="-87085"/>
             <a:ext cx="7695314" cy="6858000"/>
           </a:xfrm>
           <a:prstGeom prst="rect">
@@ -37220,7 +37467,7 @@
   <p:timing>
     <p:tnLst>
       <p:par>
-        <p:cTn xmlns:p14="http://schemas.microsoft.com/office/powerpoint/2010/main" id="1" dur="indefinite" restart="never" nodeType="tmRoot">
+        <p:cTn id="1" dur="indefinite" restart="never" nodeType="tmRoot">
           <p:childTnLst>
             <p:seq concurrent="1" nextAc="seek">
               <p:cTn id="2" dur="indefinite" nodeType="mainSeq">
@@ -37342,11 +37589,11 @@
           <a:p>
             <a:pPr algn="just"/>
             <a:r>
-              <a:rPr lang="en-US" dirty="0" smtClean="0"/>
+              <a:rPr lang="en-US" dirty="0"/>
               <a:t>Want to add a </a:t>
             </a:r>
             <a:r>
-              <a:rPr lang="en-US" dirty="0" smtClean="0">
+              <a:rPr lang="en-US" dirty="0">
                 <a:solidFill>
                   <a:srgbClr val="00B050"/>
                 </a:solidFill>
@@ -37354,14 +37601,14 @@
               <a:t>realization</a:t>
             </a:r>
             <a:r>
-              <a:rPr lang="en-US" dirty="0" smtClean="0"/>
+              <a:rPr lang="en-US" dirty="0"/>
               <a:t>?</a:t>
             </a:r>
           </a:p>
           <a:p>
             <a:pPr lvl="1" algn="just"/>
             <a:r>
-              <a:rPr lang="en-US" dirty="0" err="1" smtClean="0">
+              <a:rPr lang="en-US" dirty="0" err="1">
                 <a:latin typeface="Consolas" charset="0"/>
                 <a:ea typeface="Consolas" charset="0"/>
                 <a:cs typeface="Consolas" charset="0"/>
@@ -37369,7 +37616,7 @@
               <a:t>data.addRealization</a:t>
             </a:r>
             <a:r>
-              <a:rPr lang="en-US" dirty="0" smtClean="0">
+              <a:rPr lang="en-US" dirty="0">
                 <a:latin typeface="Consolas" charset="0"/>
                 <a:ea typeface="Consolas" charset="0"/>
                 <a:cs typeface="Consolas" charset="0"/>
@@ -37377,7 +37624,7 @@
               <a:t>(</a:t>
             </a:r>
             <a:r>
-              <a:rPr lang="en-US" dirty="0" err="1" smtClean="0">
+              <a:rPr lang="en-US" dirty="0" err="1">
                 <a:latin typeface="Consolas" charset="0"/>
                 <a:ea typeface="Consolas" charset="0"/>
                 <a:cs typeface="Consolas" charset="0"/>
@@ -37385,7 +37632,7 @@
               <a:t>rlz</a:t>
             </a:r>
             <a:r>
-              <a:rPr lang="en-US" dirty="0" smtClean="0">
+              <a:rPr lang="en-US" dirty="0">
                 <a:latin typeface="Consolas" charset="0"/>
                 <a:ea typeface="Consolas" charset="0"/>
                 <a:cs typeface="Consolas" charset="0"/>
@@ -37396,29 +37643,29 @@
           <a:p>
             <a:pPr lvl="2" algn="just"/>
             <a:r>
-              <a:rPr lang="en-US" dirty="0" smtClean="0"/>
+              <a:rPr lang="en-US" dirty="0"/>
               <a:t>Takes a dictionary of </a:t>
             </a:r>
             <a:r>
-              <a:rPr lang="en-US" dirty="0" err="1" smtClean="0"/>
+              <a:rPr lang="en-US" dirty="0" err="1"/>
               <a:t>np.array</a:t>
             </a:r>
             <a:r>
-              <a:rPr lang="en-US" dirty="0" smtClean="0"/>
+              <a:rPr lang="en-US" dirty="0"/>
               <a:t> (1-d for single-value)</a:t>
             </a:r>
           </a:p>
           <a:p>
             <a:pPr lvl="2" algn="just"/>
             <a:r>
-              <a:rPr lang="en-US" dirty="0" smtClean="0"/>
+              <a:rPr lang="en-US" dirty="0"/>
               <a:t>Coordinates added separate from dependents</a:t>
             </a:r>
           </a:p>
           <a:p>
             <a:pPr lvl="2" algn="just"/>
             <a:r>
-              <a:rPr lang="en-US" dirty="0" smtClean="0"/>
+              <a:rPr lang="en-US" dirty="0"/>
               <a:t>Example:</a:t>
             </a:r>
           </a:p>
@@ -37428,16 +37675,16 @@
           </a:p>
           <a:p>
             <a:pPr algn="just"/>
-            <a:endParaRPr lang="en-US" dirty="0" smtClean="0"/>
+            <a:endParaRPr lang="en-US" dirty="0"/>
           </a:p>
           <a:p>
             <a:pPr algn="just"/>
             <a:r>
-              <a:rPr lang="en-US" dirty="0" smtClean="0"/>
+              <a:rPr lang="en-US" dirty="0"/>
               <a:t>Want to add a </a:t>
             </a:r>
             <a:r>
-              <a:rPr lang="en-US" dirty="0" smtClean="0">
+              <a:rPr lang="en-US" dirty="0">
                 <a:solidFill>
                   <a:srgbClr val="00B050"/>
                 </a:solidFill>
@@ -37445,14 +37692,14 @@
               <a:t>new variable</a:t>
             </a:r>
             <a:r>
-              <a:rPr lang="en-US" dirty="0" smtClean="0"/>
+              <a:rPr lang="en-US" dirty="0"/>
               <a:t>?</a:t>
             </a:r>
           </a:p>
           <a:p>
             <a:pPr lvl="1" algn="just"/>
             <a:r>
-              <a:rPr lang="en-US" dirty="0" err="1" smtClean="0">
+              <a:rPr lang="en-US" dirty="0" err="1">
                 <a:latin typeface="Consolas" charset="0"/>
                 <a:ea typeface="Consolas" charset="0"/>
                 <a:cs typeface="Consolas" charset="0"/>
@@ -37460,7 +37707,7 @@
               <a:t>data.addVariable</a:t>
             </a:r>
             <a:r>
-              <a:rPr lang="en-US" dirty="0" smtClean="0">
+              <a:rPr lang="en-US" dirty="0">
                 <a:latin typeface="Consolas" charset="0"/>
                 <a:ea typeface="Consolas" charset="0"/>
                 <a:cs typeface="Consolas" charset="0"/>
@@ -37468,7 +37715,7 @@
               <a:t>(</a:t>
             </a:r>
             <a:r>
-              <a:rPr lang="en-US" dirty="0" err="1" smtClean="0">
+              <a:rPr lang="en-US" dirty="0" err="1">
                 <a:latin typeface="Consolas" charset="0"/>
                 <a:ea typeface="Consolas" charset="0"/>
                 <a:cs typeface="Consolas" charset="0"/>
@@ -37476,7 +37723,7 @@
               <a:t>varName,values</a:t>
             </a:r>
             <a:r>
-              <a:rPr lang="en-US" dirty="0" smtClean="0">
+              <a:rPr lang="en-US" dirty="0">
                 <a:latin typeface="Consolas" charset="0"/>
                 <a:ea typeface="Consolas" charset="0"/>
                 <a:cs typeface="Consolas" charset="0"/>
@@ -37487,44 +37734,44 @@
           <a:p>
             <a:pPr lvl="2" algn="just"/>
             <a:r>
-              <a:rPr lang="en-US" dirty="0" smtClean="0"/>
+              <a:rPr lang="en-US" dirty="0"/>
               <a:t>name is string name</a:t>
             </a:r>
           </a:p>
           <a:p>
             <a:pPr lvl="2" algn="just"/>
             <a:r>
-              <a:rPr lang="en-US" dirty="0" smtClean="0"/>
+              <a:rPr lang="en-US" dirty="0"/>
               <a:t>values is </a:t>
             </a:r>
             <a:r>
-              <a:rPr lang="en-US" dirty="0" err="1" smtClean="0"/>
+              <a:rPr lang="en-US" dirty="0" err="1"/>
               <a:t>np.ndarray</a:t>
             </a:r>
             <a:r>
-              <a:rPr lang="en-US" dirty="0" smtClean="0"/>
+              <a:rPr lang="en-US" dirty="0"/>
               <a:t> of:</a:t>
             </a:r>
           </a:p>
           <a:p>
             <a:pPr lvl="3" algn="just"/>
             <a:r>
-              <a:rPr lang="en-US" dirty="0" err="1" smtClean="0"/>
+              <a:rPr lang="en-US" dirty="0" err="1"/>
               <a:t>float,str</a:t>
             </a:r>
             <a:r>
-              <a:rPr lang="en-US" dirty="0" smtClean="0"/>
+              <a:rPr lang="en-US" dirty="0"/>
               <a:t> for single-valued (scalars)</a:t>
             </a:r>
           </a:p>
           <a:p>
             <a:pPr lvl="3" algn="just"/>
             <a:r>
-              <a:rPr lang="en-US" dirty="0" err="1" smtClean="0"/>
+              <a:rPr lang="en-US" dirty="0" err="1"/>
               <a:t>xr.DataArray</a:t>
             </a:r>
             <a:r>
-              <a:rPr lang="en-US" dirty="0" smtClean="0"/>
+              <a:rPr lang="en-US" dirty="0"/>
               <a:t> for histories/ND samples</a:t>
             </a:r>
           </a:p>
@@ -37575,18 +37822,17 @@
           <a:lstStyle/>
           <a:p>
             <a:r>
-              <a:rPr lang="en-US" dirty="0" smtClean="0"/>
+              <a:rPr lang="en-US" dirty="0"/>
               <a:t>New API </a:t>
             </a:r>
             <a:r>
-              <a:rPr lang="mr-IN" dirty="0" smtClean="0"/>
+              <a:rPr lang="mr-IN" dirty="0"/>
               <a:t>–</a:t>
             </a:r>
             <a:r>
-              <a:rPr lang="en-US" dirty="0" smtClean="0"/>
+              <a:rPr lang="en-US" dirty="0"/>
               <a:t> Adding Data</a:t>
             </a:r>
-            <a:endParaRPr lang="en-US" dirty="0"/>
           </a:p>
         </p:txBody>
       </p:sp>
@@ -37642,13 +37888,6 @@
       </p:transition>
     </mc:Fallback>
   </mc:AlternateContent>
-  <p:timing>
-    <p:tnLst>
-      <p:par>
-        <p:cTn xmlns:p14="http://schemas.microsoft.com/office/powerpoint/2010/main" id="1" dur="indefinite" restart="never" nodeType="tmRoot"/>
-      </p:par>
-    </p:tnLst>
-  </p:timing>
 </p:sld>
 </file>
 
@@ -37691,11 +37930,11 @@
           <a:p>
             <a:pPr algn="just"/>
             <a:r>
-              <a:rPr lang="en-US" dirty="0" smtClean="0"/>
+              <a:rPr lang="en-US" dirty="0"/>
               <a:t>Want to add </a:t>
             </a:r>
             <a:r>
-              <a:rPr lang="en-US" dirty="0" smtClean="0">
+              <a:rPr lang="en-US" dirty="0">
                 <a:solidFill>
                   <a:srgbClr val="00B050"/>
                 </a:solidFill>
@@ -37703,21 +37942,21 @@
               <a:t>metadata</a:t>
             </a:r>
             <a:r>
-              <a:rPr lang="en-US" dirty="0" smtClean="0"/>
+              <a:rPr lang="en-US" dirty="0"/>
               <a:t>?</a:t>
             </a:r>
           </a:p>
           <a:p>
             <a:pPr lvl="1" algn="just"/>
             <a:r>
-              <a:rPr lang="en-US" dirty="0" smtClean="0"/>
+              <a:rPr lang="en-US" dirty="0"/>
               <a:t>General Data (not pointwise, once per data object)</a:t>
             </a:r>
           </a:p>
           <a:p>
             <a:pPr lvl="2" algn="just"/>
             <a:r>
-              <a:rPr lang="en-US" dirty="0" err="1" smtClean="0">
+              <a:rPr lang="en-US" dirty="0" err="1">
                 <a:latin typeface="Consolas" charset="0"/>
                 <a:ea typeface="Consolas" charset="0"/>
                 <a:cs typeface="Consolas" charset="0"/>
@@ -37725,7 +37964,7 @@
               <a:t>data.addMeta</a:t>
             </a:r>
             <a:r>
-              <a:rPr lang="en-US" dirty="0" smtClean="0">
+              <a:rPr lang="en-US" dirty="0">
                 <a:latin typeface="Consolas" charset="0"/>
                 <a:ea typeface="Consolas" charset="0"/>
                 <a:cs typeface="Consolas" charset="0"/>
@@ -37733,7 +37972,7 @@
               <a:t>(</a:t>
             </a:r>
             <a:r>
-              <a:rPr lang="en-US" dirty="0" err="1" smtClean="0">
+              <a:rPr lang="en-US" dirty="0" err="1">
                 <a:latin typeface="Consolas" charset="0"/>
                 <a:ea typeface="Consolas" charset="0"/>
                 <a:cs typeface="Consolas" charset="0"/>
@@ -37741,7 +37980,7 @@
               <a:t>tag,xmlDict</a:t>
             </a:r>
             <a:r>
-              <a:rPr lang="en-US" dirty="0" smtClean="0">
+              <a:rPr lang="en-US" dirty="0">
                 <a:latin typeface="Consolas" charset="0"/>
                 <a:ea typeface="Consolas" charset="0"/>
                 <a:cs typeface="Consolas" charset="0"/>
@@ -37757,48 +37996,40 @@
                 <a:ea typeface="Consolas" charset="0"/>
                 <a:cs typeface="Consolas" charset="0"/>
               </a:rPr>
-              <a:t>t</a:t>
+              <a:t>tag</a:t>
             </a:r>
             <a:r>
-              <a:rPr lang="en-US" dirty="0" smtClean="0">
-                <a:latin typeface="Consolas" charset="0"/>
-                <a:ea typeface="Consolas" charset="0"/>
-                <a:cs typeface="Consolas" charset="0"/>
-              </a:rPr>
-              <a:t>ag</a:t>
-            </a:r>
-            <a:r>
-              <a:rPr lang="en-US" dirty="0" smtClean="0"/>
+              <a:rPr lang="en-US" dirty="0"/>
               <a:t> says which meta key to store under</a:t>
             </a:r>
           </a:p>
           <a:p>
             <a:pPr lvl="4" algn="just"/>
             <a:r>
-              <a:rPr lang="en-US" dirty="0" smtClean="0"/>
+              <a:rPr lang="en-US" dirty="0"/>
               <a:t>e.g. </a:t>
             </a:r>
             <a:r>
-              <a:rPr lang="en-US" dirty="0" err="1" smtClean="0"/>
+              <a:rPr lang="en-US" dirty="0" err="1"/>
               <a:t>BasicStastics</a:t>
             </a:r>
             <a:r>
-              <a:rPr lang="en-US" dirty="0" smtClean="0"/>
+              <a:rPr lang="en-US" dirty="0"/>
               <a:t>, </a:t>
             </a:r>
             <a:r>
-              <a:rPr lang="en-US" dirty="0" err="1" smtClean="0"/>
+              <a:rPr lang="en-US" dirty="0" err="1"/>
               <a:t>DataSet</a:t>
             </a:r>
             <a:r>
-              <a:rPr lang="en-US" dirty="0" smtClean="0"/>
+              <a:rPr lang="en-US" dirty="0"/>
               <a:t>, Optimizer, HSPS</a:t>
             </a:r>
           </a:p>
           <a:p>
             <a:pPr lvl="3" algn="just"/>
             <a:r>
-              <a:rPr lang="en-US" dirty="0" err="1" smtClean="0">
+              <a:rPr lang="en-US" dirty="0" err="1">
                 <a:latin typeface="Consolas" charset="0"/>
                 <a:ea typeface="Consolas" charset="0"/>
                 <a:cs typeface="Consolas" charset="0"/>
@@ -37806,51 +38037,51 @@
               <a:t>xmlDict</a:t>
             </a:r>
             <a:r>
-              <a:rPr lang="en-US" dirty="0" smtClean="0"/>
+              <a:rPr lang="en-US" dirty="0"/>
               <a:t> are the data to add</a:t>
             </a:r>
           </a:p>
           <a:p>
             <a:pPr lvl="4" algn="just"/>
             <a:r>
-              <a:rPr lang="en-US" dirty="0" smtClean="0"/>
+              <a:rPr lang="en-US" dirty="0"/>
               <a:t>e.g. </a:t>
             </a:r>
           </a:p>
           <a:p>
             <a:pPr lvl="1" algn="just"/>
-            <a:endParaRPr lang="en-US" dirty="0" smtClean="0"/>
+            <a:endParaRPr lang="en-US" dirty="0"/>
           </a:p>
           <a:p>
             <a:pPr lvl="1" algn="just"/>
-            <a:endParaRPr lang="en-US" dirty="0" smtClean="0"/>
+            <a:endParaRPr lang="en-US" dirty="0"/>
           </a:p>
           <a:p>
             <a:pPr lvl="1" algn="just"/>
             <a:r>
-              <a:rPr lang="en-US" dirty="0" smtClean="0"/>
+              <a:rPr lang="en-US" dirty="0"/>
               <a:t>Pointwise Data</a:t>
             </a:r>
           </a:p>
           <a:p>
             <a:pPr lvl="2" algn="just"/>
             <a:r>
-              <a:rPr lang="en-US" dirty="0" smtClean="0"/>
+              <a:rPr lang="en-US" dirty="0"/>
               <a:t>Include the data in </a:t>
             </a:r>
             <a:r>
-              <a:rPr lang="en-US" dirty="0" err="1" smtClean="0"/>
+              <a:rPr lang="en-US" dirty="0" err="1"/>
               <a:t>addRealization</a:t>
             </a:r>
             <a:r>
-              <a:rPr lang="en-US" dirty="0" smtClean="0"/>
+              <a:rPr lang="en-US" dirty="0"/>
               <a:t> dictionary</a:t>
             </a:r>
           </a:p>
           <a:p>
             <a:pPr lvl="3" algn="just"/>
             <a:r>
-              <a:rPr lang="en-US" dirty="0" smtClean="0"/>
+              <a:rPr lang="en-US" dirty="0"/>
               <a:t>variables not in input, output are added to metadata</a:t>
             </a:r>
           </a:p>
@@ -37901,18 +38132,17 @@
           <a:lstStyle/>
           <a:p>
             <a:r>
-              <a:rPr lang="en-US" dirty="0" smtClean="0"/>
+              <a:rPr lang="en-US" dirty="0"/>
               <a:t>New API </a:t>
             </a:r>
             <a:r>
-              <a:rPr lang="mr-IN" dirty="0" smtClean="0"/>
+              <a:rPr lang="mr-IN" dirty="0"/>
               <a:t>–</a:t>
             </a:r>
             <a:r>
-              <a:rPr lang="en-US" dirty="0" smtClean="0"/>
+              <a:rPr lang="en-US" dirty="0"/>
               <a:t> Adding Data</a:t>
             </a:r>
-            <a:endParaRPr lang="en-US" dirty="0"/>
           </a:p>
         </p:txBody>
       </p:sp>
@@ -37968,13 +38198,6 @@
       </p:transition>
     </mc:Fallback>
   </mc:AlternateContent>
-  <p:timing>
-    <p:tnLst>
-      <p:par>
-        <p:cTn xmlns:p14="http://schemas.microsoft.com/office/powerpoint/2010/main" id="1" dur="indefinite" restart="never" nodeType="tmRoot"/>
-      </p:par>
-    </p:tnLst>
-  </p:timing>
 </p:sld>
 </file>
 
@@ -38011,18 +38234,17 @@
           <a:lstStyle/>
           <a:p>
             <a:r>
-              <a:rPr lang="en-US" dirty="0" smtClean="0"/>
+              <a:rPr lang="en-US" dirty="0"/>
               <a:t>New API </a:t>
             </a:r>
             <a:r>
-              <a:rPr lang="mr-IN" dirty="0" smtClean="0"/>
+              <a:rPr lang="mr-IN" dirty="0"/>
               <a:t>–</a:t>
             </a:r>
             <a:r>
-              <a:rPr lang="en-US" dirty="0" smtClean="0"/>
+              <a:rPr lang="en-US" dirty="0"/>
               <a:t> Accessing Data</a:t>
             </a:r>
-            <a:endParaRPr lang="en-US" dirty="0"/>
           </a:p>
         </p:txBody>
       </p:sp>
@@ -38042,11 +38264,11 @@
           <a:lstStyle/>
           <a:p>
             <a:r>
-              <a:rPr lang="en-US" dirty="0" smtClean="0"/>
+              <a:rPr lang="en-US" dirty="0"/>
               <a:t>Get </a:t>
             </a:r>
             <a:r>
-              <a:rPr lang="en-US" dirty="0" smtClean="0">
+              <a:rPr lang="en-US" dirty="0">
                 <a:solidFill>
                   <a:srgbClr val="00B050"/>
                 </a:solidFill>
@@ -38054,14 +38276,14 @@
               <a:t>pivot </a:t>
             </a:r>
             <a:r>
-              <a:rPr lang="en-US" dirty="0" smtClean="0"/>
+              <a:rPr lang="en-US" dirty="0"/>
               <a:t>parameter(s)</a:t>
             </a:r>
           </a:p>
           <a:p>
             <a:pPr lvl="1"/>
             <a:r>
-              <a:rPr lang="en-US" dirty="0" err="1" smtClean="0">
+              <a:rPr lang="en-US" dirty="0" err="1">
                 <a:latin typeface="Consolas" charset="0"/>
                 <a:ea typeface="Consolas" charset="0"/>
                 <a:cs typeface="Consolas" charset="0"/>
@@ -38069,7 +38291,7 @@
               <a:t>data.getDimensions</a:t>
             </a:r>
             <a:r>
-              <a:rPr lang="en-US" dirty="0" smtClean="0">
+              <a:rPr lang="en-US" dirty="0">
                 <a:latin typeface="Consolas" charset="0"/>
                 <a:ea typeface="Consolas" charset="0"/>
                 <a:cs typeface="Consolas" charset="0"/>
@@ -38077,7 +38299,7 @@
               <a:t>(</a:t>
             </a:r>
             <a:r>
-              <a:rPr lang="en-US" dirty="0" err="1" smtClean="0">
+              <a:rPr lang="en-US" dirty="0" err="1">
                 <a:latin typeface="Consolas" charset="0"/>
                 <a:ea typeface="Consolas" charset="0"/>
                 <a:cs typeface="Consolas" charset="0"/>
@@ -38085,7 +38307,7 @@
               <a:t>varName</a:t>
             </a:r>
             <a:r>
-              <a:rPr lang="en-US" dirty="0" smtClean="0">
+              <a:rPr lang="en-US" dirty="0">
                 <a:latin typeface="Consolas" charset="0"/>
                 <a:ea typeface="Consolas" charset="0"/>
                 <a:cs typeface="Consolas" charset="0"/>
@@ -38095,11 +38317,11 @@
           </a:p>
           <a:p>
             <a:r>
-              <a:rPr lang="en-US" dirty="0" smtClean="0"/>
+              <a:rPr lang="en-US" dirty="0"/>
               <a:t>Get </a:t>
             </a:r>
             <a:r>
-              <a:rPr lang="en-US" dirty="0" smtClean="0">
+              <a:rPr lang="en-US" dirty="0">
                 <a:solidFill>
                   <a:srgbClr val="00B050"/>
                 </a:solidFill>
@@ -38107,14 +38329,14 @@
               <a:t>metadata</a:t>
             </a:r>
             <a:r>
-              <a:rPr lang="en-US" dirty="0" smtClean="0"/>
+              <a:rPr lang="en-US" dirty="0"/>
               <a:t> information</a:t>
             </a:r>
           </a:p>
           <a:p>
             <a:pPr lvl="1"/>
             <a:r>
-              <a:rPr lang="en-US" dirty="0" err="1" smtClean="0">
+              <a:rPr lang="en-US" dirty="0" err="1">
                 <a:latin typeface="Consolas" charset="0"/>
                 <a:ea typeface="Consolas" charset="0"/>
                 <a:cs typeface="Consolas" charset="0"/>
@@ -38122,7 +38344,7 @@
               <a:t>data.getMeta</a:t>
             </a:r>
             <a:r>
-              <a:rPr lang="en-US" dirty="0" smtClean="0">
+              <a:rPr lang="en-US" dirty="0">
                 <a:latin typeface="Consolas" charset="0"/>
                 <a:ea typeface="Consolas" charset="0"/>
                 <a:cs typeface="Consolas" charset="0"/>
@@ -38130,7 +38352,7 @@
               <a:t>(</a:t>
             </a:r>
             <a:r>
-              <a:rPr lang="en-US" dirty="0" err="1" smtClean="0">
+              <a:rPr lang="en-US" dirty="0" err="1">
                 <a:latin typeface="Consolas" charset="0"/>
                 <a:ea typeface="Consolas" charset="0"/>
                 <a:cs typeface="Consolas" charset="0"/>
@@ -38138,7 +38360,7 @@
               <a:t>keys,pointwise,general</a:t>
             </a:r>
             <a:r>
-              <a:rPr lang="en-US" dirty="0" smtClean="0">
+              <a:rPr lang="en-US" dirty="0">
                 <a:latin typeface="Consolas" charset="0"/>
                 <a:ea typeface="Consolas" charset="0"/>
                 <a:cs typeface="Consolas" charset="0"/>
@@ -38149,17 +38371,17 @@
           <a:p>
             <a:pPr lvl="2"/>
             <a:r>
-              <a:rPr lang="en-US" dirty="0" smtClean="0"/>
+              <a:rPr lang="en-US" dirty="0"/>
               <a:t>tell it to search in pointwise or general metadata</a:t>
             </a:r>
           </a:p>
           <a:p>
             <a:r>
-              <a:rPr lang="en-US" dirty="0" smtClean="0"/>
+              <a:rPr lang="en-US" dirty="0"/>
               <a:t>Get list of </a:t>
             </a:r>
             <a:r>
-              <a:rPr lang="en-US" dirty="0" smtClean="0">
+              <a:rPr lang="en-US" dirty="0">
                 <a:solidFill>
                   <a:srgbClr val="00B050"/>
                 </a:solidFill>
@@ -38170,7 +38392,7 @@
           <a:p>
             <a:pPr lvl="1"/>
             <a:r>
-              <a:rPr lang="en-US" dirty="0" err="1" smtClean="0">
+              <a:rPr lang="en-US" dirty="0" err="1">
                 <a:latin typeface="Consolas" charset="0"/>
                 <a:ea typeface="Consolas" charset="0"/>
                 <a:cs typeface="Consolas" charset="0"/>
@@ -38178,7 +38400,7 @@
               <a:t>data.getVars</a:t>
             </a:r>
             <a:r>
-              <a:rPr lang="en-US" dirty="0" smtClean="0">
+              <a:rPr lang="en-US" dirty="0">
                 <a:latin typeface="Consolas" charset="0"/>
                 <a:ea typeface="Consolas" charset="0"/>
                 <a:cs typeface="Consolas" charset="0"/>
@@ -38189,17 +38411,17 @@
           <a:p>
             <a:pPr lvl="2"/>
             <a:r>
-              <a:rPr lang="en-US" dirty="0" smtClean="0"/>
+              <a:rPr lang="en-US" dirty="0"/>
               <a:t>input, output, metadata; or None for all</a:t>
             </a:r>
           </a:p>
           <a:p>
             <a:r>
-              <a:rPr lang="en-US" dirty="0" smtClean="0"/>
+              <a:rPr lang="en-US" dirty="0"/>
               <a:t>Get </a:t>
             </a:r>
             <a:r>
-              <a:rPr lang="en-US" dirty="0" smtClean="0">
+              <a:rPr lang="en-US" dirty="0">
                 <a:solidFill>
                   <a:srgbClr val="00B050"/>
                 </a:solidFill>
@@ -38210,63 +38432,43 @@
           <a:p>
             <a:pPr lvl="1"/>
             <a:r>
-              <a:rPr lang="en-US" dirty="0" smtClean="0"/>
+              <a:rPr lang="en-US" dirty="0"/>
               <a:t>Best to access directly</a:t>
             </a:r>
           </a:p>
           <a:p>
             <a:pPr lvl="2"/>
             <a:r>
-              <a:rPr lang="en-US" sz="1600" dirty="0" smtClean="0"/>
-              <a:t>For </a:t>
+              <a:rPr lang="en-US" sz="1600" dirty="0"/>
+              <a:t>For more methods, see “</a:t>
+            </a:r>
+            <a:r>
+              <a:rPr lang="en-US" sz="1600" dirty="0" err="1"/>
+              <a:t>Xarray</a:t>
             </a:r>
             <a:r>
               <a:rPr lang="en-US" sz="1600" dirty="0"/>
-              <a:t>more methods, see </a:t>
-            </a:r>
-            <a:r>
-              <a:rPr lang="en-US" sz="1600" dirty="0" smtClean="0"/>
-              <a:t>“</a:t>
-            </a:r>
-            <a:r>
-              <a:rPr lang="en-US" sz="1600" dirty="0" err="1" smtClean="0"/>
-              <a:t>Xarray</a:t>
-            </a:r>
-            <a:r>
-              <a:rPr lang="en-US" sz="1600" dirty="0" smtClean="0"/>
               <a:t> Operations”, or </a:t>
-            </a:r>
-            <a:r>
-              <a:rPr lang="en-US" sz="1600" dirty="0" smtClean="0">
-                <a:hlinkClick r:id="rId2"/>
-              </a:rPr>
-              <a:t>http</a:t>
             </a:r>
             <a:r>
               <a:rPr lang="en-US" sz="1600" dirty="0">
                 <a:hlinkClick r:id="rId2"/>
               </a:rPr>
-              <a:t>://</a:t>
+              <a:t>http://xarray.pydata.org/en/stable/indexing.html#dataset-indexing</a:t>
             </a:r>
-            <a:r>
-              <a:rPr lang="en-US" sz="1600" dirty="0" smtClean="0">
-                <a:hlinkClick r:id="rId2"/>
-              </a:rPr>
-              <a:t>xarray.pydata.org/en/stable/indexing.html#dataset-indexing</a:t>
-            </a:r>
-            <a:endParaRPr lang="en-US" sz="1600" dirty="0" smtClean="0"/>
+            <a:endParaRPr lang="en-US" sz="1600" dirty="0"/>
           </a:p>
           <a:p>
             <a:pPr lvl="1"/>
             <a:r>
-              <a:rPr lang="en-US" dirty="0" smtClean="0"/>
+              <a:rPr lang="en-US" dirty="0"/>
               <a:t>Slower, as dictionary</a:t>
             </a:r>
           </a:p>
           <a:p>
             <a:pPr lvl="2"/>
             <a:r>
-              <a:rPr lang="en-US" dirty="0" err="1" smtClean="0">
+              <a:rPr lang="en-US" dirty="0" err="1">
                 <a:latin typeface="Consolas" charset="0"/>
                 <a:ea typeface="Consolas" charset="0"/>
                 <a:cs typeface="Consolas" charset="0"/>
@@ -38274,7 +38476,7 @@
               <a:t>data.getVarValues</a:t>
             </a:r>
             <a:r>
-              <a:rPr lang="en-US" dirty="0" smtClean="0">
+              <a:rPr lang="en-US" dirty="0">
                 <a:latin typeface="Consolas" charset="0"/>
                 <a:ea typeface="Consolas" charset="0"/>
                 <a:cs typeface="Consolas" charset="0"/>
@@ -38282,7 +38484,7 @@
               <a:t>(</a:t>
             </a:r>
             <a:r>
-              <a:rPr lang="en-US" dirty="0" err="1" smtClean="0">
+              <a:rPr lang="en-US" dirty="0" err="1">
                 <a:latin typeface="Consolas" charset="0"/>
                 <a:ea typeface="Consolas" charset="0"/>
                 <a:cs typeface="Consolas" charset="0"/>
@@ -38290,7 +38492,7 @@
               <a:t>var</a:t>
             </a:r>
             <a:r>
-              <a:rPr lang="en-US" dirty="0" smtClean="0">
+              <a:rPr lang="en-US" dirty="0">
                 <a:latin typeface="Consolas" charset="0"/>
                 <a:ea typeface="Consolas" charset="0"/>
                 <a:cs typeface="Consolas" charset="0"/>
@@ -38301,18 +38503,17 @@
           <a:p>
             <a:pPr lvl="3"/>
             <a:r>
-              <a:rPr lang="en-US" dirty="0" smtClean="0"/>
+              <a:rPr lang="en-US" dirty="0"/>
               <a:t>“</a:t>
             </a:r>
             <a:r>
-              <a:rPr lang="en-US" dirty="0" err="1" smtClean="0"/>
+              <a:rPr lang="en-US" dirty="0" err="1"/>
               <a:t>var</a:t>
             </a:r>
             <a:r>
-              <a:rPr lang="en-US" dirty="0" smtClean="0"/>
+              <a:rPr lang="en-US" dirty="0"/>
               <a:t>” can be list or single variable name</a:t>
             </a:r>
-            <a:endParaRPr lang="en-US" dirty="0"/>
           </a:p>
         </p:txBody>
       </p:sp>
@@ -38380,13 +38581,6 @@
   <p:clrMapOvr>
     <a:masterClrMapping/>
   </p:clrMapOvr>
-  <p:timing>
-    <p:tnLst>
-      <p:par>
-        <p:cTn xmlns:p14="http://schemas.microsoft.com/office/powerpoint/2010/main" id="1" dur="indefinite" restart="never" nodeType="tmRoot"/>
-      </p:par>
-    </p:tnLst>
-  </p:timing>
 </p:sld>
 </file>
 

</xml_diff>